<commit_message>
Upload updated version of presentation
</commit_message>
<xml_diff>
--- a/Java SE 8 Teaching Material/Chapter 4 - Basic Java Elements.pptx
+++ b/Java SE 8 Teaching Material/Chapter 4 - Basic Java Elements.pptx
@@ -20,11 +20,13 @@
     <p:sldId id="270" r:id="rId14"/>
     <p:sldId id="271" r:id="rId15"/>
     <p:sldId id="272" r:id="rId16"/>
-    <p:sldId id="273" r:id="rId17"/>
-    <p:sldId id="274" r:id="rId18"/>
-    <p:sldId id="275" r:id="rId19"/>
-    <p:sldId id="276" r:id="rId20"/>
-    <p:sldId id="277" r:id="rId21"/>
+    <p:sldId id="278" r:id="rId17"/>
+    <p:sldId id="279" r:id="rId18"/>
+    <p:sldId id="273" r:id="rId19"/>
+    <p:sldId id="274" r:id="rId20"/>
+    <p:sldId id="275" r:id="rId21"/>
+    <p:sldId id="276" r:id="rId22"/>
+    <p:sldId id="277" r:id="rId23"/>
   </p:sldIdLst>
   <p:sldSz cx="12192000" cy="6858000"/>
   <p:notesSz cx="6858000" cy="9144000"/>
@@ -143,6 +145,8 @@
             <p14:sldId id="270"/>
             <p14:sldId id="271"/>
             <p14:sldId id="272"/>
+            <p14:sldId id="278"/>
+            <p14:sldId id="279"/>
             <p14:sldId id="273"/>
             <p14:sldId id="274"/>
             <p14:sldId id="275"/>
@@ -635,6 +639,315 @@
             <ac:picMk id="8" creationId="{D3B54C0C-4D90-0BE4-46AF-6AB5A44551FF}"/>
           </ac:picMkLst>
         </pc:picChg>
+      </pc:sldChg>
+    </pc:docChg>
+  </pc:docChgLst>
+  <pc:docChgLst>
+    <pc:chgData name="Dinh Vinh Mai" userId="b8e4a559-41e0-4141-8dc1-330451d69615" providerId="ADAL" clId="{9AF12651-E492-4749-A948-8FB040B70964}"/>
+    <pc:docChg chg="undo custSel addSld delSld modSld sldOrd addSection delSection modSection">
+      <pc:chgData name="Dinh Vinh Mai" userId="b8e4a559-41e0-4141-8dc1-330451d69615" providerId="ADAL" clId="{9AF12651-E492-4749-A948-8FB040B70964}" dt="2024-07-11T23:31:06.508" v="15304" actId="20577"/>
+      <pc:docMkLst>
+        <pc:docMk/>
+      </pc:docMkLst>
+      <pc:sldChg chg="del">
+        <pc:chgData name="Dinh Vinh Mai" userId="b8e4a559-41e0-4141-8dc1-330451d69615" providerId="ADAL" clId="{9AF12651-E492-4749-A948-8FB040B70964}" dt="2024-07-11T01:41:42.792" v="0" actId="47"/>
+        <pc:sldMkLst>
+          <pc:docMk/>
+          <pc:sldMk cId="217268900" sldId="256"/>
+        </pc:sldMkLst>
+      </pc:sldChg>
+      <pc:sldChg chg="modSp new mod">
+        <pc:chgData name="Dinh Vinh Mai" userId="b8e4a559-41e0-4141-8dc1-330451d69615" providerId="ADAL" clId="{9AF12651-E492-4749-A948-8FB040B70964}" dt="2024-07-11T01:42:31.374" v="77" actId="20577"/>
+        <pc:sldMkLst>
+          <pc:docMk/>
+          <pc:sldMk cId="2437323191" sldId="256"/>
+        </pc:sldMkLst>
+        <pc:spChg chg="mod">
+          <ac:chgData name="Dinh Vinh Mai" userId="b8e4a559-41e0-4141-8dc1-330451d69615" providerId="ADAL" clId="{9AF12651-E492-4749-A948-8FB040B70964}" dt="2024-07-11T01:41:58.931" v="44" actId="20577"/>
+          <ac:spMkLst>
+            <pc:docMk/>
+            <pc:sldMk cId="2437323191" sldId="256"/>
+            <ac:spMk id="2" creationId="{5F432DBD-CB83-55BD-128C-2C66E47798F8}"/>
+          </ac:spMkLst>
+        </pc:spChg>
+        <pc:spChg chg="mod">
+          <ac:chgData name="Dinh Vinh Mai" userId="b8e4a559-41e0-4141-8dc1-330451d69615" providerId="ADAL" clId="{9AF12651-E492-4749-A948-8FB040B70964}" dt="2024-07-11T01:42:31.374" v="77" actId="20577"/>
+          <ac:spMkLst>
+            <pc:docMk/>
+            <pc:sldMk cId="2437323191" sldId="256"/>
+            <ac:spMk id="3" creationId="{96DD8BC4-D539-661E-8A88-53AF6C208F93}"/>
+          </ac:spMkLst>
+        </pc:spChg>
+      </pc:sldChg>
+      <pc:sldChg chg="addSp delSp modSp add del mod">
+        <pc:chgData name="Dinh Vinh Mai" userId="b8e4a559-41e0-4141-8dc1-330451d69615" providerId="ADAL" clId="{9AF12651-E492-4749-A948-8FB040B70964}" dt="2024-07-11T01:48:04.827" v="216" actId="47"/>
+        <pc:sldMkLst>
+          <pc:docMk/>
+          <pc:sldMk cId="1145363845" sldId="257"/>
+        </pc:sldMkLst>
+        <pc:spChg chg="del mod">
+          <ac:chgData name="Dinh Vinh Mai" userId="b8e4a559-41e0-4141-8dc1-330451d69615" providerId="ADAL" clId="{9AF12651-E492-4749-A948-8FB040B70964}" dt="2024-07-11T01:44:11.394" v="80" actId="478"/>
+          <ac:spMkLst>
+            <pc:docMk/>
+            <pc:sldMk cId="1145363845" sldId="257"/>
+            <ac:spMk id="2" creationId="{5F432DBD-CB83-55BD-128C-2C66E47798F8}"/>
+          </ac:spMkLst>
+        </pc:spChg>
+        <pc:spChg chg="mod">
+          <ac:chgData name="Dinh Vinh Mai" userId="b8e4a559-41e0-4141-8dc1-330451d69615" providerId="ADAL" clId="{9AF12651-E492-4749-A948-8FB040B70964}" dt="2024-07-11T01:46:05.600" v="116" actId="1076"/>
+          <ac:spMkLst>
+            <pc:docMk/>
+            <pc:sldMk cId="1145363845" sldId="257"/>
+            <ac:spMk id="3" creationId="{96DD8BC4-D539-661E-8A88-53AF6C208F93}"/>
+          </ac:spMkLst>
+        </pc:spChg>
+        <pc:spChg chg="add del mod">
+          <ac:chgData name="Dinh Vinh Mai" userId="b8e4a559-41e0-4141-8dc1-330451d69615" providerId="ADAL" clId="{9AF12651-E492-4749-A948-8FB040B70964}" dt="2024-07-11T01:47:56.554" v="215" actId="478"/>
+          <ac:spMkLst>
+            <pc:docMk/>
+            <pc:sldMk cId="1145363845" sldId="257"/>
+            <ac:spMk id="4" creationId="{BBA13038-CAB8-FCA0-CDE8-65E40C2F10A3}"/>
+          </ac:spMkLst>
+        </pc:spChg>
+      </pc:sldChg>
+      <pc:sldChg chg="del">
+        <pc:chgData name="Dinh Vinh Mai" userId="b8e4a559-41e0-4141-8dc1-330451d69615" providerId="ADAL" clId="{9AF12651-E492-4749-A948-8FB040B70964}" dt="2024-07-11T01:41:42.792" v="0" actId="47"/>
+        <pc:sldMkLst>
+          <pc:docMk/>
+          <pc:sldMk cId="3564134708" sldId="257"/>
+        </pc:sldMkLst>
+      </pc:sldChg>
+      <pc:sldChg chg="modSp add mod modAnim">
+        <pc:chgData name="Dinh Vinh Mai" userId="b8e4a559-41e0-4141-8dc1-330451d69615" providerId="ADAL" clId="{9AF12651-E492-4749-A948-8FB040B70964}" dt="2024-07-11T02:13:51.984" v="3027"/>
+        <pc:sldMkLst>
+          <pc:docMk/>
+          <pc:sldMk cId="715447292" sldId="258"/>
+        </pc:sldMkLst>
+        <pc:spChg chg="mod">
+          <ac:chgData name="Dinh Vinh Mai" userId="b8e4a559-41e0-4141-8dc1-330451d69615" providerId="ADAL" clId="{9AF12651-E492-4749-A948-8FB040B70964}" dt="2024-07-11T02:13:26.874" v="3021" actId="20577"/>
+          <ac:spMkLst>
+            <pc:docMk/>
+            <pc:sldMk cId="715447292" sldId="258"/>
+            <ac:spMk id="4" creationId="{BBA13038-CAB8-FCA0-CDE8-65E40C2F10A3}"/>
+          </ac:spMkLst>
+        </pc:spChg>
+      </pc:sldChg>
+      <pc:sldChg chg="del">
+        <pc:chgData name="Dinh Vinh Mai" userId="b8e4a559-41e0-4141-8dc1-330451d69615" providerId="ADAL" clId="{9AF12651-E492-4749-A948-8FB040B70964}" dt="2024-07-11T01:41:42.792" v="0" actId="47"/>
+        <pc:sldMkLst>
+          <pc:docMk/>
+          <pc:sldMk cId="1315607852" sldId="258"/>
+        </pc:sldMkLst>
+      </pc:sldChg>
+      <pc:sldChg chg="del">
+        <pc:chgData name="Dinh Vinh Mai" userId="b8e4a559-41e0-4141-8dc1-330451d69615" providerId="ADAL" clId="{9AF12651-E492-4749-A948-8FB040B70964}" dt="2024-07-11T01:41:42.792" v="0" actId="47"/>
+        <pc:sldMkLst>
+          <pc:docMk/>
+          <pc:sldMk cId="1400435694" sldId="259"/>
+        </pc:sldMkLst>
+      </pc:sldChg>
+      <pc:sldChg chg="modSp add modAnim">
+        <pc:chgData name="Dinh Vinh Mai" userId="b8e4a559-41e0-4141-8dc1-330451d69615" providerId="ADAL" clId="{9AF12651-E492-4749-A948-8FB040B70964}" dt="2024-07-11T08:30:39.020" v="5812"/>
+        <pc:sldMkLst>
+          <pc:docMk/>
+          <pc:sldMk cId="2078495021" sldId="259"/>
+        </pc:sldMkLst>
+        <pc:spChg chg="mod">
+          <ac:chgData name="Dinh Vinh Mai" userId="b8e4a559-41e0-4141-8dc1-330451d69615" providerId="ADAL" clId="{9AF12651-E492-4749-A948-8FB040B70964}" dt="2024-07-11T08:30:19.371" v="5808" actId="20577"/>
+          <ac:spMkLst>
+            <pc:docMk/>
+            <pc:sldMk cId="2078495021" sldId="259"/>
+            <ac:spMk id="4" creationId="{BBA13038-CAB8-FCA0-CDE8-65E40C2F10A3}"/>
+          </ac:spMkLst>
+        </pc:spChg>
+      </pc:sldChg>
+      <pc:sldChg chg="addSp modSp add mod modAnim">
+        <pc:chgData name="Dinh Vinh Mai" userId="b8e4a559-41e0-4141-8dc1-330451d69615" providerId="ADAL" clId="{9AF12651-E492-4749-A948-8FB040B70964}" dt="2024-07-11T08:44:30.109" v="6044" actId="14100"/>
+        <pc:sldMkLst>
+          <pc:docMk/>
+          <pc:sldMk cId="114777668" sldId="260"/>
+        </pc:sldMkLst>
+        <pc:spChg chg="mod">
+          <ac:chgData name="Dinh Vinh Mai" userId="b8e4a559-41e0-4141-8dc1-330451d69615" providerId="ADAL" clId="{9AF12651-E492-4749-A948-8FB040B70964}" dt="2024-07-11T08:33:51.742" v="5824" actId="1076"/>
+          <ac:spMkLst>
+            <pc:docMk/>
+            <pc:sldMk cId="114777668" sldId="260"/>
+            <ac:spMk id="3" creationId="{96DD8BC4-D539-661E-8A88-53AF6C208F93}"/>
+          </ac:spMkLst>
+        </pc:spChg>
+        <pc:spChg chg="mod">
+          <ac:chgData name="Dinh Vinh Mai" userId="b8e4a559-41e0-4141-8dc1-330451d69615" providerId="ADAL" clId="{9AF12651-E492-4749-A948-8FB040B70964}" dt="2024-07-11T08:32:24.252" v="5814" actId="20577"/>
+          <ac:spMkLst>
+            <pc:docMk/>
+            <pc:sldMk cId="114777668" sldId="260"/>
+            <ac:spMk id="4" creationId="{BBA13038-CAB8-FCA0-CDE8-65E40C2F10A3}"/>
+          </ac:spMkLst>
+        </pc:spChg>
+        <pc:spChg chg="add mod">
+          <ac:chgData name="Dinh Vinh Mai" userId="b8e4a559-41e0-4141-8dc1-330451d69615" providerId="ADAL" clId="{9AF12651-E492-4749-A948-8FB040B70964}" dt="2024-07-11T08:44:24.609" v="6040" actId="14100"/>
+          <ac:spMkLst>
+            <pc:docMk/>
+            <pc:sldMk cId="114777668" sldId="260"/>
+            <ac:spMk id="6" creationId="{4914E028-BBB3-509D-27BD-0D7E14D586F4}"/>
+          </ac:spMkLst>
+        </pc:spChg>
+        <pc:picChg chg="add mod">
+          <ac:chgData name="Dinh Vinh Mai" userId="b8e4a559-41e0-4141-8dc1-330451d69615" providerId="ADAL" clId="{9AF12651-E492-4749-A948-8FB040B70964}" dt="2024-07-11T08:44:30.109" v="6044" actId="14100"/>
+          <ac:picMkLst>
+            <pc:docMk/>
+            <pc:sldMk cId="114777668" sldId="260"/>
+            <ac:picMk id="5" creationId="{85C0B44A-39CB-36E8-9FE5-05418ECC25C9}"/>
+          </ac:picMkLst>
+        </pc:picChg>
+      </pc:sldChg>
+      <pc:sldChg chg="del">
+        <pc:chgData name="Dinh Vinh Mai" userId="b8e4a559-41e0-4141-8dc1-330451d69615" providerId="ADAL" clId="{9AF12651-E492-4749-A948-8FB040B70964}" dt="2024-07-11T01:41:42.792" v="0" actId="47"/>
+        <pc:sldMkLst>
+          <pc:docMk/>
+          <pc:sldMk cId="1028437802" sldId="260"/>
+        </pc:sldMkLst>
+      </pc:sldChg>
+      <pc:sldChg chg="del">
+        <pc:chgData name="Dinh Vinh Mai" userId="b8e4a559-41e0-4141-8dc1-330451d69615" providerId="ADAL" clId="{9AF12651-E492-4749-A948-8FB040B70964}" dt="2024-07-11T01:41:42.792" v="0" actId="47"/>
+        <pc:sldMkLst>
+          <pc:docMk/>
+          <pc:sldMk cId="315264614" sldId="261"/>
+        </pc:sldMkLst>
+      </pc:sldChg>
+      <pc:sldChg chg="addSp delSp modSp add mod">
+        <pc:chgData name="Dinh Vinh Mai" userId="b8e4a559-41e0-4141-8dc1-330451d69615" providerId="ADAL" clId="{9AF12651-E492-4749-A948-8FB040B70964}" dt="2024-07-11T08:56:12.775" v="7015" actId="5793"/>
+        <pc:sldMkLst>
+          <pc:docMk/>
+          <pc:sldMk cId="646613574" sldId="261"/>
+        </pc:sldMkLst>
+        <pc:spChg chg="mod">
+          <ac:chgData name="Dinh Vinh Mai" userId="b8e4a559-41e0-4141-8dc1-330451d69615" providerId="ADAL" clId="{9AF12651-E492-4749-A948-8FB040B70964}" dt="2024-07-11T08:56:12.775" v="7015" actId="5793"/>
+          <ac:spMkLst>
+            <pc:docMk/>
+            <pc:sldMk cId="646613574" sldId="261"/>
+            <ac:spMk id="6" creationId="{4914E028-BBB3-509D-27BD-0D7E14D586F4}"/>
+          </ac:spMkLst>
+        </pc:spChg>
+        <pc:picChg chg="del">
+          <ac:chgData name="Dinh Vinh Mai" userId="b8e4a559-41e0-4141-8dc1-330451d69615" providerId="ADAL" clId="{9AF12651-E492-4749-A948-8FB040B70964}" dt="2024-07-11T08:44:57.780" v="6049" actId="478"/>
+          <ac:picMkLst>
+            <pc:docMk/>
+            <pc:sldMk cId="646613574" sldId="261"/>
+            <ac:picMk id="5" creationId="{85C0B44A-39CB-36E8-9FE5-05418ECC25C9}"/>
+          </ac:picMkLst>
+        </pc:picChg>
+        <pc:picChg chg="add mod">
+          <ac:chgData name="Dinh Vinh Mai" userId="b8e4a559-41e0-4141-8dc1-330451d69615" providerId="ADAL" clId="{9AF12651-E492-4749-A948-8FB040B70964}" dt="2024-07-11T08:45:06.295" v="6054" actId="1076"/>
+          <ac:picMkLst>
+            <pc:docMk/>
+            <pc:sldMk cId="646613574" sldId="261"/>
+            <ac:picMk id="7" creationId="{DEB481D6-5356-0DD2-3F6F-3A03A44D641A}"/>
+          </ac:picMkLst>
+        </pc:picChg>
+      </pc:sldChg>
+      <pc:sldChg chg="del">
+        <pc:chgData name="Dinh Vinh Mai" userId="b8e4a559-41e0-4141-8dc1-330451d69615" providerId="ADAL" clId="{9AF12651-E492-4749-A948-8FB040B70964}" dt="2024-07-11T01:41:42.792" v="0" actId="47"/>
+        <pc:sldMkLst>
+          <pc:docMk/>
+          <pc:sldMk cId="2377540471" sldId="262"/>
+        </pc:sldMkLst>
+      </pc:sldChg>
+      <pc:sldChg chg="addSp modSp add mod ord modAnim">
+        <pc:chgData name="Dinh Vinh Mai" userId="b8e4a559-41e0-4141-8dc1-330451d69615" providerId="ADAL" clId="{9AF12651-E492-4749-A948-8FB040B70964}" dt="2024-07-11T22:49:23.115" v="11711" actId="20577"/>
+        <pc:sldMkLst>
+          <pc:docMk/>
+          <pc:sldMk cId="2729605296" sldId="262"/>
+        </pc:sldMkLst>
+        <pc:spChg chg="add mod">
+          <ac:chgData name="Dinh Vinh Mai" userId="b8e4a559-41e0-4141-8dc1-330451d69615" providerId="ADAL" clId="{9AF12651-E492-4749-A948-8FB040B70964}" dt="2024-07-11T22:49:23.115" v="11711" actId="20577"/>
+          <ac:spMkLst>
+            <pc:docMk/>
+            <pc:sldMk cId="2729605296" sldId="262"/>
+            <ac:spMk id="2" creationId="{98D47709-0A78-AACC-5CCE-FD59A7D17E27}"/>
+          </ac:spMkLst>
+        </pc:spChg>
+        <pc:spChg chg="mod">
+          <ac:chgData name="Dinh Vinh Mai" userId="b8e4a559-41e0-4141-8dc1-330451d69615" providerId="ADAL" clId="{9AF12651-E492-4749-A948-8FB040B70964}" dt="2024-07-11T09:05:22.824" v="7310" actId="20577"/>
+          <ac:spMkLst>
+            <pc:docMk/>
+            <pc:sldMk cId="2729605296" sldId="262"/>
+            <ac:spMk id="3" creationId="{96DD8BC4-D539-661E-8A88-53AF6C208F93}"/>
+          </ac:spMkLst>
+        </pc:spChg>
+        <pc:spChg chg="mod">
+          <ac:chgData name="Dinh Vinh Mai" userId="b8e4a559-41e0-4141-8dc1-330451d69615" providerId="ADAL" clId="{9AF12651-E492-4749-A948-8FB040B70964}" dt="2024-07-11T09:05:04.583" v="7283" actId="20577"/>
+          <ac:spMkLst>
+            <pc:docMk/>
+            <pc:sldMk cId="2729605296" sldId="262"/>
+            <ac:spMk id="4" creationId="{BBA13038-CAB8-FCA0-CDE8-65E40C2F10A3}"/>
+          </ac:spMkLst>
+        </pc:spChg>
+      </pc:sldChg>
+      <pc:sldChg chg="del">
+        <pc:chgData name="Dinh Vinh Mai" userId="b8e4a559-41e0-4141-8dc1-330451d69615" providerId="ADAL" clId="{9AF12651-E492-4749-A948-8FB040B70964}" dt="2024-07-11T01:41:42.792" v="0" actId="47"/>
+        <pc:sldMkLst>
+          <pc:docMk/>
+          <pc:sldMk cId="1501040282" sldId="263"/>
+        </pc:sldMkLst>
+      </pc:sldChg>
+      <pc:sldChg chg="add ord">
+        <pc:chgData name="Dinh Vinh Mai" userId="b8e4a559-41e0-4141-8dc1-330451d69615" providerId="ADAL" clId="{9AF12651-E492-4749-A948-8FB040B70964}" dt="2024-07-11T22:49:33.159" v="11713"/>
+        <pc:sldMkLst>
+          <pc:docMk/>
+          <pc:sldMk cId="2236708295" sldId="263"/>
+        </pc:sldMkLst>
+      </pc:sldChg>
+      <pc:sldChg chg="add del ord">
+        <pc:chgData name="Dinh Vinh Mai" userId="b8e4a559-41e0-4141-8dc1-330451d69615" providerId="ADAL" clId="{9AF12651-E492-4749-A948-8FB040B70964}" dt="2024-07-11T09:05:35.894" v="7314" actId="47"/>
+        <pc:sldMkLst>
+          <pc:docMk/>
+          <pc:sldMk cId="2960663922" sldId="263"/>
+        </pc:sldMkLst>
+      </pc:sldChg>
+      <pc:sldChg chg="modSp add modAnim">
+        <pc:chgData name="Dinh Vinh Mai" userId="b8e4a559-41e0-4141-8dc1-330451d69615" providerId="ADAL" clId="{9AF12651-E492-4749-A948-8FB040B70964}" dt="2024-07-11T23:16:27.961" v="14529" actId="207"/>
+        <pc:sldMkLst>
+          <pc:docMk/>
+          <pc:sldMk cId="193709571" sldId="264"/>
+        </pc:sldMkLst>
+        <pc:spChg chg="mod">
+          <ac:chgData name="Dinh Vinh Mai" userId="b8e4a559-41e0-4141-8dc1-330451d69615" providerId="ADAL" clId="{9AF12651-E492-4749-A948-8FB040B70964}" dt="2024-07-11T23:16:27.961" v="14529" actId="207"/>
+          <ac:spMkLst>
+            <pc:docMk/>
+            <pc:sldMk cId="193709571" sldId="264"/>
+            <ac:spMk id="2" creationId="{98D47709-0A78-AACC-5CCE-FD59A7D17E27}"/>
+          </ac:spMkLst>
+        </pc:spChg>
+      </pc:sldChg>
+      <pc:sldChg chg="del">
+        <pc:chgData name="Dinh Vinh Mai" userId="b8e4a559-41e0-4141-8dc1-330451d69615" providerId="ADAL" clId="{9AF12651-E492-4749-A948-8FB040B70964}" dt="2024-07-11T01:41:42.792" v="0" actId="47"/>
+        <pc:sldMkLst>
+          <pc:docMk/>
+          <pc:sldMk cId="364621379" sldId="264"/>
+        </pc:sldMkLst>
+      </pc:sldChg>
+      <pc:sldChg chg="modSp add mod modAnim">
+        <pc:chgData name="Dinh Vinh Mai" userId="b8e4a559-41e0-4141-8dc1-330451d69615" providerId="ADAL" clId="{9AF12651-E492-4749-A948-8FB040B70964}" dt="2024-07-11T23:31:06.508" v="15304" actId="20577"/>
+        <pc:sldMkLst>
+          <pc:docMk/>
+          <pc:sldMk cId="3978505155" sldId="265"/>
+        </pc:sldMkLst>
+        <pc:spChg chg="mod">
+          <ac:chgData name="Dinh Vinh Mai" userId="b8e4a559-41e0-4141-8dc1-330451d69615" providerId="ADAL" clId="{9AF12651-E492-4749-A948-8FB040B70964}" dt="2024-07-11T23:31:06.508" v="15304" actId="20577"/>
+          <ac:spMkLst>
+            <pc:docMk/>
+            <pc:sldMk cId="3978505155" sldId="265"/>
+            <ac:spMk id="2" creationId="{98D47709-0A78-AACC-5CCE-FD59A7D17E27}"/>
+          </ac:spMkLst>
+        </pc:spChg>
+        <pc:spChg chg="mod">
+          <ac:chgData name="Dinh Vinh Mai" userId="b8e4a559-41e0-4141-8dc1-330451d69615" providerId="ADAL" clId="{9AF12651-E492-4749-A948-8FB040B70964}" dt="2024-07-11T23:21:20.391" v="14574" actId="20577"/>
+          <ac:spMkLst>
+            <pc:docMk/>
+            <pc:sldMk cId="3978505155" sldId="265"/>
+            <ac:spMk id="3" creationId="{96DD8BC4-D539-661E-8A88-53AF6C208F93}"/>
+          </ac:spMkLst>
+        </pc:spChg>
       </pc:sldChg>
     </pc:docChg>
   </pc:docChgLst>
@@ -1231,315 +1544,6 @@
       </pc:sldChg>
     </pc:docChg>
   </pc:docChgLst>
-  <pc:docChgLst>
-    <pc:chgData name="Dinh Vinh Mai" userId="b8e4a559-41e0-4141-8dc1-330451d69615" providerId="ADAL" clId="{9AF12651-E492-4749-A948-8FB040B70964}"/>
-    <pc:docChg chg="undo custSel addSld delSld modSld sldOrd addSection delSection modSection">
-      <pc:chgData name="Dinh Vinh Mai" userId="b8e4a559-41e0-4141-8dc1-330451d69615" providerId="ADAL" clId="{9AF12651-E492-4749-A948-8FB040B70964}" dt="2024-07-11T23:31:06.508" v="15304" actId="20577"/>
-      <pc:docMkLst>
-        <pc:docMk/>
-      </pc:docMkLst>
-      <pc:sldChg chg="del">
-        <pc:chgData name="Dinh Vinh Mai" userId="b8e4a559-41e0-4141-8dc1-330451d69615" providerId="ADAL" clId="{9AF12651-E492-4749-A948-8FB040B70964}" dt="2024-07-11T01:41:42.792" v="0" actId="47"/>
-        <pc:sldMkLst>
-          <pc:docMk/>
-          <pc:sldMk cId="217268900" sldId="256"/>
-        </pc:sldMkLst>
-      </pc:sldChg>
-      <pc:sldChg chg="modSp new mod">
-        <pc:chgData name="Dinh Vinh Mai" userId="b8e4a559-41e0-4141-8dc1-330451d69615" providerId="ADAL" clId="{9AF12651-E492-4749-A948-8FB040B70964}" dt="2024-07-11T01:42:31.374" v="77" actId="20577"/>
-        <pc:sldMkLst>
-          <pc:docMk/>
-          <pc:sldMk cId="2437323191" sldId="256"/>
-        </pc:sldMkLst>
-        <pc:spChg chg="mod">
-          <ac:chgData name="Dinh Vinh Mai" userId="b8e4a559-41e0-4141-8dc1-330451d69615" providerId="ADAL" clId="{9AF12651-E492-4749-A948-8FB040B70964}" dt="2024-07-11T01:41:58.931" v="44" actId="20577"/>
-          <ac:spMkLst>
-            <pc:docMk/>
-            <pc:sldMk cId="2437323191" sldId="256"/>
-            <ac:spMk id="2" creationId="{5F432DBD-CB83-55BD-128C-2C66E47798F8}"/>
-          </ac:spMkLst>
-        </pc:spChg>
-        <pc:spChg chg="mod">
-          <ac:chgData name="Dinh Vinh Mai" userId="b8e4a559-41e0-4141-8dc1-330451d69615" providerId="ADAL" clId="{9AF12651-E492-4749-A948-8FB040B70964}" dt="2024-07-11T01:42:31.374" v="77" actId="20577"/>
-          <ac:spMkLst>
-            <pc:docMk/>
-            <pc:sldMk cId="2437323191" sldId="256"/>
-            <ac:spMk id="3" creationId="{96DD8BC4-D539-661E-8A88-53AF6C208F93}"/>
-          </ac:spMkLst>
-        </pc:spChg>
-      </pc:sldChg>
-      <pc:sldChg chg="addSp delSp modSp add del mod">
-        <pc:chgData name="Dinh Vinh Mai" userId="b8e4a559-41e0-4141-8dc1-330451d69615" providerId="ADAL" clId="{9AF12651-E492-4749-A948-8FB040B70964}" dt="2024-07-11T01:48:04.827" v="216" actId="47"/>
-        <pc:sldMkLst>
-          <pc:docMk/>
-          <pc:sldMk cId="1145363845" sldId="257"/>
-        </pc:sldMkLst>
-        <pc:spChg chg="del mod">
-          <ac:chgData name="Dinh Vinh Mai" userId="b8e4a559-41e0-4141-8dc1-330451d69615" providerId="ADAL" clId="{9AF12651-E492-4749-A948-8FB040B70964}" dt="2024-07-11T01:44:11.394" v="80" actId="478"/>
-          <ac:spMkLst>
-            <pc:docMk/>
-            <pc:sldMk cId="1145363845" sldId="257"/>
-            <ac:spMk id="2" creationId="{5F432DBD-CB83-55BD-128C-2C66E47798F8}"/>
-          </ac:spMkLst>
-        </pc:spChg>
-        <pc:spChg chg="mod">
-          <ac:chgData name="Dinh Vinh Mai" userId="b8e4a559-41e0-4141-8dc1-330451d69615" providerId="ADAL" clId="{9AF12651-E492-4749-A948-8FB040B70964}" dt="2024-07-11T01:46:05.600" v="116" actId="1076"/>
-          <ac:spMkLst>
-            <pc:docMk/>
-            <pc:sldMk cId="1145363845" sldId="257"/>
-            <ac:spMk id="3" creationId="{96DD8BC4-D539-661E-8A88-53AF6C208F93}"/>
-          </ac:spMkLst>
-        </pc:spChg>
-        <pc:spChg chg="add del mod">
-          <ac:chgData name="Dinh Vinh Mai" userId="b8e4a559-41e0-4141-8dc1-330451d69615" providerId="ADAL" clId="{9AF12651-E492-4749-A948-8FB040B70964}" dt="2024-07-11T01:47:56.554" v="215" actId="478"/>
-          <ac:spMkLst>
-            <pc:docMk/>
-            <pc:sldMk cId="1145363845" sldId="257"/>
-            <ac:spMk id="4" creationId="{BBA13038-CAB8-FCA0-CDE8-65E40C2F10A3}"/>
-          </ac:spMkLst>
-        </pc:spChg>
-      </pc:sldChg>
-      <pc:sldChg chg="del">
-        <pc:chgData name="Dinh Vinh Mai" userId="b8e4a559-41e0-4141-8dc1-330451d69615" providerId="ADAL" clId="{9AF12651-E492-4749-A948-8FB040B70964}" dt="2024-07-11T01:41:42.792" v="0" actId="47"/>
-        <pc:sldMkLst>
-          <pc:docMk/>
-          <pc:sldMk cId="3564134708" sldId="257"/>
-        </pc:sldMkLst>
-      </pc:sldChg>
-      <pc:sldChg chg="modSp add mod modAnim">
-        <pc:chgData name="Dinh Vinh Mai" userId="b8e4a559-41e0-4141-8dc1-330451d69615" providerId="ADAL" clId="{9AF12651-E492-4749-A948-8FB040B70964}" dt="2024-07-11T02:13:51.984" v="3027"/>
-        <pc:sldMkLst>
-          <pc:docMk/>
-          <pc:sldMk cId="715447292" sldId="258"/>
-        </pc:sldMkLst>
-        <pc:spChg chg="mod">
-          <ac:chgData name="Dinh Vinh Mai" userId="b8e4a559-41e0-4141-8dc1-330451d69615" providerId="ADAL" clId="{9AF12651-E492-4749-A948-8FB040B70964}" dt="2024-07-11T02:13:26.874" v="3021" actId="20577"/>
-          <ac:spMkLst>
-            <pc:docMk/>
-            <pc:sldMk cId="715447292" sldId="258"/>
-            <ac:spMk id="4" creationId="{BBA13038-CAB8-FCA0-CDE8-65E40C2F10A3}"/>
-          </ac:spMkLst>
-        </pc:spChg>
-      </pc:sldChg>
-      <pc:sldChg chg="del">
-        <pc:chgData name="Dinh Vinh Mai" userId="b8e4a559-41e0-4141-8dc1-330451d69615" providerId="ADAL" clId="{9AF12651-E492-4749-A948-8FB040B70964}" dt="2024-07-11T01:41:42.792" v="0" actId="47"/>
-        <pc:sldMkLst>
-          <pc:docMk/>
-          <pc:sldMk cId="1315607852" sldId="258"/>
-        </pc:sldMkLst>
-      </pc:sldChg>
-      <pc:sldChg chg="del">
-        <pc:chgData name="Dinh Vinh Mai" userId="b8e4a559-41e0-4141-8dc1-330451d69615" providerId="ADAL" clId="{9AF12651-E492-4749-A948-8FB040B70964}" dt="2024-07-11T01:41:42.792" v="0" actId="47"/>
-        <pc:sldMkLst>
-          <pc:docMk/>
-          <pc:sldMk cId="1400435694" sldId="259"/>
-        </pc:sldMkLst>
-      </pc:sldChg>
-      <pc:sldChg chg="modSp add modAnim">
-        <pc:chgData name="Dinh Vinh Mai" userId="b8e4a559-41e0-4141-8dc1-330451d69615" providerId="ADAL" clId="{9AF12651-E492-4749-A948-8FB040B70964}" dt="2024-07-11T08:30:39.020" v="5812"/>
-        <pc:sldMkLst>
-          <pc:docMk/>
-          <pc:sldMk cId="2078495021" sldId="259"/>
-        </pc:sldMkLst>
-        <pc:spChg chg="mod">
-          <ac:chgData name="Dinh Vinh Mai" userId="b8e4a559-41e0-4141-8dc1-330451d69615" providerId="ADAL" clId="{9AF12651-E492-4749-A948-8FB040B70964}" dt="2024-07-11T08:30:19.371" v="5808" actId="20577"/>
-          <ac:spMkLst>
-            <pc:docMk/>
-            <pc:sldMk cId="2078495021" sldId="259"/>
-            <ac:spMk id="4" creationId="{BBA13038-CAB8-FCA0-CDE8-65E40C2F10A3}"/>
-          </ac:spMkLst>
-        </pc:spChg>
-      </pc:sldChg>
-      <pc:sldChg chg="addSp modSp add mod modAnim">
-        <pc:chgData name="Dinh Vinh Mai" userId="b8e4a559-41e0-4141-8dc1-330451d69615" providerId="ADAL" clId="{9AF12651-E492-4749-A948-8FB040B70964}" dt="2024-07-11T08:44:30.109" v="6044" actId="14100"/>
-        <pc:sldMkLst>
-          <pc:docMk/>
-          <pc:sldMk cId="114777668" sldId="260"/>
-        </pc:sldMkLst>
-        <pc:spChg chg="mod">
-          <ac:chgData name="Dinh Vinh Mai" userId="b8e4a559-41e0-4141-8dc1-330451d69615" providerId="ADAL" clId="{9AF12651-E492-4749-A948-8FB040B70964}" dt="2024-07-11T08:33:51.742" v="5824" actId="1076"/>
-          <ac:spMkLst>
-            <pc:docMk/>
-            <pc:sldMk cId="114777668" sldId="260"/>
-            <ac:spMk id="3" creationId="{96DD8BC4-D539-661E-8A88-53AF6C208F93}"/>
-          </ac:spMkLst>
-        </pc:spChg>
-        <pc:spChg chg="mod">
-          <ac:chgData name="Dinh Vinh Mai" userId="b8e4a559-41e0-4141-8dc1-330451d69615" providerId="ADAL" clId="{9AF12651-E492-4749-A948-8FB040B70964}" dt="2024-07-11T08:32:24.252" v="5814" actId="20577"/>
-          <ac:spMkLst>
-            <pc:docMk/>
-            <pc:sldMk cId="114777668" sldId="260"/>
-            <ac:spMk id="4" creationId="{BBA13038-CAB8-FCA0-CDE8-65E40C2F10A3}"/>
-          </ac:spMkLst>
-        </pc:spChg>
-        <pc:spChg chg="add mod">
-          <ac:chgData name="Dinh Vinh Mai" userId="b8e4a559-41e0-4141-8dc1-330451d69615" providerId="ADAL" clId="{9AF12651-E492-4749-A948-8FB040B70964}" dt="2024-07-11T08:44:24.609" v="6040" actId="14100"/>
-          <ac:spMkLst>
-            <pc:docMk/>
-            <pc:sldMk cId="114777668" sldId="260"/>
-            <ac:spMk id="6" creationId="{4914E028-BBB3-509D-27BD-0D7E14D586F4}"/>
-          </ac:spMkLst>
-        </pc:spChg>
-        <pc:picChg chg="add mod">
-          <ac:chgData name="Dinh Vinh Mai" userId="b8e4a559-41e0-4141-8dc1-330451d69615" providerId="ADAL" clId="{9AF12651-E492-4749-A948-8FB040B70964}" dt="2024-07-11T08:44:30.109" v="6044" actId="14100"/>
-          <ac:picMkLst>
-            <pc:docMk/>
-            <pc:sldMk cId="114777668" sldId="260"/>
-            <ac:picMk id="5" creationId="{85C0B44A-39CB-36E8-9FE5-05418ECC25C9}"/>
-          </ac:picMkLst>
-        </pc:picChg>
-      </pc:sldChg>
-      <pc:sldChg chg="del">
-        <pc:chgData name="Dinh Vinh Mai" userId="b8e4a559-41e0-4141-8dc1-330451d69615" providerId="ADAL" clId="{9AF12651-E492-4749-A948-8FB040B70964}" dt="2024-07-11T01:41:42.792" v="0" actId="47"/>
-        <pc:sldMkLst>
-          <pc:docMk/>
-          <pc:sldMk cId="1028437802" sldId="260"/>
-        </pc:sldMkLst>
-      </pc:sldChg>
-      <pc:sldChg chg="del">
-        <pc:chgData name="Dinh Vinh Mai" userId="b8e4a559-41e0-4141-8dc1-330451d69615" providerId="ADAL" clId="{9AF12651-E492-4749-A948-8FB040B70964}" dt="2024-07-11T01:41:42.792" v="0" actId="47"/>
-        <pc:sldMkLst>
-          <pc:docMk/>
-          <pc:sldMk cId="315264614" sldId="261"/>
-        </pc:sldMkLst>
-      </pc:sldChg>
-      <pc:sldChg chg="addSp delSp modSp add mod">
-        <pc:chgData name="Dinh Vinh Mai" userId="b8e4a559-41e0-4141-8dc1-330451d69615" providerId="ADAL" clId="{9AF12651-E492-4749-A948-8FB040B70964}" dt="2024-07-11T08:56:12.775" v="7015" actId="5793"/>
-        <pc:sldMkLst>
-          <pc:docMk/>
-          <pc:sldMk cId="646613574" sldId="261"/>
-        </pc:sldMkLst>
-        <pc:spChg chg="mod">
-          <ac:chgData name="Dinh Vinh Mai" userId="b8e4a559-41e0-4141-8dc1-330451d69615" providerId="ADAL" clId="{9AF12651-E492-4749-A948-8FB040B70964}" dt="2024-07-11T08:56:12.775" v="7015" actId="5793"/>
-          <ac:spMkLst>
-            <pc:docMk/>
-            <pc:sldMk cId="646613574" sldId="261"/>
-            <ac:spMk id="6" creationId="{4914E028-BBB3-509D-27BD-0D7E14D586F4}"/>
-          </ac:spMkLst>
-        </pc:spChg>
-        <pc:picChg chg="del">
-          <ac:chgData name="Dinh Vinh Mai" userId="b8e4a559-41e0-4141-8dc1-330451d69615" providerId="ADAL" clId="{9AF12651-E492-4749-A948-8FB040B70964}" dt="2024-07-11T08:44:57.780" v="6049" actId="478"/>
-          <ac:picMkLst>
-            <pc:docMk/>
-            <pc:sldMk cId="646613574" sldId="261"/>
-            <ac:picMk id="5" creationId="{85C0B44A-39CB-36E8-9FE5-05418ECC25C9}"/>
-          </ac:picMkLst>
-        </pc:picChg>
-        <pc:picChg chg="add mod">
-          <ac:chgData name="Dinh Vinh Mai" userId="b8e4a559-41e0-4141-8dc1-330451d69615" providerId="ADAL" clId="{9AF12651-E492-4749-A948-8FB040B70964}" dt="2024-07-11T08:45:06.295" v="6054" actId="1076"/>
-          <ac:picMkLst>
-            <pc:docMk/>
-            <pc:sldMk cId="646613574" sldId="261"/>
-            <ac:picMk id="7" creationId="{DEB481D6-5356-0DD2-3F6F-3A03A44D641A}"/>
-          </ac:picMkLst>
-        </pc:picChg>
-      </pc:sldChg>
-      <pc:sldChg chg="del">
-        <pc:chgData name="Dinh Vinh Mai" userId="b8e4a559-41e0-4141-8dc1-330451d69615" providerId="ADAL" clId="{9AF12651-E492-4749-A948-8FB040B70964}" dt="2024-07-11T01:41:42.792" v="0" actId="47"/>
-        <pc:sldMkLst>
-          <pc:docMk/>
-          <pc:sldMk cId="2377540471" sldId="262"/>
-        </pc:sldMkLst>
-      </pc:sldChg>
-      <pc:sldChg chg="addSp modSp add mod ord modAnim">
-        <pc:chgData name="Dinh Vinh Mai" userId="b8e4a559-41e0-4141-8dc1-330451d69615" providerId="ADAL" clId="{9AF12651-E492-4749-A948-8FB040B70964}" dt="2024-07-11T22:49:23.115" v="11711" actId="20577"/>
-        <pc:sldMkLst>
-          <pc:docMk/>
-          <pc:sldMk cId="2729605296" sldId="262"/>
-        </pc:sldMkLst>
-        <pc:spChg chg="add mod">
-          <ac:chgData name="Dinh Vinh Mai" userId="b8e4a559-41e0-4141-8dc1-330451d69615" providerId="ADAL" clId="{9AF12651-E492-4749-A948-8FB040B70964}" dt="2024-07-11T22:49:23.115" v="11711" actId="20577"/>
-          <ac:spMkLst>
-            <pc:docMk/>
-            <pc:sldMk cId="2729605296" sldId="262"/>
-            <ac:spMk id="2" creationId="{98D47709-0A78-AACC-5CCE-FD59A7D17E27}"/>
-          </ac:spMkLst>
-        </pc:spChg>
-        <pc:spChg chg="mod">
-          <ac:chgData name="Dinh Vinh Mai" userId="b8e4a559-41e0-4141-8dc1-330451d69615" providerId="ADAL" clId="{9AF12651-E492-4749-A948-8FB040B70964}" dt="2024-07-11T09:05:22.824" v="7310" actId="20577"/>
-          <ac:spMkLst>
-            <pc:docMk/>
-            <pc:sldMk cId="2729605296" sldId="262"/>
-            <ac:spMk id="3" creationId="{96DD8BC4-D539-661E-8A88-53AF6C208F93}"/>
-          </ac:spMkLst>
-        </pc:spChg>
-        <pc:spChg chg="mod">
-          <ac:chgData name="Dinh Vinh Mai" userId="b8e4a559-41e0-4141-8dc1-330451d69615" providerId="ADAL" clId="{9AF12651-E492-4749-A948-8FB040B70964}" dt="2024-07-11T09:05:04.583" v="7283" actId="20577"/>
-          <ac:spMkLst>
-            <pc:docMk/>
-            <pc:sldMk cId="2729605296" sldId="262"/>
-            <ac:spMk id="4" creationId="{BBA13038-CAB8-FCA0-CDE8-65E40C2F10A3}"/>
-          </ac:spMkLst>
-        </pc:spChg>
-      </pc:sldChg>
-      <pc:sldChg chg="del">
-        <pc:chgData name="Dinh Vinh Mai" userId="b8e4a559-41e0-4141-8dc1-330451d69615" providerId="ADAL" clId="{9AF12651-E492-4749-A948-8FB040B70964}" dt="2024-07-11T01:41:42.792" v="0" actId="47"/>
-        <pc:sldMkLst>
-          <pc:docMk/>
-          <pc:sldMk cId="1501040282" sldId="263"/>
-        </pc:sldMkLst>
-      </pc:sldChg>
-      <pc:sldChg chg="add ord">
-        <pc:chgData name="Dinh Vinh Mai" userId="b8e4a559-41e0-4141-8dc1-330451d69615" providerId="ADAL" clId="{9AF12651-E492-4749-A948-8FB040B70964}" dt="2024-07-11T22:49:33.159" v="11713"/>
-        <pc:sldMkLst>
-          <pc:docMk/>
-          <pc:sldMk cId="2236708295" sldId="263"/>
-        </pc:sldMkLst>
-      </pc:sldChg>
-      <pc:sldChg chg="add del ord">
-        <pc:chgData name="Dinh Vinh Mai" userId="b8e4a559-41e0-4141-8dc1-330451d69615" providerId="ADAL" clId="{9AF12651-E492-4749-A948-8FB040B70964}" dt="2024-07-11T09:05:35.894" v="7314" actId="47"/>
-        <pc:sldMkLst>
-          <pc:docMk/>
-          <pc:sldMk cId="2960663922" sldId="263"/>
-        </pc:sldMkLst>
-      </pc:sldChg>
-      <pc:sldChg chg="modSp add modAnim">
-        <pc:chgData name="Dinh Vinh Mai" userId="b8e4a559-41e0-4141-8dc1-330451d69615" providerId="ADAL" clId="{9AF12651-E492-4749-A948-8FB040B70964}" dt="2024-07-11T23:16:27.961" v="14529" actId="207"/>
-        <pc:sldMkLst>
-          <pc:docMk/>
-          <pc:sldMk cId="193709571" sldId="264"/>
-        </pc:sldMkLst>
-        <pc:spChg chg="mod">
-          <ac:chgData name="Dinh Vinh Mai" userId="b8e4a559-41e0-4141-8dc1-330451d69615" providerId="ADAL" clId="{9AF12651-E492-4749-A948-8FB040B70964}" dt="2024-07-11T23:16:27.961" v="14529" actId="207"/>
-          <ac:spMkLst>
-            <pc:docMk/>
-            <pc:sldMk cId="193709571" sldId="264"/>
-            <ac:spMk id="2" creationId="{98D47709-0A78-AACC-5CCE-FD59A7D17E27}"/>
-          </ac:spMkLst>
-        </pc:spChg>
-      </pc:sldChg>
-      <pc:sldChg chg="del">
-        <pc:chgData name="Dinh Vinh Mai" userId="b8e4a559-41e0-4141-8dc1-330451d69615" providerId="ADAL" clId="{9AF12651-E492-4749-A948-8FB040B70964}" dt="2024-07-11T01:41:42.792" v="0" actId="47"/>
-        <pc:sldMkLst>
-          <pc:docMk/>
-          <pc:sldMk cId="364621379" sldId="264"/>
-        </pc:sldMkLst>
-      </pc:sldChg>
-      <pc:sldChg chg="modSp add mod modAnim">
-        <pc:chgData name="Dinh Vinh Mai" userId="b8e4a559-41e0-4141-8dc1-330451d69615" providerId="ADAL" clId="{9AF12651-E492-4749-A948-8FB040B70964}" dt="2024-07-11T23:31:06.508" v="15304" actId="20577"/>
-        <pc:sldMkLst>
-          <pc:docMk/>
-          <pc:sldMk cId="3978505155" sldId="265"/>
-        </pc:sldMkLst>
-        <pc:spChg chg="mod">
-          <ac:chgData name="Dinh Vinh Mai" userId="b8e4a559-41e0-4141-8dc1-330451d69615" providerId="ADAL" clId="{9AF12651-E492-4749-A948-8FB040B70964}" dt="2024-07-11T23:31:06.508" v="15304" actId="20577"/>
-          <ac:spMkLst>
-            <pc:docMk/>
-            <pc:sldMk cId="3978505155" sldId="265"/>
-            <ac:spMk id="2" creationId="{98D47709-0A78-AACC-5CCE-FD59A7D17E27}"/>
-          </ac:spMkLst>
-        </pc:spChg>
-        <pc:spChg chg="mod">
-          <ac:chgData name="Dinh Vinh Mai" userId="b8e4a559-41e0-4141-8dc1-330451d69615" providerId="ADAL" clId="{9AF12651-E492-4749-A948-8FB040B70964}" dt="2024-07-11T23:21:20.391" v="14574" actId="20577"/>
-          <ac:spMkLst>
-            <pc:docMk/>
-            <pc:sldMk cId="3978505155" sldId="265"/>
-            <ac:spMk id="3" creationId="{96DD8BC4-D539-661E-8A88-53AF6C208F93}"/>
-          </ac:spMkLst>
-        </pc:spChg>
-      </pc:sldChg>
-    </pc:docChg>
-  </pc:docChgLst>
 </pc:chgInfo>
 </file>
 
@@ -1690,7 +1694,7 @@
           <a:p>
             <a:fld id="{BAA8DE05-51EE-4692-B197-877FA1DAAAED}" type="datetimeFigureOut">
               <a:rPr lang="en-US" smtClean="0"/>
-              <a:t>8/13/24</a:t>
+              <a:t>8/14/24</a:t>
             </a:fld>
             <a:endParaRPr lang="en-US"/>
           </a:p>
@@ -1888,7 +1892,7 @@
           <a:p>
             <a:fld id="{BAA8DE05-51EE-4692-B197-877FA1DAAAED}" type="datetimeFigureOut">
               <a:rPr lang="en-US" smtClean="0"/>
-              <a:t>8/13/24</a:t>
+              <a:t>8/14/24</a:t>
             </a:fld>
             <a:endParaRPr lang="en-US"/>
           </a:p>
@@ -2096,7 +2100,7 @@
           <a:p>
             <a:fld id="{BAA8DE05-51EE-4692-B197-877FA1DAAAED}" type="datetimeFigureOut">
               <a:rPr lang="en-US" smtClean="0"/>
-              <a:t>8/13/24</a:t>
+              <a:t>8/14/24</a:t>
             </a:fld>
             <a:endParaRPr lang="en-US"/>
           </a:p>
@@ -2294,7 +2298,7 @@
           <a:p>
             <a:fld id="{BAA8DE05-51EE-4692-B197-877FA1DAAAED}" type="datetimeFigureOut">
               <a:rPr lang="en-US" smtClean="0"/>
-              <a:t>8/13/24</a:t>
+              <a:t>8/14/24</a:t>
             </a:fld>
             <a:endParaRPr lang="en-US"/>
           </a:p>
@@ -2569,7 +2573,7 @@
           <a:p>
             <a:fld id="{BAA8DE05-51EE-4692-B197-877FA1DAAAED}" type="datetimeFigureOut">
               <a:rPr lang="en-US" smtClean="0"/>
-              <a:t>8/13/24</a:t>
+              <a:t>8/14/24</a:t>
             </a:fld>
             <a:endParaRPr lang="en-US"/>
           </a:p>
@@ -2834,7 +2838,7 @@
           <a:p>
             <a:fld id="{BAA8DE05-51EE-4692-B197-877FA1DAAAED}" type="datetimeFigureOut">
               <a:rPr lang="en-US" smtClean="0"/>
-              <a:t>8/13/24</a:t>
+              <a:t>8/14/24</a:t>
             </a:fld>
             <a:endParaRPr lang="en-US"/>
           </a:p>
@@ -3246,7 +3250,7 @@
           <a:p>
             <a:fld id="{BAA8DE05-51EE-4692-B197-877FA1DAAAED}" type="datetimeFigureOut">
               <a:rPr lang="en-US" smtClean="0"/>
-              <a:t>8/13/24</a:t>
+              <a:t>8/14/24</a:t>
             </a:fld>
             <a:endParaRPr lang="en-US"/>
           </a:p>
@@ -3387,7 +3391,7 @@
           <a:p>
             <a:fld id="{BAA8DE05-51EE-4692-B197-877FA1DAAAED}" type="datetimeFigureOut">
               <a:rPr lang="en-US" smtClean="0"/>
-              <a:t>8/13/24</a:t>
+              <a:t>8/14/24</a:t>
             </a:fld>
             <a:endParaRPr lang="en-US"/>
           </a:p>
@@ -3500,7 +3504,7 @@
           <a:p>
             <a:fld id="{BAA8DE05-51EE-4692-B197-877FA1DAAAED}" type="datetimeFigureOut">
               <a:rPr lang="en-US" smtClean="0"/>
-              <a:t>8/13/24</a:t>
+              <a:t>8/14/24</a:t>
             </a:fld>
             <a:endParaRPr lang="en-US"/>
           </a:p>
@@ -3811,7 +3815,7 @@
           <a:p>
             <a:fld id="{BAA8DE05-51EE-4692-B197-877FA1DAAAED}" type="datetimeFigureOut">
               <a:rPr lang="en-US" smtClean="0"/>
-              <a:t>8/13/24</a:t>
+              <a:t>8/14/24</a:t>
             </a:fld>
             <a:endParaRPr lang="en-US"/>
           </a:p>
@@ -4099,7 +4103,7 @@
           <a:p>
             <a:fld id="{BAA8DE05-51EE-4692-B197-877FA1DAAAED}" type="datetimeFigureOut">
               <a:rPr lang="en-US" smtClean="0"/>
-              <a:t>8/13/24</a:t>
+              <a:t>8/14/24</a:t>
             </a:fld>
             <a:endParaRPr lang="en-US"/>
           </a:p>
@@ -4340,7 +4344,7 @@
           <a:p>
             <a:fld id="{BAA8DE05-51EE-4692-B197-877FA1DAAAED}" type="datetimeFigureOut">
               <a:rPr lang="en-US" smtClean="0"/>
-              <a:t>8/13/24</a:t>
+              <a:t>8/14/24</a:t>
             </a:fld>
             <a:endParaRPr lang="en-US"/>
           </a:p>
@@ -8132,6 +8136,1519 @@
         </p:nvSpPr>
         <p:spPr>
           <a:xfrm>
+            <a:off x="-2144486" y="304574"/>
+            <a:ext cx="14565083" cy="303212"/>
+          </a:xfrm>
+        </p:spPr>
+        <p:txBody>
+          <a:bodyPr>
+            <a:normAutofit fontScale="92500" lnSpcReduction="20000"/>
+          </a:bodyPr>
+          <a:lstStyle/>
+          <a:p>
+            <a:r>
+              <a:rPr lang="en-US" sz="1800" b="1" dirty="0"/>
+              <a:t>4.5 – Advanced Java Compilation and Execution </a:t>
+            </a:r>
+            <a:r>
+              <a:rPr lang="en-US" sz="1800" dirty="0"/>
+              <a:t>– 4.5.1 Compilation and Execution Involving Package</a:t>
+            </a:r>
+            <a:endParaRPr lang="en-US" sz="1800" b="1" dirty="0"/>
+          </a:p>
+        </p:txBody>
+      </p:sp>
+      <p:sp>
+        <p:nvSpPr>
+          <p:cNvPr id="4" name="Subtitle 2">
+            <a:extLst>
+              <a:ext uri="{FF2B5EF4-FFF2-40B4-BE49-F238E27FC236}">
+                <a16:creationId xmlns:a16="http://schemas.microsoft.com/office/drawing/2014/main" id="{BBA13038-CAB8-FCA0-CDE8-65E40C2F10A3}"/>
+              </a:ext>
+            </a:extLst>
+          </p:cNvPr>
+          <p:cNvSpPr txBox="1">
+            <a:spLocks/>
+          </p:cNvSpPr>
+          <p:nvPr/>
+        </p:nvSpPr>
+        <p:spPr>
+          <a:xfrm>
+            <a:off x="0" y="820738"/>
+            <a:ext cx="12192000" cy="6037262"/>
+          </a:xfrm>
+          <a:prstGeom prst="rect">
+            <a:avLst/>
+          </a:prstGeom>
+        </p:spPr>
+        <p:txBody>
+          <a:bodyPr vert="horz" lIns="91440" tIns="45720" rIns="91440" bIns="45720" rtlCol="0">
+            <a:normAutofit fontScale="92500" lnSpcReduction="10000"/>
+          </a:bodyPr>
+          <a:lstStyle>
+            <a:lvl1pPr marL="0" indent="0" algn="ctr" defTabSz="914400" rtl="0" eaLnBrk="1" latinLnBrk="0" hangingPunct="1">
+              <a:lnSpc>
+                <a:spcPct val="90000"/>
+              </a:lnSpc>
+              <a:spcBef>
+                <a:spcPts val="1000"/>
+              </a:spcBef>
+              <a:buFont typeface="Arial" panose="020B0604020202020204" pitchFamily="34" charset="0"/>
+              <a:buNone/>
+              <a:defRPr sz="2400" kern="1200">
+                <a:solidFill>
+                  <a:schemeClr val="tx1"/>
+                </a:solidFill>
+                <a:latin typeface="+mn-lt"/>
+                <a:ea typeface="+mn-ea"/>
+                <a:cs typeface="+mn-cs"/>
+              </a:defRPr>
+            </a:lvl1pPr>
+            <a:lvl2pPr marL="457200" indent="0" algn="ctr" defTabSz="914400" rtl="0" eaLnBrk="1" latinLnBrk="0" hangingPunct="1">
+              <a:lnSpc>
+                <a:spcPct val="90000"/>
+              </a:lnSpc>
+              <a:spcBef>
+                <a:spcPts val="500"/>
+              </a:spcBef>
+              <a:buFont typeface="Arial" panose="020B0604020202020204" pitchFamily="34" charset="0"/>
+              <a:buNone/>
+              <a:defRPr sz="2000" kern="1200">
+                <a:solidFill>
+                  <a:schemeClr val="tx1"/>
+                </a:solidFill>
+                <a:latin typeface="+mn-lt"/>
+                <a:ea typeface="+mn-ea"/>
+                <a:cs typeface="+mn-cs"/>
+              </a:defRPr>
+            </a:lvl2pPr>
+            <a:lvl3pPr marL="914400" indent="0" algn="ctr" defTabSz="914400" rtl="0" eaLnBrk="1" latinLnBrk="0" hangingPunct="1">
+              <a:lnSpc>
+                <a:spcPct val="90000"/>
+              </a:lnSpc>
+              <a:spcBef>
+                <a:spcPts val="500"/>
+              </a:spcBef>
+              <a:buFont typeface="Arial" panose="020B0604020202020204" pitchFamily="34" charset="0"/>
+              <a:buNone/>
+              <a:defRPr sz="1800" kern="1200">
+                <a:solidFill>
+                  <a:schemeClr val="tx1"/>
+                </a:solidFill>
+                <a:latin typeface="+mn-lt"/>
+                <a:ea typeface="+mn-ea"/>
+                <a:cs typeface="+mn-cs"/>
+              </a:defRPr>
+            </a:lvl3pPr>
+            <a:lvl4pPr marL="1371600" indent="0" algn="ctr" defTabSz="914400" rtl="0" eaLnBrk="1" latinLnBrk="0" hangingPunct="1">
+              <a:lnSpc>
+                <a:spcPct val="90000"/>
+              </a:lnSpc>
+              <a:spcBef>
+                <a:spcPts val="500"/>
+              </a:spcBef>
+              <a:buFont typeface="Arial" panose="020B0604020202020204" pitchFamily="34" charset="0"/>
+              <a:buNone/>
+              <a:defRPr sz="1600" kern="1200">
+                <a:solidFill>
+                  <a:schemeClr val="tx1"/>
+                </a:solidFill>
+                <a:latin typeface="+mn-lt"/>
+                <a:ea typeface="+mn-ea"/>
+                <a:cs typeface="+mn-cs"/>
+              </a:defRPr>
+            </a:lvl4pPr>
+            <a:lvl5pPr marL="1828800" indent="0" algn="ctr" defTabSz="914400" rtl="0" eaLnBrk="1" latinLnBrk="0" hangingPunct="1">
+              <a:lnSpc>
+                <a:spcPct val="90000"/>
+              </a:lnSpc>
+              <a:spcBef>
+                <a:spcPts val="500"/>
+              </a:spcBef>
+              <a:buFont typeface="Arial" panose="020B0604020202020204" pitchFamily="34" charset="0"/>
+              <a:buNone/>
+              <a:defRPr sz="1600" kern="1200">
+                <a:solidFill>
+                  <a:schemeClr val="tx1"/>
+                </a:solidFill>
+                <a:latin typeface="+mn-lt"/>
+                <a:ea typeface="+mn-ea"/>
+                <a:cs typeface="+mn-cs"/>
+              </a:defRPr>
+            </a:lvl5pPr>
+            <a:lvl6pPr marL="2286000" indent="0" algn="ctr" defTabSz="914400" rtl="0" eaLnBrk="1" latinLnBrk="0" hangingPunct="1">
+              <a:lnSpc>
+                <a:spcPct val="90000"/>
+              </a:lnSpc>
+              <a:spcBef>
+                <a:spcPts val="500"/>
+              </a:spcBef>
+              <a:buFont typeface="Arial" panose="020B0604020202020204" pitchFamily="34" charset="0"/>
+              <a:buNone/>
+              <a:defRPr sz="1600" kern="1200">
+                <a:solidFill>
+                  <a:schemeClr val="tx1"/>
+                </a:solidFill>
+                <a:latin typeface="+mn-lt"/>
+                <a:ea typeface="+mn-ea"/>
+                <a:cs typeface="+mn-cs"/>
+              </a:defRPr>
+            </a:lvl6pPr>
+            <a:lvl7pPr marL="2743200" indent="0" algn="ctr" defTabSz="914400" rtl="0" eaLnBrk="1" latinLnBrk="0" hangingPunct="1">
+              <a:lnSpc>
+                <a:spcPct val="90000"/>
+              </a:lnSpc>
+              <a:spcBef>
+                <a:spcPts val="500"/>
+              </a:spcBef>
+              <a:buFont typeface="Arial" panose="020B0604020202020204" pitchFamily="34" charset="0"/>
+              <a:buNone/>
+              <a:defRPr sz="1600" kern="1200">
+                <a:solidFill>
+                  <a:schemeClr val="tx1"/>
+                </a:solidFill>
+                <a:latin typeface="+mn-lt"/>
+                <a:ea typeface="+mn-ea"/>
+                <a:cs typeface="+mn-cs"/>
+              </a:defRPr>
+            </a:lvl7pPr>
+            <a:lvl8pPr marL="3200400" indent="0" algn="ctr" defTabSz="914400" rtl="0" eaLnBrk="1" latinLnBrk="0" hangingPunct="1">
+              <a:lnSpc>
+                <a:spcPct val="90000"/>
+              </a:lnSpc>
+              <a:spcBef>
+                <a:spcPts val="500"/>
+              </a:spcBef>
+              <a:buFont typeface="Arial" panose="020B0604020202020204" pitchFamily="34" charset="0"/>
+              <a:buNone/>
+              <a:defRPr sz="1600" kern="1200">
+                <a:solidFill>
+                  <a:schemeClr val="tx1"/>
+                </a:solidFill>
+                <a:latin typeface="+mn-lt"/>
+                <a:ea typeface="+mn-ea"/>
+                <a:cs typeface="+mn-cs"/>
+              </a:defRPr>
+            </a:lvl8pPr>
+            <a:lvl9pPr marL="3657600" indent="0" algn="ctr" defTabSz="914400" rtl="0" eaLnBrk="1" latinLnBrk="0" hangingPunct="1">
+              <a:lnSpc>
+                <a:spcPct val="90000"/>
+              </a:lnSpc>
+              <a:spcBef>
+                <a:spcPts val="500"/>
+              </a:spcBef>
+              <a:buFont typeface="Arial" panose="020B0604020202020204" pitchFamily="34" charset="0"/>
+              <a:buNone/>
+              <a:defRPr sz="1600" kern="1200">
+                <a:solidFill>
+                  <a:schemeClr val="tx1"/>
+                </a:solidFill>
+                <a:latin typeface="+mn-lt"/>
+                <a:ea typeface="+mn-ea"/>
+                <a:cs typeface="+mn-cs"/>
+              </a:defRPr>
+            </a:lvl9pPr>
+          </a:lstStyle>
+          <a:p>
+            <a:pPr algn="l"/>
+            <a:r>
+              <a:rPr lang="en-US" sz="1800" dirty="0"/>
+              <a:t>- In chapter 3, we studied how to compile and execute a Java program using “</a:t>
+            </a:r>
+            <a:r>
+              <a:rPr lang="en-US" sz="1800" dirty="0" err="1"/>
+              <a:t>javac</a:t>
+            </a:r>
+            <a:r>
+              <a:rPr lang="en-US" sz="1800" dirty="0"/>
+              <a:t>” command from command line. However, that was just a simple compilation/execution task irrelevant to the package statement. In this section, we will study how to compile/execute a Java program with package statement included</a:t>
+            </a:r>
+          </a:p>
+          <a:p>
+            <a:pPr algn="l"/>
+            <a:r>
+              <a:rPr lang="en-US" sz="1800" dirty="0"/>
+              <a:t>– (Code illustration)</a:t>
+            </a:r>
+          </a:p>
+          <a:p>
+            <a:pPr marL="285750" indent="-285750" algn="l">
+              <a:buFontTx/>
+              <a:buChar char="-"/>
+            </a:pPr>
+            <a:r>
+              <a:rPr lang="en-US" sz="1800" dirty="0"/>
+              <a:t>The reason why a Java program with a package statement can’t be compiled and run in traditional ways is that JVM is </a:t>
+            </a:r>
+            <a:r>
+              <a:rPr lang="en-US" sz="1800" b="1" i="1" dirty="0"/>
+              <a:t>“expected the CLASS file resides in the directory STRUCTURE that matches the package statement in the source file” </a:t>
+            </a:r>
+            <a:r>
+              <a:rPr lang="en-US" sz="1800" dirty="0"/>
+              <a:t>=&gt; Running a Java program in a directory that is different from the package statement resides in that source file is </a:t>
+            </a:r>
+            <a:r>
+              <a:rPr lang="en-US" sz="1800" b="1" dirty="0"/>
+              <a:t>IMPOSSIBLE </a:t>
+            </a:r>
+            <a:r>
+              <a:rPr lang="en-US" sz="1800" i="1" dirty="0"/>
+              <a:t>(This is one of the reason why </a:t>
+            </a:r>
+            <a:r>
+              <a:rPr lang="en-US" sz="1800" i="1" dirty="0" err="1"/>
+              <a:t>inteliJ</a:t>
+            </a:r>
+            <a:r>
+              <a:rPr lang="en-US" sz="1800" i="1" dirty="0"/>
+              <a:t> has created the same version of “</a:t>
+            </a:r>
+            <a:r>
+              <a:rPr lang="en-US" sz="1800" i="1" dirty="0" err="1"/>
+              <a:t>src</a:t>
+            </a:r>
+            <a:r>
+              <a:rPr lang="en-US" sz="1800" i="1" dirty="0"/>
+              <a:t>” directory called “out” and this directory contains the “.class” file)</a:t>
+            </a:r>
+            <a:endParaRPr lang="en-US" sz="1800" b="1" dirty="0"/>
+          </a:p>
+          <a:p>
+            <a:pPr marL="285750" indent="-285750" algn="l">
+              <a:buFontTx/>
+              <a:buChar char="-"/>
+            </a:pPr>
+            <a:r>
+              <a:rPr lang="en-US" sz="1800" dirty="0"/>
+              <a:t>Therefore, an option for “</a:t>
+            </a:r>
+            <a:r>
+              <a:rPr lang="en-US" sz="1800" dirty="0" err="1"/>
+              <a:t>javac</a:t>
+            </a:r>
+            <a:r>
+              <a:rPr lang="en-US" sz="1800" dirty="0"/>
+              <a:t>” command for this situation is the “-d” option. This option tells JVM to create a </a:t>
+            </a:r>
+            <a:r>
+              <a:rPr lang="en-US" sz="1800" b="1" dirty="0"/>
+              <a:t>“directory structure” </a:t>
+            </a:r>
+            <a:r>
+              <a:rPr lang="en-US" sz="1800" dirty="0"/>
+              <a:t>similar to the package statement and then put the “.class” file into that directory. In our example, the package specified is “accounting” =&gt; a folder name “accounting” will be created from the “-d” option and the “.class” file will reside inside that folder. The “.” after the “-d” option is to indicate that the current directory will be used to print out the final result. We can replace this “.” with other directories that we want JVM to create and print out the final result. </a:t>
+            </a:r>
+          </a:p>
+          <a:p>
+            <a:pPr algn="l"/>
+            <a:r>
+              <a:rPr lang="en-US" sz="1800" i="1" dirty="0"/>
+              <a:t>(NOTE: Print out result here doesn’t mean that any new file in that current directory specified is created. It is just the directory that the command line must go to so that we can use FQCN to print the final result from the “.class” file)</a:t>
+            </a:r>
+          </a:p>
+          <a:p>
+            <a:pPr marL="285750" indent="-285750" algn="l">
+              <a:buFontTx/>
+              <a:buChar char="-"/>
+            </a:pPr>
+            <a:r>
+              <a:rPr lang="en-US" sz="1800" dirty="0"/>
+              <a:t>When the compilation is completed, we have to tell JVM where the class file resides by using the option “-</a:t>
+            </a:r>
+            <a:r>
+              <a:rPr lang="en-US" sz="1800" dirty="0" err="1"/>
+              <a:t>classpath</a:t>
+            </a:r>
+            <a:r>
+              <a:rPr lang="en-US" sz="1800" dirty="0"/>
+              <a:t>” or its shorter version “-cp”. This option allows us to have multiple locations for multiple classes (each location is separated by the semi-colon “;”). For instance, if you have a class on C:\system32 and another class in C:\ =&gt; the command should be like this :</a:t>
+            </a:r>
+          </a:p>
+          <a:p>
+            <a:pPr marL="285750" indent="-285750" algn="l">
+              <a:buFontTx/>
+              <a:buChar char="-"/>
+            </a:pPr>
+            <a:r>
+              <a:rPr lang="en-US" sz="1800" dirty="0"/>
+              <a:t>“java –</a:t>
+            </a:r>
+            <a:r>
+              <a:rPr lang="en-US" sz="1800" dirty="0" err="1"/>
+              <a:t>classpass</a:t>
+            </a:r>
+            <a:r>
+              <a:rPr lang="en-US" sz="1800" dirty="0"/>
+              <a:t> C:\System32;C:\ </a:t>
+            </a:r>
+            <a:r>
+              <a:rPr lang="en-US" sz="1800" dirty="0" err="1"/>
+              <a:t>accounting.Account</a:t>
+            </a:r>
+            <a:r>
+              <a:rPr lang="en-US" sz="1800" dirty="0"/>
+              <a:t>” (</a:t>
+            </a:r>
+            <a:r>
+              <a:rPr lang="en-US" sz="1800" b="1" dirty="0"/>
+              <a:t>BE CAREFUL: this 2 folders reside in the same directory)</a:t>
+            </a:r>
+            <a:endParaRPr lang="en-US" sz="1800" dirty="0"/>
+          </a:p>
+          <a:p>
+            <a:pPr algn="l"/>
+            <a:r>
+              <a:rPr lang="en-US" sz="1800" i="1" dirty="0"/>
+              <a:t>(NOTE: The “java” command – without the </a:t>
+            </a:r>
+            <a:r>
+              <a:rPr lang="en-US" sz="1800" i="1" dirty="0" err="1"/>
+              <a:t>classpath</a:t>
+            </a:r>
+            <a:r>
+              <a:rPr lang="en-US" sz="1800" i="1" dirty="0"/>
+              <a:t> option will automatically scan the current directory and the packages for the class file =&gt; there is no need to use the ”-</a:t>
+            </a:r>
+            <a:r>
+              <a:rPr lang="en-US" sz="1800" i="1" dirty="0" err="1"/>
+              <a:t>classpath</a:t>
+            </a:r>
+            <a:r>
+              <a:rPr lang="en-US" sz="1800" i="1" dirty="0"/>
+              <a:t>” option) </a:t>
+            </a:r>
+          </a:p>
+        </p:txBody>
+      </p:sp>
+      <p:sp>
+        <p:nvSpPr>
+          <p:cNvPr id="2" name="TextBox 1">
+            <a:extLst>
+              <a:ext uri="{FF2B5EF4-FFF2-40B4-BE49-F238E27FC236}">
+                <a16:creationId xmlns:a16="http://schemas.microsoft.com/office/drawing/2014/main" id="{5A6B4745-6A45-A018-AFFD-1DD02C7A4C87}"/>
+              </a:ext>
+            </a:extLst>
+          </p:cNvPr>
+          <p:cNvSpPr txBox="1"/>
+          <p:nvPr/>
+        </p:nvSpPr>
+        <p:spPr>
+          <a:xfrm>
+            <a:off x="522514" y="4114800"/>
+            <a:ext cx="184731" cy="369332"/>
+          </a:xfrm>
+          <a:prstGeom prst="rect">
+            <a:avLst/>
+          </a:prstGeom>
+          <a:noFill/>
+        </p:spPr>
+        <p:txBody>
+          <a:bodyPr wrap="none" rtlCol="0">
+            <a:spAutoFit/>
+          </a:bodyPr>
+          <a:lstStyle/>
+          <a:p>
+            <a:endParaRPr lang="en-VN" dirty="0"/>
+          </a:p>
+        </p:txBody>
+      </p:sp>
+    </p:spTree>
+    <p:extLst>
+      <p:ext uri="{BB962C8B-B14F-4D97-AF65-F5344CB8AC3E}">
+        <p14:creationId xmlns:p14="http://schemas.microsoft.com/office/powerpoint/2010/main" val="810788975"/>
+      </p:ext>
+    </p:extLst>
+  </p:cSld>
+  <p:clrMapOvr>
+    <a:masterClrMapping/>
+  </p:clrMapOvr>
+  <p:timing>
+    <p:tnLst>
+      <p:par>
+        <p:cTn id="1" dur="indefinite" restart="never" nodeType="tmRoot">
+          <p:childTnLst>
+            <p:seq concurrent="1" nextAc="seek">
+              <p:cTn id="2" dur="indefinite" nodeType="mainSeq">
+                <p:childTnLst>
+                  <p:par>
+                    <p:cTn id="3" fill="hold">
+                      <p:stCondLst>
+                        <p:cond delay="indefinite"/>
+                      </p:stCondLst>
+                      <p:childTnLst>
+                        <p:par>
+                          <p:cTn id="4" fill="hold">
+                            <p:stCondLst>
+                              <p:cond delay="0"/>
+                            </p:stCondLst>
+                            <p:childTnLst>
+                              <p:par>
+                                <p:cTn id="5" presetID="1" presetClass="entr" presetSubtype="0" fill="hold" nodeType="clickEffect">
+                                  <p:stCondLst>
+                                    <p:cond delay="0"/>
+                                  </p:stCondLst>
+                                  <p:childTnLst>
+                                    <p:set>
+                                      <p:cBhvr>
+                                        <p:cTn id="6" dur="1" fill="hold">
+                                          <p:stCondLst>
+                                            <p:cond delay="0"/>
+                                          </p:stCondLst>
+                                        </p:cTn>
+                                        <p:tgtEl>
+                                          <p:spTgt spid="4">
+                                            <p:txEl>
+                                              <p:pRg st="0" end="0"/>
+                                            </p:txEl>
+                                          </p:spTgt>
+                                        </p:tgtEl>
+                                        <p:attrNameLst>
+                                          <p:attrName>style.visibility</p:attrName>
+                                        </p:attrNameLst>
+                                      </p:cBhvr>
+                                      <p:to>
+                                        <p:strVal val="visible"/>
+                                      </p:to>
+                                    </p:set>
+                                  </p:childTnLst>
+                                </p:cTn>
+                              </p:par>
+                            </p:childTnLst>
+                          </p:cTn>
+                        </p:par>
+                      </p:childTnLst>
+                    </p:cTn>
+                  </p:par>
+                  <p:par>
+                    <p:cTn id="7" fill="hold">
+                      <p:stCondLst>
+                        <p:cond delay="indefinite"/>
+                      </p:stCondLst>
+                      <p:childTnLst>
+                        <p:par>
+                          <p:cTn id="8" fill="hold">
+                            <p:stCondLst>
+                              <p:cond delay="0"/>
+                            </p:stCondLst>
+                            <p:childTnLst>
+                              <p:par>
+                                <p:cTn id="9" presetID="1" presetClass="entr" presetSubtype="0" fill="hold" nodeType="clickEffect">
+                                  <p:stCondLst>
+                                    <p:cond delay="0"/>
+                                  </p:stCondLst>
+                                  <p:childTnLst>
+                                    <p:set>
+                                      <p:cBhvr>
+                                        <p:cTn id="10" dur="1" fill="hold">
+                                          <p:stCondLst>
+                                            <p:cond delay="0"/>
+                                          </p:stCondLst>
+                                        </p:cTn>
+                                        <p:tgtEl>
+                                          <p:spTgt spid="4">
+                                            <p:txEl>
+                                              <p:pRg st="1" end="1"/>
+                                            </p:txEl>
+                                          </p:spTgt>
+                                        </p:tgtEl>
+                                        <p:attrNameLst>
+                                          <p:attrName>style.visibility</p:attrName>
+                                        </p:attrNameLst>
+                                      </p:cBhvr>
+                                      <p:to>
+                                        <p:strVal val="visible"/>
+                                      </p:to>
+                                    </p:set>
+                                  </p:childTnLst>
+                                </p:cTn>
+                              </p:par>
+                            </p:childTnLst>
+                          </p:cTn>
+                        </p:par>
+                      </p:childTnLst>
+                    </p:cTn>
+                  </p:par>
+                  <p:par>
+                    <p:cTn id="11" fill="hold">
+                      <p:stCondLst>
+                        <p:cond delay="indefinite"/>
+                      </p:stCondLst>
+                      <p:childTnLst>
+                        <p:par>
+                          <p:cTn id="12" fill="hold">
+                            <p:stCondLst>
+                              <p:cond delay="0"/>
+                            </p:stCondLst>
+                            <p:childTnLst>
+                              <p:par>
+                                <p:cTn id="13" presetID="1" presetClass="entr" presetSubtype="0" fill="hold" nodeType="clickEffect">
+                                  <p:stCondLst>
+                                    <p:cond delay="0"/>
+                                  </p:stCondLst>
+                                  <p:childTnLst>
+                                    <p:set>
+                                      <p:cBhvr>
+                                        <p:cTn id="14" dur="1" fill="hold">
+                                          <p:stCondLst>
+                                            <p:cond delay="0"/>
+                                          </p:stCondLst>
+                                        </p:cTn>
+                                        <p:tgtEl>
+                                          <p:spTgt spid="4">
+                                            <p:txEl>
+                                              <p:pRg st="2" end="2"/>
+                                            </p:txEl>
+                                          </p:spTgt>
+                                        </p:tgtEl>
+                                        <p:attrNameLst>
+                                          <p:attrName>style.visibility</p:attrName>
+                                        </p:attrNameLst>
+                                      </p:cBhvr>
+                                      <p:to>
+                                        <p:strVal val="visible"/>
+                                      </p:to>
+                                    </p:set>
+                                  </p:childTnLst>
+                                </p:cTn>
+                              </p:par>
+                            </p:childTnLst>
+                          </p:cTn>
+                        </p:par>
+                      </p:childTnLst>
+                    </p:cTn>
+                  </p:par>
+                  <p:par>
+                    <p:cTn id="15" fill="hold">
+                      <p:stCondLst>
+                        <p:cond delay="indefinite"/>
+                      </p:stCondLst>
+                      <p:childTnLst>
+                        <p:par>
+                          <p:cTn id="16" fill="hold">
+                            <p:stCondLst>
+                              <p:cond delay="0"/>
+                            </p:stCondLst>
+                            <p:childTnLst>
+                              <p:par>
+                                <p:cTn id="17" presetID="1" presetClass="entr" presetSubtype="0" fill="hold" nodeType="clickEffect">
+                                  <p:stCondLst>
+                                    <p:cond delay="0"/>
+                                  </p:stCondLst>
+                                  <p:childTnLst>
+                                    <p:set>
+                                      <p:cBhvr>
+                                        <p:cTn id="18" dur="1" fill="hold">
+                                          <p:stCondLst>
+                                            <p:cond delay="0"/>
+                                          </p:stCondLst>
+                                        </p:cTn>
+                                        <p:tgtEl>
+                                          <p:spTgt spid="4">
+                                            <p:txEl>
+                                              <p:pRg st="3" end="3"/>
+                                            </p:txEl>
+                                          </p:spTgt>
+                                        </p:tgtEl>
+                                        <p:attrNameLst>
+                                          <p:attrName>style.visibility</p:attrName>
+                                        </p:attrNameLst>
+                                      </p:cBhvr>
+                                      <p:to>
+                                        <p:strVal val="visible"/>
+                                      </p:to>
+                                    </p:set>
+                                  </p:childTnLst>
+                                </p:cTn>
+                              </p:par>
+                            </p:childTnLst>
+                          </p:cTn>
+                        </p:par>
+                      </p:childTnLst>
+                    </p:cTn>
+                  </p:par>
+                  <p:par>
+                    <p:cTn id="19" fill="hold">
+                      <p:stCondLst>
+                        <p:cond delay="indefinite"/>
+                      </p:stCondLst>
+                      <p:childTnLst>
+                        <p:par>
+                          <p:cTn id="20" fill="hold">
+                            <p:stCondLst>
+                              <p:cond delay="0"/>
+                            </p:stCondLst>
+                            <p:childTnLst>
+                              <p:par>
+                                <p:cTn id="21" presetID="1" presetClass="entr" presetSubtype="0" fill="hold" nodeType="clickEffect">
+                                  <p:stCondLst>
+                                    <p:cond delay="0"/>
+                                  </p:stCondLst>
+                                  <p:childTnLst>
+                                    <p:set>
+                                      <p:cBhvr>
+                                        <p:cTn id="22" dur="1" fill="hold">
+                                          <p:stCondLst>
+                                            <p:cond delay="0"/>
+                                          </p:stCondLst>
+                                        </p:cTn>
+                                        <p:tgtEl>
+                                          <p:spTgt spid="4">
+                                            <p:txEl>
+                                              <p:pRg st="4" end="4"/>
+                                            </p:txEl>
+                                          </p:spTgt>
+                                        </p:tgtEl>
+                                        <p:attrNameLst>
+                                          <p:attrName>style.visibility</p:attrName>
+                                        </p:attrNameLst>
+                                      </p:cBhvr>
+                                      <p:to>
+                                        <p:strVal val="visible"/>
+                                      </p:to>
+                                    </p:set>
+                                  </p:childTnLst>
+                                </p:cTn>
+                              </p:par>
+                            </p:childTnLst>
+                          </p:cTn>
+                        </p:par>
+                      </p:childTnLst>
+                    </p:cTn>
+                  </p:par>
+                  <p:par>
+                    <p:cTn id="23" fill="hold">
+                      <p:stCondLst>
+                        <p:cond delay="indefinite"/>
+                      </p:stCondLst>
+                      <p:childTnLst>
+                        <p:par>
+                          <p:cTn id="24" fill="hold">
+                            <p:stCondLst>
+                              <p:cond delay="0"/>
+                            </p:stCondLst>
+                            <p:childTnLst>
+                              <p:par>
+                                <p:cTn id="25" presetID="1" presetClass="entr" presetSubtype="0" fill="hold" nodeType="clickEffect">
+                                  <p:stCondLst>
+                                    <p:cond delay="0"/>
+                                  </p:stCondLst>
+                                  <p:childTnLst>
+                                    <p:set>
+                                      <p:cBhvr>
+                                        <p:cTn id="26" dur="1" fill="hold">
+                                          <p:stCondLst>
+                                            <p:cond delay="0"/>
+                                          </p:stCondLst>
+                                        </p:cTn>
+                                        <p:tgtEl>
+                                          <p:spTgt spid="4">
+                                            <p:txEl>
+                                              <p:pRg st="5" end="5"/>
+                                            </p:txEl>
+                                          </p:spTgt>
+                                        </p:tgtEl>
+                                        <p:attrNameLst>
+                                          <p:attrName>style.visibility</p:attrName>
+                                        </p:attrNameLst>
+                                      </p:cBhvr>
+                                      <p:to>
+                                        <p:strVal val="visible"/>
+                                      </p:to>
+                                    </p:set>
+                                  </p:childTnLst>
+                                </p:cTn>
+                              </p:par>
+                            </p:childTnLst>
+                          </p:cTn>
+                        </p:par>
+                      </p:childTnLst>
+                    </p:cTn>
+                  </p:par>
+                  <p:par>
+                    <p:cTn id="27" fill="hold">
+                      <p:stCondLst>
+                        <p:cond delay="indefinite"/>
+                      </p:stCondLst>
+                      <p:childTnLst>
+                        <p:par>
+                          <p:cTn id="28" fill="hold">
+                            <p:stCondLst>
+                              <p:cond delay="0"/>
+                            </p:stCondLst>
+                            <p:childTnLst>
+                              <p:par>
+                                <p:cTn id="29" presetID="1" presetClass="entr" presetSubtype="0" fill="hold" nodeType="clickEffect">
+                                  <p:stCondLst>
+                                    <p:cond delay="0"/>
+                                  </p:stCondLst>
+                                  <p:childTnLst>
+                                    <p:set>
+                                      <p:cBhvr>
+                                        <p:cTn id="30" dur="1" fill="hold">
+                                          <p:stCondLst>
+                                            <p:cond delay="0"/>
+                                          </p:stCondLst>
+                                        </p:cTn>
+                                        <p:tgtEl>
+                                          <p:spTgt spid="4">
+                                            <p:txEl>
+                                              <p:pRg st="6" end="6"/>
+                                            </p:txEl>
+                                          </p:spTgt>
+                                        </p:tgtEl>
+                                        <p:attrNameLst>
+                                          <p:attrName>style.visibility</p:attrName>
+                                        </p:attrNameLst>
+                                      </p:cBhvr>
+                                      <p:to>
+                                        <p:strVal val="visible"/>
+                                      </p:to>
+                                    </p:set>
+                                  </p:childTnLst>
+                                </p:cTn>
+                              </p:par>
+                            </p:childTnLst>
+                          </p:cTn>
+                        </p:par>
+                      </p:childTnLst>
+                    </p:cTn>
+                  </p:par>
+                  <p:par>
+                    <p:cTn id="31" fill="hold">
+                      <p:stCondLst>
+                        <p:cond delay="indefinite"/>
+                      </p:stCondLst>
+                      <p:childTnLst>
+                        <p:par>
+                          <p:cTn id="32" fill="hold">
+                            <p:stCondLst>
+                              <p:cond delay="0"/>
+                            </p:stCondLst>
+                            <p:childTnLst>
+                              <p:par>
+                                <p:cTn id="33" presetID="1" presetClass="entr" presetSubtype="0" fill="hold" nodeType="clickEffect">
+                                  <p:stCondLst>
+                                    <p:cond delay="0"/>
+                                  </p:stCondLst>
+                                  <p:childTnLst>
+                                    <p:set>
+                                      <p:cBhvr>
+                                        <p:cTn id="34" dur="1" fill="hold">
+                                          <p:stCondLst>
+                                            <p:cond delay="0"/>
+                                          </p:stCondLst>
+                                        </p:cTn>
+                                        <p:tgtEl>
+                                          <p:spTgt spid="4">
+                                            <p:txEl>
+                                              <p:pRg st="7" end="7"/>
+                                            </p:txEl>
+                                          </p:spTgt>
+                                        </p:tgtEl>
+                                        <p:attrNameLst>
+                                          <p:attrName>style.visibility</p:attrName>
+                                        </p:attrNameLst>
+                                      </p:cBhvr>
+                                      <p:to>
+                                        <p:strVal val="visible"/>
+                                      </p:to>
+                                    </p:set>
+                                  </p:childTnLst>
+                                </p:cTn>
+                              </p:par>
+                            </p:childTnLst>
+                          </p:cTn>
+                        </p:par>
+                      </p:childTnLst>
+                    </p:cTn>
+                  </p:par>
+                </p:childTnLst>
+              </p:cTn>
+              <p:prevCondLst>
+                <p:cond evt="onPrev" delay="0">
+                  <p:tgtEl>
+                    <p:sldTgt/>
+                  </p:tgtEl>
+                </p:cond>
+              </p:prevCondLst>
+              <p:nextCondLst>
+                <p:cond evt="onNext" delay="0">
+                  <p:tgtEl>
+                    <p:sldTgt/>
+                  </p:tgtEl>
+                </p:cond>
+              </p:nextCondLst>
+            </p:seq>
+          </p:childTnLst>
+        </p:cTn>
+      </p:par>
+    </p:tnLst>
+  </p:timing>
+</p:sld>
+</file>
+
+<file path=ppt/slides/slide17.xml><?xml version="1.0" encoding="utf-8"?>
+<p:sld xmlns:a="http://schemas.openxmlformats.org/drawingml/2006/main" xmlns:r="http://schemas.openxmlformats.org/officeDocument/2006/relationships" xmlns:p="http://schemas.openxmlformats.org/presentationml/2006/main">
+  <p:cSld>
+    <p:spTree>
+      <p:nvGrpSpPr>
+        <p:cNvPr id="1" name=""/>
+        <p:cNvGrpSpPr/>
+        <p:nvPr/>
+      </p:nvGrpSpPr>
+      <p:grpSpPr>
+        <a:xfrm>
+          <a:off x="0" y="0"/>
+          <a:ext cx="0" cy="0"/>
+          <a:chOff x="0" y="0"/>
+          <a:chExt cx="0" cy="0"/>
+        </a:xfrm>
+      </p:grpSpPr>
+      <p:sp>
+        <p:nvSpPr>
+          <p:cNvPr id="3" name="Subtitle 2">
+            <a:extLst>
+              <a:ext uri="{FF2B5EF4-FFF2-40B4-BE49-F238E27FC236}">
+                <a16:creationId xmlns:a16="http://schemas.microsoft.com/office/drawing/2014/main" id="{96DD8BC4-D539-661E-8A88-53AF6C208F93}"/>
+              </a:ext>
+            </a:extLst>
+          </p:cNvPr>
+          <p:cNvSpPr>
+            <a:spLocks noGrp="1"/>
+          </p:cNvSpPr>
+          <p:nvPr>
+            <p:ph type="subTitle" idx="1"/>
+          </p:nvPr>
+        </p:nvSpPr>
+        <p:spPr>
+          <a:xfrm>
+            <a:off x="-2144486" y="304574"/>
+            <a:ext cx="14565083" cy="303212"/>
+          </a:xfrm>
+        </p:spPr>
+        <p:txBody>
+          <a:bodyPr>
+            <a:normAutofit fontScale="92500" lnSpcReduction="20000"/>
+          </a:bodyPr>
+          <a:lstStyle/>
+          <a:p>
+            <a:r>
+              <a:rPr lang="en-US" sz="1800" b="1" dirty="0"/>
+              <a:t>4.5 – Advanced Java Compilation and Execution </a:t>
+            </a:r>
+            <a:r>
+              <a:rPr lang="en-US" sz="1800" dirty="0"/>
+              <a:t>– 4.5.1 Compilation and Execution Involving Package</a:t>
+            </a:r>
+            <a:endParaRPr lang="en-US" sz="1800" b="1" dirty="0"/>
+          </a:p>
+        </p:txBody>
+      </p:sp>
+      <p:sp>
+        <p:nvSpPr>
+          <p:cNvPr id="4" name="Subtitle 2">
+            <a:extLst>
+              <a:ext uri="{FF2B5EF4-FFF2-40B4-BE49-F238E27FC236}">
+                <a16:creationId xmlns:a16="http://schemas.microsoft.com/office/drawing/2014/main" id="{BBA13038-CAB8-FCA0-CDE8-65E40C2F10A3}"/>
+              </a:ext>
+            </a:extLst>
+          </p:cNvPr>
+          <p:cNvSpPr txBox="1">
+            <a:spLocks/>
+          </p:cNvSpPr>
+          <p:nvPr/>
+        </p:nvSpPr>
+        <p:spPr>
+          <a:xfrm>
+            <a:off x="0" y="820738"/>
+            <a:ext cx="12192000" cy="6037262"/>
+          </a:xfrm>
+          <a:prstGeom prst="rect">
+            <a:avLst/>
+          </a:prstGeom>
+        </p:spPr>
+        <p:txBody>
+          <a:bodyPr vert="horz" lIns="91440" tIns="45720" rIns="91440" bIns="45720" rtlCol="0">
+            <a:normAutofit/>
+          </a:bodyPr>
+          <a:lstStyle>
+            <a:lvl1pPr marL="0" indent="0" algn="ctr" defTabSz="914400" rtl="0" eaLnBrk="1" latinLnBrk="0" hangingPunct="1">
+              <a:lnSpc>
+                <a:spcPct val="90000"/>
+              </a:lnSpc>
+              <a:spcBef>
+                <a:spcPts val="1000"/>
+              </a:spcBef>
+              <a:buFont typeface="Arial" panose="020B0604020202020204" pitchFamily="34" charset="0"/>
+              <a:buNone/>
+              <a:defRPr sz="2400" kern="1200">
+                <a:solidFill>
+                  <a:schemeClr val="tx1"/>
+                </a:solidFill>
+                <a:latin typeface="+mn-lt"/>
+                <a:ea typeface="+mn-ea"/>
+                <a:cs typeface="+mn-cs"/>
+              </a:defRPr>
+            </a:lvl1pPr>
+            <a:lvl2pPr marL="457200" indent="0" algn="ctr" defTabSz="914400" rtl="0" eaLnBrk="1" latinLnBrk="0" hangingPunct="1">
+              <a:lnSpc>
+                <a:spcPct val="90000"/>
+              </a:lnSpc>
+              <a:spcBef>
+                <a:spcPts val="500"/>
+              </a:spcBef>
+              <a:buFont typeface="Arial" panose="020B0604020202020204" pitchFamily="34" charset="0"/>
+              <a:buNone/>
+              <a:defRPr sz="2000" kern="1200">
+                <a:solidFill>
+                  <a:schemeClr val="tx1"/>
+                </a:solidFill>
+                <a:latin typeface="+mn-lt"/>
+                <a:ea typeface="+mn-ea"/>
+                <a:cs typeface="+mn-cs"/>
+              </a:defRPr>
+            </a:lvl2pPr>
+            <a:lvl3pPr marL="914400" indent="0" algn="ctr" defTabSz="914400" rtl="0" eaLnBrk="1" latinLnBrk="0" hangingPunct="1">
+              <a:lnSpc>
+                <a:spcPct val="90000"/>
+              </a:lnSpc>
+              <a:spcBef>
+                <a:spcPts val="500"/>
+              </a:spcBef>
+              <a:buFont typeface="Arial" panose="020B0604020202020204" pitchFamily="34" charset="0"/>
+              <a:buNone/>
+              <a:defRPr sz="1800" kern="1200">
+                <a:solidFill>
+                  <a:schemeClr val="tx1"/>
+                </a:solidFill>
+                <a:latin typeface="+mn-lt"/>
+                <a:ea typeface="+mn-ea"/>
+                <a:cs typeface="+mn-cs"/>
+              </a:defRPr>
+            </a:lvl3pPr>
+            <a:lvl4pPr marL="1371600" indent="0" algn="ctr" defTabSz="914400" rtl="0" eaLnBrk="1" latinLnBrk="0" hangingPunct="1">
+              <a:lnSpc>
+                <a:spcPct val="90000"/>
+              </a:lnSpc>
+              <a:spcBef>
+                <a:spcPts val="500"/>
+              </a:spcBef>
+              <a:buFont typeface="Arial" panose="020B0604020202020204" pitchFamily="34" charset="0"/>
+              <a:buNone/>
+              <a:defRPr sz="1600" kern="1200">
+                <a:solidFill>
+                  <a:schemeClr val="tx1"/>
+                </a:solidFill>
+                <a:latin typeface="+mn-lt"/>
+                <a:ea typeface="+mn-ea"/>
+                <a:cs typeface="+mn-cs"/>
+              </a:defRPr>
+            </a:lvl4pPr>
+            <a:lvl5pPr marL="1828800" indent="0" algn="ctr" defTabSz="914400" rtl="0" eaLnBrk="1" latinLnBrk="0" hangingPunct="1">
+              <a:lnSpc>
+                <a:spcPct val="90000"/>
+              </a:lnSpc>
+              <a:spcBef>
+                <a:spcPts val="500"/>
+              </a:spcBef>
+              <a:buFont typeface="Arial" panose="020B0604020202020204" pitchFamily="34" charset="0"/>
+              <a:buNone/>
+              <a:defRPr sz="1600" kern="1200">
+                <a:solidFill>
+                  <a:schemeClr val="tx1"/>
+                </a:solidFill>
+                <a:latin typeface="+mn-lt"/>
+                <a:ea typeface="+mn-ea"/>
+                <a:cs typeface="+mn-cs"/>
+              </a:defRPr>
+            </a:lvl5pPr>
+            <a:lvl6pPr marL="2286000" indent="0" algn="ctr" defTabSz="914400" rtl="0" eaLnBrk="1" latinLnBrk="0" hangingPunct="1">
+              <a:lnSpc>
+                <a:spcPct val="90000"/>
+              </a:lnSpc>
+              <a:spcBef>
+                <a:spcPts val="500"/>
+              </a:spcBef>
+              <a:buFont typeface="Arial" panose="020B0604020202020204" pitchFamily="34" charset="0"/>
+              <a:buNone/>
+              <a:defRPr sz="1600" kern="1200">
+                <a:solidFill>
+                  <a:schemeClr val="tx1"/>
+                </a:solidFill>
+                <a:latin typeface="+mn-lt"/>
+                <a:ea typeface="+mn-ea"/>
+                <a:cs typeface="+mn-cs"/>
+              </a:defRPr>
+            </a:lvl6pPr>
+            <a:lvl7pPr marL="2743200" indent="0" algn="ctr" defTabSz="914400" rtl="0" eaLnBrk="1" latinLnBrk="0" hangingPunct="1">
+              <a:lnSpc>
+                <a:spcPct val="90000"/>
+              </a:lnSpc>
+              <a:spcBef>
+                <a:spcPts val="500"/>
+              </a:spcBef>
+              <a:buFont typeface="Arial" panose="020B0604020202020204" pitchFamily="34" charset="0"/>
+              <a:buNone/>
+              <a:defRPr sz="1600" kern="1200">
+                <a:solidFill>
+                  <a:schemeClr val="tx1"/>
+                </a:solidFill>
+                <a:latin typeface="+mn-lt"/>
+                <a:ea typeface="+mn-ea"/>
+                <a:cs typeface="+mn-cs"/>
+              </a:defRPr>
+            </a:lvl7pPr>
+            <a:lvl8pPr marL="3200400" indent="0" algn="ctr" defTabSz="914400" rtl="0" eaLnBrk="1" latinLnBrk="0" hangingPunct="1">
+              <a:lnSpc>
+                <a:spcPct val="90000"/>
+              </a:lnSpc>
+              <a:spcBef>
+                <a:spcPts val="500"/>
+              </a:spcBef>
+              <a:buFont typeface="Arial" panose="020B0604020202020204" pitchFamily="34" charset="0"/>
+              <a:buNone/>
+              <a:defRPr sz="1600" kern="1200">
+                <a:solidFill>
+                  <a:schemeClr val="tx1"/>
+                </a:solidFill>
+                <a:latin typeface="+mn-lt"/>
+                <a:ea typeface="+mn-ea"/>
+                <a:cs typeface="+mn-cs"/>
+              </a:defRPr>
+            </a:lvl8pPr>
+            <a:lvl9pPr marL="3657600" indent="0" algn="ctr" defTabSz="914400" rtl="0" eaLnBrk="1" latinLnBrk="0" hangingPunct="1">
+              <a:lnSpc>
+                <a:spcPct val="90000"/>
+              </a:lnSpc>
+              <a:spcBef>
+                <a:spcPts val="500"/>
+              </a:spcBef>
+              <a:buFont typeface="Arial" panose="020B0604020202020204" pitchFamily="34" charset="0"/>
+              <a:buNone/>
+              <a:defRPr sz="1600" kern="1200">
+                <a:solidFill>
+                  <a:schemeClr val="tx1"/>
+                </a:solidFill>
+                <a:latin typeface="+mn-lt"/>
+                <a:ea typeface="+mn-ea"/>
+                <a:cs typeface="+mn-cs"/>
+              </a:defRPr>
+            </a:lvl9pPr>
+          </a:lstStyle>
+          <a:p>
+            <a:pPr algn="l"/>
+            <a:r>
+              <a:rPr lang="en-US" sz="1800" dirty="0"/>
+              <a:t>- We have 2 Java source files </a:t>
+            </a:r>
+            <a:r>
+              <a:rPr lang="en-US" sz="1000" b="1" i="1" dirty="0"/>
+              <a:t>(illustrate the code) </a:t>
+            </a:r>
+            <a:r>
+              <a:rPr lang="en-US" sz="1800" dirty="0"/>
+              <a:t> and if we compile the file ”</a:t>
+            </a:r>
+            <a:r>
+              <a:rPr lang="en-US" sz="1800" dirty="0" err="1"/>
+              <a:t>MultipleClassExample.java</a:t>
+            </a:r>
+            <a:r>
+              <a:rPr lang="en-US" sz="1800" dirty="0"/>
+              <a:t>” =&gt; we will get an error since this class depends on another class, which resides in a file called “</a:t>
+            </a:r>
+            <a:r>
+              <a:rPr lang="en-US" sz="1800" dirty="0" err="1"/>
+              <a:t>StudentClassPathExample.java</a:t>
+            </a:r>
+            <a:r>
+              <a:rPr lang="en-US" sz="1800" dirty="0"/>
+              <a:t>” and this class hasn’t been initialized yet. Therefore, we must have to compile “</a:t>
+            </a:r>
+            <a:r>
+              <a:rPr lang="en-US" sz="1800" dirty="0" err="1"/>
+              <a:t>StudentClassPathExample.java</a:t>
+            </a:r>
+            <a:r>
+              <a:rPr lang="en-US" sz="1800" dirty="0"/>
+              <a:t>” first and then compile ”</a:t>
+            </a:r>
+            <a:r>
+              <a:rPr lang="en-US" sz="1800" dirty="0" err="1"/>
+              <a:t>MultipleClassExample.java</a:t>
+            </a:r>
+            <a:r>
+              <a:rPr lang="en-US" sz="1800" dirty="0"/>
+              <a:t>” =&gt; The code will run flawlessly</a:t>
+            </a:r>
+          </a:p>
+          <a:p>
+            <a:pPr algn="l"/>
+            <a:r>
+              <a:rPr lang="en-US" sz="1800" dirty="0"/>
+              <a:t>- But the problem is that a large Java application is composed of many different Java classes and their dependence is complicated =&gt; It is impractical to trace the sequence of compilation =&gt; A way to solve this is to let the Compiler determine the dependence between classes. There are 2 commands that we can use to apply this solution</a:t>
+            </a:r>
+          </a:p>
+          <a:p>
+            <a:pPr algn="l"/>
+            <a:r>
+              <a:rPr lang="en-US" sz="1800" dirty="0"/>
+              <a:t>– The first command is: “</a:t>
+            </a:r>
+            <a:r>
+              <a:rPr lang="en-US" sz="1800" dirty="0" err="1"/>
+              <a:t>javac</a:t>
+            </a:r>
+            <a:r>
+              <a:rPr lang="en-US" sz="1800" dirty="0"/>
+              <a:t> –d . </a:t>
+            </a:r>
+            <a:r>
+              <a:rPr lang="en-US" sz="1800" dirty="0" err="1"/>
+              <a:t>A.java</a:t>
+            </a:r>
+            <a:r>
+              <a:rPr lang="en-US" sz="1800" dirty="0"/>
+              <a:t> </a:t>
+            </a:r>
+            <a:r>
+              <a:rPr lang="en-US" sz="1800" dirty="0" err="1"/>
+              <a:t>B.java</a:t>
+            </a:r>
+            <a:r>
+              <a:rPr lang="en-US" sz="1800" dirty="0"/>
+              <a:t>”. This command allows us to compile multi-selected Java source file for compilation. But still, it is still impractical since there might be more than a thousand Java source files</a:t>
+            </a:r>
+          </a:p>
+          <a:p>
+            <a:pPr algn="l"/>
+            <a:r>
+              <a:rPr lang="en-US" sz="1800" dirty="0"/>
+              <a:t>- The second command is: “</a:t>
+            </a:r>
+            <a:r>
+              <a:rPr lang="en-US" sz="1800" dirty="0" err="1"/>
+              <a:t>javac</a:t>
+            </a:r>
+            <a:r>
+              <a:rPr lang="en-US" sz="1800" dirty="0"/>
+              <a:t> –d . *.java”. This command is almost the same as ”import com.&lt;…&gt;.*” , which indicates “include all” =&gt; this comment will compile all </a:t>
+            </a:r>
+            <a:r>
+              <a:rPr lang="en-US" sz="1800"/>
+              <a:t>Java source files reside in a directory </a:t>
+            </a:r>
+            <a:endParaRPr lang="en-US" sz="1800" dirty="0"/>
+          </a:p>
+        </p:txBody>
+      </p:sp>
+      <p:sp>
+        <p:nvSpPr>
+          <p:cNvPr id="2" name="TextBox 1">
+            <a:extLst>
+              <a:ext uri="{FF2B5EF4-FFF2-40B4-BE49-F238E27FC236}">
+                <a16:creationId xmlns:a16="http://schemas.microsoft.com/office/drawing/2014/main" id="{5A6B4745-6A45-A018-AFFD-1DD02C7A4C87}"/>
+              </a:ext>
+            </a:extLst>
+          </p:cNvPr>
+          <p:cNvSpPr txBox="1"/>
+          <p:nvPr/>
+        </p:nvSpPr>
+        <p:spPr>
+          <a:xfrm>
+            <a:off x="522514" y="4114800"/>
+            <a:ext cx="184731" cy="369332"/>
+          </a:xfrm>
+          <a:prstGeom prst="rect">
+            <a:avLst/>
+          </a:prstGeom>
+          <a:noFill/>
+        </p:spPr>
+        <p:txBody>
+          <a:bodyPr wrap="none" rtlCol="0">
+            <a:spAutoFit/>
+          </a:bodyPr>
+          <a:lstStyle/>
+          <a:p>
+            <a:endParaRPr lang="en-VN" dirty="0"/>
+          </a:p>
+        </p:txBody>
+      </p:sp>
+    </p:spTree>
+    <p:extLst>
+      <p:ext uri="{BB962C8B-B14F-4D97-AF65-F5344CB8AC3E}">
+        <p14:creationId xmlns:p14="http://schemas.microsoft.com/office/powerpoint/2010/main" val="2469079523"/>
+      </p:ext>
+    </p:extLst>
+  </p:cSld>
+  <p:clrMapOvr>
+    <a:masterClrMapping/>
+  </p:clrMapOvr>
+  <p:timing>
+    <p:tnLst>
+      <p:par>
+        <p:cTn id="1" dur="indefinite" restart="never" nodeType="tmRoot">
+          <p:childTnLst>
+            <p:seq concurrent="1" nextAc="seek">
+              <p:cTn id="2" dur="indefinite" nodeType="mainSeq">
+                <p:childTnLst>
+                  <p:par>
+                    <p:cTn id="3" fill="hold">
+                      <p:stCondLst>
+                        <p:cond delay="indefinite"/>
+                      </p:stCondLst>
+                      <p:childTnLst>
+                        <p:par>
+                          <p:cTn id="4" fill="hold">
+                            <p:stCondLst>
+                              <p:cond delay="0"/>
+                            </p:stCondLst>
+                            <p:childTnLst>
+                              <p:par>
+                                <p:cTn id="5" presetID="1" presetClass="entr" presetSubtype="0" fill="hold" nodeType="clickEffect">
+                                  <p:stCondLst>
+                                    <p:cond delay="0"/>
+                                  </p:stCondLst>
+                                  <p:childTnLst>
+                                    <p:set>
+                                      <p:cBhvr>
+                                        <p:cTn id="6" dur="1" fill="hold">
+                                          <p:stCondLst>
+                                            <p:cond delay="0"/>
+                                          </p:stCondLst>
+                                        </p:cTn>
+                                        <p:tgtEl>
+                                          <p:spTgt spid="4">
+                                            <p:txEl>
+                                              <p:pRg st="0" end="0"/>
+                                            </p:txEl>
+                                          </p:spTgt>
+                                        </p:tgtEl>
+                                        <p:attrNameLst>
+                                          <p:attrName>style.visibility</p:attrName>
+                                        </p:attrNameLst>
+                                      </p:cBhvr>
+                                      <p:to>
+                                        <p:strVal val="visible"/>
+                                      </p:to>
+                                    </p:set>
+                                  </p:childTnLst>
+                                </p:cTn>
+                              </p:par>
+                            </p:childTnLst>
+                          </p:cTn>
+                        </p:par>
+                      </p:childTnLst>
+                    </p:cTn>
+                  </p:par>
+                  <p:par>
+                    <p:cTn id="7" fill="hold">
+                      <p:stCondLst>
+                        <p:cond delay="indefinite"/>
+                      </p:stCondLst>
+                      <p:childTnLst>
+                        <p:par>
+                          <p:cTn id="8" fill="hold">
+                            <p:stCondLst>
+                              <p:cond delay="0"/>
+                            </p:stCondLst>
+                            <p:childTnLst>
+                              <p:par>
+                                <p:cTn id="9" presetID="1" presetClass="entr" presetSubtype="0" fill="hold" nodeType="clickEffect">
+                                  <p:stCondLst>
+                                    <p:cond delay="0"/>
+                                  </p:stCondLst>
+                                  <p:childTnLst>
+                                    <p:set>
+                                      <p:cBhvr>
+                                        <p:cTn id="10" dur="1" fill="hold">
+                                          <p:stCondLst>
+                                            <p:cond delay="0"/>
+                                          </p:stCondLst>
+                                        </p:cTn>
+                                        <p:tgtEl>
+                                          <p:spTgt spid="4">
+                                            <p:txEl>
+                                              <p:pRg st="1" end="1"/>
+                                            </p:txEl>
+                                          </p:spTgt>
+                                        </p:tgtEl>
+                                        <p:attrNameLst>
+                                          <p:attrName>style.visibility</p:attrName>
+                                        </p:attrNameLst>
+                                      </p:cBhvr>
+                                      <p:to>
+                                        <p:strVal val="visible"/>
+                                      </p:to>
+                                    </p:set>
+                                  </p:childTnLst>
+                                </p:cTn>
+                              </p:par>
+                            </p:childTnLst>
+                          </p:cTn>
+                        </p:par>
+                      </p:childTnLst>
+                    </p:cTn>
+                  </p:par>
+                  <p:par>
+                    <p:cTn id="11" fill="hold">
+                      <p:stCondLst>
+                        <p:cond delay="indefinite"/>
+                      </p:stCondLst>
+                      <p:childTnLst>
+                        <p:par>
+                          <p:cTn id="12" fill="hold">
+                            <p:stCondLst>
+                              <p:cond delay="0"/>
+                            </p:stCondLst>
+                            <p:childTnLst>
+                              <p:par>
+                                <p:cTn id="13" presetID="1" presetClass="entr" presetSubtype="0" fill="hold" nodeType="clickEffect">
+                                  <p:stCondLst>
+                                    <p:cond delay="0"/>
+                                  </p:stCondLst>
+                                  <p:childTnLst>
+                                    <p:set>
+                                      <p:cBhvr>
+                                        <p:cTn id="14" dur="1" fill="hold">
+                                          <p:stCondLst>
+                                            <p:cond delay="0"/>
+                                          </p:stCondLst>
+                                        </p:cTn>
+                                        <p:tgtEl>
+                                          <p:spTgt spid="4">
+                                            <p:txEl>
+                                              <p:pRg st="2" end="2"/>
+                                            </p:txEl>
+                                          </p:spTgt>
+                                        </p:tgtEl>
+                                        <p:attrNameLst>
+                                          <p:attrName>style.visibility</p:attrName>
+                                        </p:attrNameLst>
+                                      </p:cBhvr>
+                                      <p:to>
+                                        <p:strVal val="visible"/>
+                                      </p:to>
+                                    </p:set>
+                                  </p:childTnLst>
+                                </p:cTn>
+                              </p:par>
+                            </p:childTnLst>
+                          </p:cTn>
+                        </p:par>
+                      </p:childTnLst>
+                    </p:cTn>
+                  </p:par>
+                  <p:par>
+                    <p:cTn id="15" fill="hold">
+                      <p:stCondLst>
+                        <p:cond delay="indefinite"/>
+                      </p:stCondLst>
+                      <p:childTnLst>
+                        <p:par>
+                          <p:cTn id="16" fill="hold">
+                            <p:stCondLst>
+                              <p:cond delay="0"/>
+                            </p:stCondLst>
+                            <p:childTnLst>
+                              <p:par>
+                                <p:cTn id="17" presetID="1" presetClass="entr" presetSubtype="0" fill="hold" nodeType="clickEffect">
+                                  <p:stCondLst>
+                                    <p:cond delay="0"/>
+                                  </p:stCondLst>
+                                  <p:childTnLst>
+                                    <p:set>
+                                      <p:cBhvr>
+                                        <p:cTn id="18" dur="1" fill="hold">
+                                          <p:stCondLst>
+                                            <p:cond delay="0"/>
+                                          </p:stCondLst>
+                                        </p:cTn>
+                                        <p:tgtEl>
+                                          <p:spTgt spid="4">
+                                            <p:txEl>
+                                              <p:pRg st="3" end="3"/>
+                                            </p:txEl>
+                                          </p:spTgt>
+                                        </p:tgtEl>
+                                        <p:attrNameLst>
+                                          <p:attrName>style.visibility</p:attrName>
+                                        </p:attrNameLst>
+                                      </p:cBhvr>
+                                      <p:to>
+                                        <p:strVal val="visible"/>
+                                      </p:to>
+                                    </p:set>
+                                  </p:childTnLst>
+                                </p:cTn>
+                              </p:par>
+                            </p:childTnLst>
+                          </p:cTn>
+                        </p:par>
+                      </p:childTnLst>
+                    </p:cTn>
+                  </p:par>
+                </p:childTnLst>
+              </p:cTn>
+              <p:prevCondLst>
+                <p:cond evt="onPrev" delay="0">
+                  <p:tgtEl>
+                    <p:sldTgt/>
+                  </p:tgtEl>
+                </p:cond>
+              </p:prevCondLst>
+              <p:nextCondLst>
+                <p:cond evt="onNext" delay="0">
+                  <p:tgtEl>
+                    <p:sldTgt/>
+                  </p:tgtEl>
+                </p:cond>
+              </p:nextCondLst>
+            </p:seq>
+          </p:childTnLst>
+        </p:cTn>
+      </p:par>
+    </p:tnLst>
+  </p:timing>
+</p:sld>
+</file>
+
+<file path=ppt/slides/slide18.xml><?xml version="1.0" encoding="utf-8"?>
+<p:sld xmlns:a="http://schemas.openxmlformats.org/drawingml/2006/main" xmlns:r="http://schemas.openxmlformats.org/officeDocument/2006/relationships" xmlns:p="http://schemas.openxmlformats.org/presentationml/2006/main">
+  <p:cSld>
+    <p:spTree>
+      <p:nvGrpSpPr>
+        <p:cNvPr id="1" name=""/>
+        <p:cNvGrpSpPr/>
+        <p:nvPr/>
+      </p:nvGrpSpPr>
+      <p:grpSpPr>
+        <a:xfrm>
+          <a:off x="0" y="0"/>
+          <a:ext cx="0" cy="0"/>
+          <a:chOff x="0" y="0"/>
+          <a:chExt cx="0" cy="0"/>
+        </a:xfrm>
+      </p:grpSpPr>
+      <p:sp>
+        <p:nvSpPr>
+          <p:cNvPr id="3" name="Subtitle 2">
+            <a:extLst>
+              <a:ext uri="{FF2B5EF4-FFF2-40B4-BE49-F238E27FC236}">
+                <a16:creationId xmlns:a16="http://schemas.microsoft.com/office/drawing/2014/main" id="{96DD8BC4-D539-661E-8A88-53AF6C208F93}"/>
+              </a:ext>
+            </a:extLst>
+          </p:cNvPr>
+          <p:cNvSpPr>
+            <a:spLocks noGrp="1"/>
+          </p:cNvSpPr>
+          <p:nvPr>
+            <p:ph type="subTitle" idx="1"/>
+          </p:nvPr>
+        </p:nvSpPr>
+        <p:spPr>
+          <a:xfrm>
             <a:off x="-250372" y="168389"/>
             <a:ext cx="6901539" cy="303212"/>
           </a:xfrm>
@@ -8481,7 +9998,7 @@
 </p:sld>
 </file>
 
-<file path=ppt/slides/slide17.xml><?xml version="1.0" encoding="utf-8"?>
+<file path=ppt/slides/slide19.xml><?xml version="1.0" encoding="utf-8"?>
 <p:sld xmlns:a="http://schemas.openxmlformats.org/drawingml/2006/main" xmlns:r="http://schemas.openxmlformats.org/officeDocument/2006/relationships" xmlns:p="http://schemas.openxmlformats.org/presentationml/2006/main">
   <p:cSld>
     <p:spTree>
@@ -8642,1139 +10159,6 @@
     <p:extLst>
       <p:ext uri="{BB962C8B-B14F-4D97-AF65-F5344CB8AC3E}">
         <p14:creationId xmlns:p14="http://schemas.microsoft.com/office/powerpoint/2010/main" val="1293699709"/>
-      </p:ext>
-    </p:extLst>
-  </p:cSld>
-  <p:clrMapOvr>
-    <a:masterClrMapping/>
-  </p:clrMapOvr>
-</p:sld>
-</file>
-
-<file path=ppt/slides/slide18.xml><?xml version="1.0" encoding="utf-8"?>
-<p:sld xmlns:a="http://schemas.openxmlformats.org/drawingml/2006/main" xmlns:r="http://schemas.openxmlformats.org/officeDocument/2006/relationships" xmlns:p="http://schemas.openxmlformats.org/presentationml/2006/main">
-  <p:cSld>
-    <p:spTree>
-      <p:nvGrpSpPr>
-        <p:cNvPr id="1" name=""/>
-        <p:cNvGrpSpPr/>
-        <p:nvPr/>
-      </p:nvGrpSpPr>
-      <p:grpSpPr>
-        <a:xfrm>
-          <a:off x="0" y="0"/>
-          <a:ext cx="0" cy="0"/>
-          <a:chOff x="0" y="0"/>
-          <a:chExt cx="0" cy="0"/>
-        </a:xfrm>
-      </p:grpSpPr>
-      <p:sp>
-        <p:nvSpPr>
-          <p:cNvPr id="3" name="Subtitle 2">
-            <a:extLst>
-              <a:ext uri="{FF2B5EF4-FFF2-40B4-BE49-F238E27FC236}">
-                <a16:creationId xmlns:a16="http://schemas.microsoft.com/office/drawing/2014/main" id="{96DD8BC4-D539-661E-8A88-53AF6C208F93}"/>
-              </a:ext>
-            </a:extLst>
-          </p:cNvPr>
-          <p:cNvSpPr>
-            <a:spLocks noGrp="1"/>
-          </p:cNvSpPr>
-          <p:nvPr>
-            <p:ph type="subTitle" idx="1"/>
-          </p:nvPr>
-        </p:nvSpPr>
-        <p:spPr>
-          <a:xfrm>
-            <a:off x="-250372" y="168389"/>
-            <a:ext cx="6901539" cy="303212"/>
-          </a:xfrm>
-        </p:spPr>
-        <p:txBody>
-          <a:bodyPr>
-            <a:normAutofit fontScale="92500" lnSpcReduction="20000"/>
-          </a:bodyPr>
-          <a:lstStyle/>
-          <a:p>
-            <a:r>
-              <a:rPr lang="en-US" sz="1800" b="1" dirty="0"/>
-              <a:t>4.6 The </a:t>
-            </a:r>
-            <a:r>
-              <a:rPr lang="en-US" sz="1800" b="1" dirty="0" err="1"/>
-              <a:t>Java.lang</a:t>
-            </a:r>
-            <a:r>
-              <a:rPr lang="en-US" sz="1800" b="1" dirty="0"/>
-              <a:t> and other standard Java package</a:t>
-            </a:r>
-          </a:p>
-        </p:txBody>
-      </p:sp>
-      <p:sp>
-        <p:nvSpPr>
-          <p:cNvPr id="4" name="Subtitle 2">
-            <a:extLst>
-              <a:ext uri="{FF2B5EF4-FFF2-40B4-BE49-F238E27FC236}">
-                <a16:creationId xmlns:a16="http://schemas.microsoft.com/office/drawing/2014/main" id="{BBA13038-CAB8-FCA0-CDE8-65E40C2F10A3}"/>
-              </a:ext>
-            </a:extLst>
-          </p:cNvPr>
-          <p:cNvSpPr txBox="1">
-            <a:spLocks/>
-          </p:cNvSpPr>
-          <p:nvPr/>
-        </p:nvSpPr>
-        <p:spPr>
-          <a:xfrm>
-            <a:off x="-38264" y="820738"/>
-            <a:ext cx="12192000" cy="6037262"/>
-          </a:xfrm>
-          <a:prstGeom prst="rect">
-            <a:avLst/>
-          </a:prstGeom>
-        </p:spPr>
-        <p:txBody>
-          <a:bodyPr vert="horz" lIns="91440" tIns="45720" rIns="91440" bIns="45720" rtlCol="0">
-            <a:normAutofit/>
-          </a:bodyPr>
-          <a:lstStyle>
-            <a:lvl1pPr marL="0" indent="0" algn="ctr" defTabSz="914400" rtl="0" eaLnBrk="1" latinLnBrk="0" hangingPunct="1">
-              <a:lnSpc>
-                <a:spcPct val="90000"/>
-              </a:lnSpc>
-              <a:spcBef>
-                <a:spcPts val="1000"/>
-              </a:spcBef>
-              <a:buFont typeface="Arial" panose="020B0604020202020204" pitchFamily="34" charset="0"/>
-              <a:buNone/>
-              <a:defRPr sz="2400" kern="1200">
-                <a:solidFill>
-                  <a:schemeClr val="tx1"/>
-                </a:solidFill>
-                <a:latin typeface="+mn-lt"/>
-                <a:ea typeface="+mn-ea"/>
-                <a:cs typeface="+mn-cs"/>
-              </a:defRPr>
-            </a:lvl1pPr>
-            <a:lvl2pPr marL="457200" indent="0" algn="ctr" defTabSz="914400" rtl="0" eaLnBrk="1" latinLnBrk="0" hangingPunct="1">
-              <a:lnSpc>
-                <a:spcPct val="90000"/>
-              </a:lnSpc>
-              <a:spcBef>
-                <a:spcPts val="500"/>
-              </a:spcBef>
-              <a:buFont typeface="Arial" panose="020B0604020202020204" pitchFamily="34" charset="0"/>
-              <a:buNone/>
-              <a:defRPr sz="2000" kern="1200">
-                <a:solidFill>
-                  <a:schemeClr val="tx1"/>
-                </a:solidFill>
-                <a:latin typeface="+mn-lt"/>
-                <a:ea typeface="+mn-ea"/>
-                <a:cs typeface="+mn-cs"/>
-              </a:defRPr>
-            </a:lvl2pPr>
-            <a:lvl3pPr marL="914400" indent="0" algn="ctr" defTabSz="914400" rtl="0" eaLnBrk="1" latinLnBrk="0" hangingPunct="1">
-              <a:lnSpc>
-                <a:spcPct val="90000"/>
-              </a:lnSpc>
-              <a:spcBef>
-                <a:spcPts val="500"/>
-              </a:spcBef>
-              <a:buFont typeface="Arial" panose="020B0604020202020204" pitchFamily="34" charset="0"/>
-              <a:buNone/>
-              <a:defRPr sz="1800" kern="1200">
-                <a:solidFill>
-                  <a:schemeClr val="tx1"/>
-                </a:solidFill>
-                <a:latin typeface="+mn-lt"/>
-                <a:ea typeface="+mn-ea"/>
-                <a:cs typeface="+mn-cs"/>
-              </a:defRPr>
-            </a:lvl3pPr>
-            <a:lvl4pPr marL="1371600" indent="0" algn="ctr" defTabSz="914400" rtl="0" eaLnBrk="1" latinLnBrk="0" hangingPunct="1">
-              <a:lnSpc>
-                <a:spcPct val="90000"/>
-              </a:lnSpc>
-              <a:spcBef>
-                <a:spcPts val="500"/>
-              </a:spcBef>
-              <a:buFont typeface="Arial" panose="020B0604020202020204" pitchFamily="34" charset="0"/>
-              <a:buNone/>
-              <a:defRPr sz="1600" kern="1200">
-                <a:solidFill>
-                  <a:schemeClr val="tx1"/>
-                </a:solidFill>
-                <a:latin typeface="+mn-lt"/>
-                <a:ea typeface="+mn-ea"/>
-                <a:cs typeface="+mn-cs"/>
-              </a:defRPr>
-            </a:lvl4pPr>
-            <a:lvl5pPr marL="1828800" indent="0" algn="ctr" defTabSz="914400" rtl="0" eaLnBrk="1" latinLnBrk="0" hangingPunct="1">
-              <a:lnSpc>
-                <a:spcPct val="90000"/>
-              </a:lnSpc>
-              <a:spcBef>
-                <a:spcPts val="500"/>
-              </a:spcBef>
-              <a:buFont typeface="Arial" panose="020B0604020202020204" pitchFamily="34" charset="0"/>
-              <a:buNone/>
-              <a:defRPr sz="1600" kern="1200">
-                <a:solidFill>
-                  <a:schemeClr val="tx1"/>
-                </a:solidFill>
-                <a:latin typeface="+mn-lt"/>
-                <a:ea typeface="+mn-ea"/>
-                <a:cs typeface="+mn-cs"/>
-              </a:defRPr>
-            </a:lvl5pPr>
-            <a:lvl6pPr marL="2286000" indent="0" algn="ctr" defTabSz="914400" rtl="0" eaLnBrk="1" latinLnBrk="0" hangingPunct="1">
-              <a:lnSpc>
-                <a:spcPct val="90000"/>
-              </a:lnSpc>
-              <a:spcBef>
-                <a:spcPts val="500"/>
-              </a:spcBef>
-              <a:buFont typeface="Arial" panose="020B0604020202020204" pitchFamily="34" charset="0"/>
-              <a:buNone/>
-              <a:defRPr sz="1600" kern="1200">
-                <a:solidFill>
-                  <a:schemeClr val="tx1"/>
-                </a:solidFill>
-                <a:latin typeface="+mn-lt"/>
-                <a:ea typeface="+mn-ea"/>
-                <a:cs typeface="+mn-cs"/>
-              </a:defRPr>
-            </a:lvl6pPr>
-            <a:lvl7pPr marL="2743200" indent="0" algn="ctr" defTabSz="914400" rtl="0" eaLnBrk="1" latinLnBrk="0" hangingPunct="1">
-              <a:lnSpc>
-                <a:spcPct val="90000"/>
-              </a:lnSpc>
-              <a:spcBef>
-                <a:spcPts val="500"/>
-              </a:spcBef>
-              <a:buFont typeface="Arial" panose="020B0604020202020204" pitchFamily="34" charset="0"/>
-              <a:buNone/>
-              <a:defRPr sz="1600" kern="1200">
-                <a:solidFill>
-                  <a:schemeClr val="tx1"/>
-                </a:solidFill>
-                <a:latin typeface="+mn-lt"/>
-                <a:ea typeface="+mn-ea"/>
-                <a:cs typeface="+mn-cs"/>
-              </a:defRPr>
-            </a:lvl7pPr>
-            <a:lvl8pPr marL="3200400" indent="0" algn="ctr" defTabSz="914400" rtl="0" eaLnBrk="1" latinLnBrk="0" hangingPunct="1">
-              <a:lnSpc>
-                <a:spcPct val="90000"/>
-              </a:lnSpc>
-              <a:spcBef>
-                <a:spcPts val="500"/>
-              </a:spcBef>
-              <a:buFont typeface="Arial" panose="020B0604020202020204" pitchFamily="34" charset="0"/>
-              <a:buNone/>
-              <a:defRPr sz="1600" kern="1200">
-                <a:solidFill>
-                  <a:schemeClr val="tx1"/>
-                </a:solidFill>
-                <a:latin typeface="+mn-lt"/>
-                <a:ea typeface="+mn-ea"/>
-                <a:cs typeface="+mn-cs"/>
-              </a:defRPr>
-            </a:lvl8pPr>
-            <a:lvl9pPr marL="3657600" indent="0" algn="ctr" defTabSz="914400" rtl="0" eaLnBrk="1" latinLnBrk="0" hangingPunct="1">
-              <a:lnSpc>
-                <a:spcPct val="90000"/>
-              </a:lnSpc>
-              <a:spcBef>
-                <a:spcPts val="500"/>
-              </a:spcBef>
-              <a:buFont typeface="Arial" panose="020B0604020202020204" pitchFamily="34" charset="0"/>
-              <a:buNone/>
-              <a:defRPr sz="1600" kern="1200">
-                <a:solidFill>
-                  <a:schemeClr val="tx1"/>
-                </a:solidFill>
-                <a:latin typeface="+mn-lt"/>
-                <a:ea typeface="+mn-ea"/>
-                <a:cs typeface="+mn-cs"/>
-              </a:defRPr>
-            </a:lvl9pPr>
-          </a:lstStyle>
-          <a:p>
-            <a:pPr marL="285750" indent="-285750" algn="l">
-              <a:buFontTx/>
-              <a:buChar char="-"/>
-            </a:pPr>
-            <a:r>
-              <a:rPr lang="en-US" sz="1800" dirty="0"/>
-              <a:t>One of the largest advantages of Java is the large ready-to-use Java APIs library</a:t>
-            </a:r>
-          </a:p>
-          <a:p>
-            <a:pPr marL="285750" indent="-285750" algn="l">
-              <a:buFontTx/>
-              <a:buChar char="-"/>
-            </a:pPr>
-            <a:r>
-              <a:rPr lang="en-US" sz="1800" dirty="0"/>
-              <a:t>However, in the scope of this test, we only need to know about “</a:t>
-            </a:r>
-            <a:r>
-              <a:rPr lang="en-US" sz="1800" dirty="0" err="1"/>
-              <a:t>java.lang</a:t>
-            </a:r>
-            <a:r>
-              <a:rPr lang="en-US" sz="1800" dirty="0"/>
-              <a:t>” package</a:t>
-            </a:r>
-          </a:p>
-          <a:p>
-            <a:pPr algn="l"/>
-            <a:endParaRPr lang="en-US" sz="1800" dirty="0"/>
-          </a:p>
-          <a:p>
-            <a:pPr algn="l"/>
-            <a:r>
-              <a:rPr lang="en-US" sz="1800" b="1" dirty="0"/>
-              <a:t>I) The “</a:t>
-            </a:r>
-            <a:r>
-              <a:rPr lang="en-US" sz="1800" b="1" dirty="0" err="1"/>
-              <a:t>java.lang.Object</a:t>
-            </a:r>
-            <a:r>
-              <a:rPr lang="en-US" sz="1800" b="1" dirty="0"/>
-              <a:t>” class</a:t>
-            </a:r>
-          </a:p>
-          <a:p>
-            <a:pPr algn="l"/>
-            <a:r>
-              <a:rPr lang="en-US" sz="1800" dirty="0"/>
-              <a:t>- If you create a class that doesn’t extend any other classes =&gt; This class is “implicitly” extending the “Object” class</a:t>
-            </a:r>
-          </a:p>
-          <a:p>
-            <a:pPr algn="l"/>
-            <a:r>
-              <a:rPr lang="en-US" sz="1800" dirty="0"/>
-              <a:t>- ”object” is a special class that doesn’t extend any more class =&gt; we can call it an “Ultimate parent” of all classes. It is the root of Java class hierarchy</a:t>
-            </a:r>
-          </a:p>
-          <a:p>
-            <a:pPr algn="l"/>
-            <a:r>
-              <a:rPr lang="en-US" sz="1800" dirty="0"/>
-              <a:t>=&gt; This is why we tell everything in Java is an object (except primitive datatype). This is because primitive and reference datatype are completely different out of each other. Primitive datatype only represent “pure data” while reference datatype represent both “pure data” and “behavior” (</a:t>
-            </a:r>
-            <a:r>
-              <a:rPr lang="en-US" sz="1800" dirty="0" err="1"/>
-              <a:t>e.g</a:t>
-            </a:r>
-            <a:r>
-              <a:rPr lang="en-US" sz="1800" dirty="0"/>
-              <a:t>: Motorbike instance can represent “pure data” such as the ID of the engine or the behavior such as accelerating) =&gt; Both of them are treated differently</a:t>
-            </a:r>
-          </a:p>
-          <a:p>
-            <a:pPr algn="l"/>
-            <a:r>
-              <a:rPr lang="en-US" sz="1800" dirty="0"/>
-              <a:t>– However, ”</a:t>
-            </a:r>
-            <a:r>
-              <a:rPr lang="en-US" sz="1800" dirty="0" err="1"/>
-              <a:t>java.lang</a:t>
-            </a:r>
-            <a:r>
-              <a:rPr lang="en-US" sz="1800" dirty="0"/>
-              <a:t>” package also contain the OOP version of these primitive datatypes too (Boolean, Byte, Integer, Long,…) =&gt; called </a:t>
-            </a:r>
-            <a:r>
-              <a:rPr lang="en-US" sz="1800" b="1" dirty="0"/>
-              <a:t>“</a:t>
-            </a:r>
-            <a:r>
-              <a:rPr lang="en-US" sz="1800" b="1" dirty="0" err="1"/>
-              <a:t>warpper</a:t>
-            </a:r>
-            <a:r>
-              <a:rPr lang="en-US" sz="1800" b="1" dirty="0"/>
-              <a:t> classes”</a:t>
-            </a:r>
-            <a:endParaRPr lang="en-US" sz="1800" dirty="0"/>
-          </a:p>
-          <a:p>
-            <a:pPr algn="l"/>
-            <a:r>
-              <a:rPr lang="en-US" sz="1800" dirty="0"/>
-              <a:t>– In Java 1.5, a feature called </a:t>
-            </a:r>
-            <a:r>
-              <a:rPr lang="en-US" sz="1800" b="1" dirty="0"/>
-              <a:t>“autoboxing” </a:t>
-            </a:r>
-            <a:r>
-              <a:rPr lang="en-US" sz="1800" dirty="0"/>
-              <a:t>that allows the interaction between ”</a:t>
-            </a:r>
-            <a:r>
-              <a:rPr lang="en-US" sz="1800" dirty="0" err="1"/>
-              <a:t>warpper</a:t>
-            </a:r>
-            <a:r>
-              <a:rPr lang="en-US" sz="1800" dirty="0"/>
-              <a:t> classes” and primitive datatypes</a:t>
-            </a:r>
-          </a:p>
-        </p:txBody>
-      </p:sp>
-      <p:sp>
-        <p:nvSpPr>
-          <p:cNvPr id="2" name="TextBox 1">
-            <a:extLst>
-              <a:ext uri="{FF2B5EF4-FFF2-40B4-BE49-F238E27FC236}">
-                <a16:creationId xmlns:a16="http://schemas.microsoft.com/office/drawing/2014/main" id="{5A6B4745-6A45-A018-AFFD-1DD02C7A4C87}"/>
-              </a:ext>
-            </a:extLst>
-          </p:cNvPr>
-          <p:cNvSpPr txBox="1"/>
-          <p:nvPr/>
-        </p:nvSpPr>
-        <p:spPr>
-          <a:xfrm>
-            <a:off x="522514" y="4114800"/>
-            <a:ext cx="184731" cy="369332"/>
-          </a:xfrm>
-          <a:prstGeom prst="rect">
-            <a:avLst/>
-          </a:prstGeom>
-          <a:noFill/>
-        </p:spPr>
-        <p:txBody>
-          <a:bodyPr wrap="none" rtlCol="0">
-            <a:spAutoFit/>
-          </a:bodyPr>
-          <a:lstStyle/>
-          <a:p>
-            <a:endParaRPr lang="en-VN" dirty="0"/>
-          </a:p>
-        </p:txBody>
-      </p:sp>
-    </p:spTree>
-    <p:extLst>
-      <p:ext uri="{BB962C8B-B14F-4D97-AF65-F5344CB8AC3E}">
-        <p14:creationId xmlns:p14="http://schemas.microsoft.com/office/powerpoint/2010/main" val="1771617504"/>
-      </p:ext>
-    </p:extLst>
-  </p:cSld>
-  <p:clrMapOvr>
-    <a:masterClrMapping/>
-  </p:clrMapOvr>
-  <p:timing>
-    <p:tnLst>
-      <p:par>
-        <p:cTn id="1" dur="indefinite" restart="never" nodeType="tmRoot">
-          <p:childTnLst>
-            <p:seq concurrent="1" nextAc="seek">
-              <p:cTn id="2" dur="indefinite" nodeType="mainSeq">
-                <p:childTnLst>
-                  <p:par>
-                    <p:cTn id="3" fill="hold">
-                      <p:stCondLst>
-                        <p:cond delay="indefinite"/>
-                      </p:stCondLst>
-                      <p:childTnLst>
-                        <p:par>
-                          <p:cTn id="4" fill="hold">
-                            <p:stCondLst>
-                              <p:cond delay="0"/>
-                            </p:stCondLst>
-                            <p:childTnLst>
-                              <p:par>
-                                <p:cTn id="5" presetID="1" presetClass="entr" presetSubtype="0" fill="hold" nodeType="clickEffect">
-                                  <p:stCondLst>
-                                    <p:cond delay="0"/>
-                                  </p:stCondLst>
-                                  <p:childTnLst>
-                                    <p:set>
-                                      <p:cBhvr>
-                                        <p:cTn id="6" dur="1" fill="hold">
-                                          <p:stCondLst>
-                                            <p:cond delay="0"/>
-                                          </p:stCondLst>
-                                        </p:cTn>
-                                        <p:tgtEl>
-                                          <p:spTgt spid="4">
-                                            <p:txEl>
-                                              <p:pRg st="1" end="1"/>
-                                            </p:txEl>
-                                          </p:spTgt>
-                                        </p:tgtEl>
-                                        <p:attrNameLst>
-                                          <p:attrName>style.visibility</p:attrName>
-                                        </p:attrNameLst>
-                                      </p:cBhvr>
-                                      <p:to>
-                                        <p:strVal val="visible"/>
-                                      </p:to>
-                                    </p:set>
-                                  </p:childTnLst>
-                                </p:cTn>
-                              </p:par>
-                            </p:childTnLst>
-                          </p:cTn>
-                        </p:par>
-                      </p:childTnLst>
-                    </p:cTn>
-                  </p:par>
-                  <p:par>
-                    <p:cTn id="7" fill="hold">
-                      <p:stCondLst>
-                        <p:cond delay="indefinite"/>
-                      </p:stCondLst>
-                      <p:childTnLst>
-                        <p:par>
-                          <p:cTn id="8" fill="hold">
-                            <p:stCondLst>
-                              <p:cond delay="0"/>
-                            </p:stCondLst>
-                            <p:childTnLst>
-                              <p:par>
-                                <p:cTn id="9" presetID="1" presetClass="entr" presetSubtype="0" fill="hold" nodeType="clickEffect">
-                                  <p:stCondLst>
-                                    <p:cond delay="0"/>
-                                  </p:stCondLst>
-                                  <p:childTnLst>
-                                    <p:set>
-                                      <p:cBhvr>
-                                        <p:cTn id="10" dur="1" fill="hold">
-                                          <p:stCondLst>
-                                            <p:cond delay="0"/>
-                                          </p:stCondLst>
-                                        </p:cTn>
-                                        <p:tgtEl>
-                                          <p:spTgt spid="4">
-                                            <p:txEl>
-                                              <p:pRg st="3" end="3"/>
-                                            </p:txEl>
-                                          </p:spTgt>
-                                        </p:tgtEl>
-                                        <p:attrNameLst>
-                                          <p:attrName>style.visibility</p:attrName>
-                                        </p:attrNameLst>
-                                      </p:cBhvr>
-                                      <p:to>
-                                        <p:strVal val="visible"/>
-                                      </p:to>
-                                    </p:set>
-                                  </p:childTnLst>
-                                </p:cTn>
-                              </p:par>
-                            </p:childTnLst>
-                          </p:cTn>
-                        </p:par>
-                      </p:childTnLst>
-                    </p:cTn>
-                  </p:par>
-                  <p:par>
-                    <p:cTn id="11" fill="hold">
-                      <p:stCondLst>
-                        <p:cond delay="indefinite"/>
-                      </p:stCondLst>
-                      <p:childTnLst>
-                        <p:par>
-                          <p:cTn id="12" fill="hold">
-                            <p:stCondLst>
-                              <p:cond delay="0"/>
-                            </p:stCondLst>
-                            <p:childTnLst>
-                              <p:par>
-                                <p:cTn id="13" presetID="1" presetClass="entr" presetSubtype="0" fill="hold" nodeType="clickEffect">
-                                  <p:stCondLst>
-                                    <p:cond delay="0"/>
-                                  </p:stCondLst>
-                                  <p:childTnLst>
-                                    <p:set>
-                                      <p:cBhvr>
-                                        <p:cTn id="14" dur="1" fill="hold">
-                                          <p:stCondLst>
-                                            <p:cond delay="0"/>
-                                          </p:stCondLst>
-                                        </p:cTn>
-                                        <p:tgtEl>
-                                          <p:spTgt spid="4">
-                                            <p:txEl>
-                                              <p:pRg st="4" end="4"/>
-                                            </p:txEl>
-                                          </p:spTgt>
-                                        </p:tgtEl>
-                                        <p:attrNameLst>
-                                          <p:attrName>style.visibility</p:attrName>
-                                        </p:attrNameLst>
-                                      </p:cBhvr>
-                                      <p:to>
-                                        <p:strVal val="visible"/>
-                                      </p:to>
-                                    </p:set>
-                                  </p:childTnLst>
-                                </p:cTn>
-                              </p:par>
-                            </p:childTnLst>
-                          </p:cTn>
-                        </p:par>
-                      </p:childTnLst>
-                    </p:cTn>
-                  </p:par>
-                  <p:par>
-                    <p:cTn id="15" fill="hold">
-                      <p:stCondLst>
-                        <p:cond delay="indefinite"/>
-                      </p:stCondLst>
-                      <p:childTnLst>
-                        <p:par>
-                          <p:cTn id="16" fill="hold">
-                            <p:stCondLst>
-                              <p:cond delay="0"/>
-                            </p:stCondLst>
-                            <p:childTnLst>
-                              <p:par>
-                                <p:cTn id="17" presetID="1" presetClass="entr" presetSubtype="0" fill="hold" nodeType="clickEffect">
-                                  <p:stCondLst>
-                                    <p:cond delay="0"/>
-                                  </p:stCondLst>
-                                  <p:childTnLst>
-                                    <p:set>
-                                      <p:cBhvr>
-                                        <p:cTn id="18" dur="1" fill="hold">
-                                          <p:stCondLst>
-                                            <p:cond delay="0"/>
-                                          </p:stCondLst>
-                                        </p:cTn>
-                                        <p:tgtEl>
-                                          <p:spTgt spid="4">
-                                            <p:txEl>
-                                              <p:pRg st="5" end="5"/>
-                                            </p:txEl>
-                                          </p:spTgt>
-                                        </p:tgtEl>
-                                        <p:attrNameLst>
-                                          <p:attrName>style.visibility</p:attrName>
-                                        </p:attrNameLst>
-                                      </p:cBhvr>
-                                      <p:to>
-                                        <p:strVal val="visible"/>
-                                      </p:to>
-                                    </p:set>
-                                  </p:childTnLst>
-                                </p:cTn>
-                              </p:par>
-                            </p:childTnLst>
-                          </p:cTn>
-                        </p:par>
-                      </p:childTnLst>
-                    </p:cTn>
-                  </p:par>
-                  <p:par>
-                    <p:cTn id="19" fill="hold">
-                      <p:stCondLst>
-                        <p:cond delay="indefinite"/>
-                      </p:stCondLst>
-                      <p:childTnLst>
-                        <p:par>
-                          <p:cTn id="20" fill="hold">
-                            <p:stCondLst>
-                              <p:cond delay="0"/>
-                            </p:stCondLst>
-                            <p:childTnLst>
-                              <p:par>
-                                <p:cTn id="21" presetID="1" presetClass="entr" presetSubtype="0" fill="hold" nodeType="clickEffect">
-                                  <p:stCondLst>
-                                    <p:cond delay="0"/>
-                                  </p:stCondLst>
-                                  <p:childTnLst>
-                                    <p:set>
-                                      <p:cBhvr>
-                                        <p:cTn id="22" dur="1" fill="hold">
-                                          <p:stCondLst>
-                                            <p:cond delay="0"/>
-                                          </p:stCondLst>
-                                        </p:cTn>
-                                        <p:tgtEl>
-                                          <p:spTgt spid="4">
-                                            <p:txEl>
-                                              <p:pRg st="6" end="6"/>
-                                            </p:txEl>
-                                          </p:spTgt>
-                                        </p:tgtEl>
-                                        <p:attrNameLst>
-                                          <p:attrName>style.visibility</p:attrName>
-                                        </p:attrNameLst>
-                                      </p:cBhvr>
-                                      <p:to>
-                                        <p:strVal val="visible"/>
-                                      </p:to>
-                                    </p:set>
-                                  </p:childTnLst>
-                                </p:cTn>
-                              </p:par>
-                            </p:childTnLst>
-                          </p:cTn>
-                        </p:par>
-                      </p:childTnLst>
-                    </p:cTn>
-                  </p:par>
-                  <p:par>
-                    <p:cTn id="23" fill="hold">
-                      <p:stCondLst>
-                        <p:cond delay="indefinite"/>
-                      </p:stCondLst>
-                      <p:childTnLst>
-                        <p:par>
-                          <p:cTn id="24" fill="hold">
-                            <p:stCondLst>
-                              <p:cond delay="0"/>
-                            </p:stCondLst>
-                            <p:childTnLst>
-                              <p:par>
-                                <p:cTn id="25" presetID="1" presetClass="entr" presetSubtype="0" fill="hold" nodeType="clickEffect">
-                                  <p:stCondLst>
-                                    <p:cond delay="0"/>
-                                  </p:stCondLst>
-                                  <p:childTnLst>
-                                    <p:set>
-                                      <p:cBhvr>
-                                        <p:cTn id="26" dur="1" fill="hold">
-                                          <p:stCondLst>
-                                            <p:cond delay="0"/>
-                                          </p:stCondLst>
-                                        </p:cTn>
-                                        <p:tgtEl>
-                                          <p:spTgt spid="4">
-                                            <p:txEl>
-                                              <p:pRg st="7" end="7"/>
-                                            </p:txEl>
-                                          </p:spTgt>
-                                        </p:tgtEl>
-                                        <p:attrNameLst>
-                                          <p:attrName>style.visibility</p:attrName>
-                                        </p:attrNameLst>
-                                      </p:cBhvr>
-                                      <p:to>
-                                        <p:strVal val="visible"/>
-                                      </p:to>
-                                    </p:set>
-                                  </p:childTnLst>
-                                </p:cTn>
-                              </p:par>
-                            </p:childTnLst>
-                          </p:cTn>
-                        </p:par>
-                      </p:childTnLst>
-                    </p:cTn>
-                  </p:par>
-                  <p:par>
-                    <p:cTn id="27" fill="hold">
-                      <p:stCondLst>
-                        <p:cond delay="indefinite"/>
-                      </p:stCondLst>
-                      <p:childTnLst>
-                        <p:par>
-                          <p:cTn id="28" fill="hold">
-                            <p:stCondLst>
-                              <p:cond delay="0"/>
-                            </p:stCondLst>
-                            <p:childTnLst>
-                              <p:par>
-                                <p:cTn id="29" presetID="1" presetClass="entr" presetSubtype="0" fill="hold" nodeType="clickEffect">
-                                  <p:stCondLst>
-                                    <p:cond delay="0"/>
-                                  </p:stCondLst>
-                                  <p:childTnLst>
-                                    <p:set>
-                                      <p:cBhvr>
-                                        <p:cTn id="30" dur="1" fill="hold">
-                                          <p:stCondLst>
-                                            <p:cond delay="0"/>
-                                          </p:stCondLst>
-                                        </p:cTn>
-                                        <p:tgtEl>
-                                          <p:spTgt spid="4">
-                                            <p:txEl>
-                                              <p:pRg st="8" end="8"/>
-                                            </p:txEl>
-                                          </p:spTgt>
-                                        </p:tgtEl>
-                                        <p:attrNameLst>
-                                          <p:attrName>style.visibility</p:attrName>
-                                        </p:attrNameLst>
-                                      </p:cBhvr>
-                                      <p:to>
-                                        <p:strVal val="visible"/>
-                                      </p:to>
-                                    </p:set>
-                                  </p:childTnLst>
-                                </p:cTn>
-                              </p:par>
-                            </p:childTnLst>
-                          </p:cTn>
-                        </p:par>
-                      </p:childTnLst>
-                    </p:cTn>
-                  </p:par>
-                </p:childTnLst>
-              </p:cTn>
-              <p:prevCondLst>
-                <p:cond evt="onPrev" delay="0">
-                  <p:tgtEl>
-                    <p:sldTgt/>
-                  </p:tgtEl>
-                </p:cond>
-              </p:prevCondLst>
-              <p:nextCondLst>
-                <p:cond evt="onNext" delay="0">
-                  <p:tgtEl>
-                    <p:sldTgt/>
-                  </p:tgtEl>
-                </p:cond>
-              </p:nextCondLst>
-            </p:seq>
-          </p:childTnLst>
-        </p:cTn>
-      </p:par>
-    </p:tnLst>
-  </p:timing>
-</p:sld>
-</file>
-
-<file path=ppt/slides/slide19.xml><?xml version="1.0" encoding="utf-8"?>
-<p:sld xmlns:a="http://schemas.openxmlformats.org/drawingml/2006/main" xmlns:r="http://schemas.openxmlformats.org/officeDocument/2006/relationships" xmlns:p="http://schemas.openxmlformats.org/presentationml/2006/main">
-  <p:cSld>
-    <p:spTree>
-      <p:nvGrpSpPr>
-        <p:cNvPr id="1" name=""/>
-        <p:cNvGrpSpPr/>
-        <p:nvPr/>
-      </p:nvGrpSpPr>
-      <p:grpSpPr>
-        <a:xfrm>
-          <a:off x="0" y="0"/>
-          <a:ext cx="0" cy="0"/>
-          <a:chOff x="0" y="0"/>
-          <a:chExt cx="0" cy="0"/>
-        </a:xfrm>
-      </p:grpSpPr>
-      <p:sp>
-        <p:nvSpPr>
-          <p:cNvPr id="3" name="Subtitle 2">
-            <a:extLst>
-              <a:ext uri="{FF2B5EF4-FFF2-40B4-BE49-F238E27FC236}">
-                <a16:creationId xmlns:a16="http://schemas.microsoft.com/office/drawing/2014/main" id="{96DD8BC4-D539-661E-8A88-53AF6C208F93}"/>
-              </a:ext>
-            </a:extLst>
-          </p:cNvPr>
-          <p:cNvSpPr>
-            <a:spLocks noGrp="1"/>
-          </p:cNvSpPr>
-          <p:nvPr>
-            <p:ph type="subTitle" idx="1"/>
-          </p:nvPr>
-        </p:nvSpPr>
-        <p:spPr>
-          <a:xfrm>
-            <a:off x="-250372" y="168389"/>
-            <a:ext cx="6901539" cy="303212"/>
-          </a:xfrm>
-        </p:spPr>
-        <p:txBody>
-          <a:bodyPr>
-            <a:normAutofit fontScale="92500" lnSpcReduction="20000"/>
-          </a:bodyPr>
-          <a:lstStyle/>
-          <a:p>
-            <a:r>
-              <a:rPr lang="en-US" sz="1800" b="1" dirty="0"/>
-              <a:t>4.6 The </a:t>
-            </a:r>
-            <a:r>
-              <a:rPr lang="en-US" sz="1800" b="1" dirty="0" err="1"/>
-              <a:t>Java.lang</a:t>
-            </a:r>
-            <a:r>
-              <a:rPr lang="en-US" sz="1800" b="1" dirty="0"/>
-              <a:t> and other standard Java package</a:t>
-            </a:r>
-          </a:p>
-        </p:txBody>
-      </p:sp>
-      <p:sp>
-        <p:nvSpPr>
-          <p:cNvPr id="4" name="Subtitle 2">
-            <a:extLst>
-              <a:ext uri="{FF2B5EF4-FFF2-40B4-BE49-F238E27FC236}">
-                <a16:creationId xmlns:a16="http://schemas.microsoft.com/office/drawing/2014/main" id="{BBA13038-CAB8-FCA0-CDE8-65E40C2F10A3}"/>
-              </a:ext>
-            </a:extLst>
-          </p:cNvPr>
-          <p:cNvSpPr txBox="1">
-            <a:spLocks/>
-          </p:cNvSpPr>
-          <p:nvPr/>
-        </p:nvSpPr>
-        <p:spPr>
-          <a:xfrm>
-            <a:off x="-38264" y="820738"/>
-            <a:ext cx="12192000" cy="6037262"/>
-          </a:xfrm>
-          <a:prstGeom prst="rect">
-            <a:avLst/>
-          </a:prstGeom>
-        </p:spPr>
-        <p:txBody>
-          <a:bodyPr vert="horz" lIns="91440" tIns="45720" rIns="91440" bIns="45720" rtlCol="0">
-            <a:normAutofit/>
-          </a:bodyPr>
-          <a:lstStyle>
-            <a:lvl1pPr marL="0" indent="0" algn="ctr" defTabSz="914400" rtl="0" eaLnBrk="1" latinLnBrk="0" hangingPunct="1">
-              <a:lnSpc>
-                <a:spcPct val="90000"/>
-              </a:lnSpc>
-              <a:spcBef>
-                <a:spcPts val="1000"/>
-              </a:spcBef>
-              <a:buFont typeface="Arial" panose="020B0604020202020204" pitchFamily="34" charset="0"/>
-              <a:buNone/>
-              <a:defRPr sz="2400" kern="1200">
-                <a:solidFill>
-                  <a:schemeClr val="tx1"/>
-                </a:solidFill>
-                <a:latin typeface="+mn-lt"/>
-                <a:ea typeface="+mn-ea"/>
-                <a:cs typeface="+mn-cs"/>
-              </a:defRPr>
-            </a:lvl1pPr>
-            <a:lvl2pPr marL="457200" indent="0" algn="ctr" defTabSz="914400" rtl="0" eaLnBrk="1" latinLnBrk="0" hangingPunct="1">
-              <a:lnSpc>
-                <a:spcPct val="90000"/>
-              </a:lnSpc>
-              <a:spcBef>
-                <a:spcPts val="500"/>
-              </a:spcBef>
-              <a:buFont typeface="Arial" panose="020B0604020202020204" pitchFamily="34" charset="0"/>
-              <a:buNone/>
-              <a:defRPr sz="2000" kern="1200">
-                <a:solidFill>
-                  <a:schemeClr val="tx1"/>
-                </a:solidFill>
-                <a:latin typeface="+mn-lt"/>
-                <a:ea typeface="+mn-ea"/>
-                <a:cs typeface="+mn-cs"/>
-              </a:defRPr>
-            </a:lvl2pPr>
-            <a:lvl3pPr marL="914400" indent="0" algn="ctr" defTabSz="914400" rtl="0" eaLnBrk="1" latinLnBrk="0" hangingPunct="1">
-              <a:lnSpc>
-                <a:spcPct val="90000"/>
-              </a:lnSpc>
-              <a:spcBef>
-                <a:spcPts val="500"/>
-              </a:spcBef>
-              <a:buFont typeface="Arial" panose="020B0604020202020204" pitchFamily="34" charset="0"/>
-              <a:buNone/>
-              <a:defRPr sz="1800" kern="1200">
-                <a:solidFill>
-                  <a:schemeClr val="tx1"/>
-                </a:solidFill>
-                <a:latin typeface="+mn-lt"/>
-                <a:ea typeface="+mn-ea"/>
-                <a:cs typeface="+mn-cs"/>
-              </a:defRPr>
-            </a:lvl3pPr>
-            <a:lvl4pPr marL="1371600" indent="0" algn="ctr" defTabSz="914400" rtl="0" eaLnBrk="1" latinLnBrk="0" hangingPunct="1">
-              <a:lnSpc>
-                <a:spcPct val="90000"/>
-              </a:lnSpc>
-              <a:spcBef>
-                <a:spcPts val="500"/>
-              </a:spcBef>
-              <a:buFont typeface="Arial" panose="020B0604020202020204" pitchFamily="34" charset="0"/>
-              <a:buNone/>
-              <a:defRPr sz="1600" kern="1200">
-                <a:solidFill>
-                  <a:schemeClr val="tx1"/>
-                </a:solidFill>
-                <a:latin typeface="+mn-lt"/>
-                <a:ea typeface="+mn-ea"/>
-                <a:cs typeface="+mn-cs"/>
-              </a:defRPr>
-            </a:lvl4pPr>
-            <a:lvl5pPr marL="1828800" indent="0" algn="ctr" defTabSz="914400" rtl="0" eaLnBrk="1" latinLnBrk="0" hangingPunct="1">
-              <a:lnSpc>
-                <a:spcPct val="90000"/>
-              </a:lnSpc>
-              <a:spcBef>
-                <a:spcPts val="500"/>
-              </a:spcBef>
-              <a:buFont typeface="Arial" panose="020B0604020202020204" pitchFamily="34" charset="0"/>
-              <a:buNone/>
-              <a:defRPr sz="1600" kern="1200">
-                <a:solidFill>
-                  <a:schemeClr val="tx1"/>
-                </a:solidFill>
-                <a:latin typeface="+mn-lt"/>
-                <a:ea typeface="+mn-ea"/>
-                <a:cs typeface="+mn-cs"/>
-              </a:defRPr>
-            </a:lvl5pPr>
-            <a:lvl6pPr marL="2286000" indent="0" algn="ctr" defTabSz="914400" rtl="0" eaLnBrk="1" latinLnBrk="0" hangingPunct="1">
-              <a:lnSpc>
-                <a:spcPct val="90000"/>
-              </a:lnSpc>
-              <a:spcBef>
-                <a:spcPts val="500"/>
-              </a:spcBef>
-              <a:buFont typeface="Arial" panose="020B0604020202020204" pitchFamily="34" charset="0"/>
-              <a:buNone/>
-              <a:defRPr sz="1600" kern="1200">
-                <a:solidFill>
-                  <a:schemeClr val="tx1"/>
-                </a:solidFill>
-                <a:latin typeface="+mn-lt"/>
-                <a:ea typeface="+mn-ea"/>
-                <a:cs typeface="+mn-cs"/>
-              </a:defRPr>
-            </a:lvl6pPr>
-            <a:lvl7pPr marL="2743200" indent="0" algn="ctr" defTabSz="914400" rtl="0" eaLnBrk="1" latinLnBrk="0" hangingPunct="1">
-              <a:lnSpc>
-                <a:spcPct val="90000"/>
-              </a:lnSpc>
-              <a:spcBef>
-                <a:spcPts val="500"/>
-              </a:spcBef>
-              <a:buFont typeface="Arial" panose="020B0604020202020204" pitchFamily="34" charset="0"/>
-              <a:buNone/>
-              <a:defRPr sz="1600" kern="1200">
-                <a:solidFill>
-                  <a:schemeClr val="tx1"/>
-                </a:solidFill>
-                <a:latin typeface="+mn-lt"/>
-                <a:ea typeface="+mn-ea"/>
-                <a:cs typeface="+mn-cs"/>
-              </a:defRPr>
-            </a:lvl7pPr>
-            <a:lvl8pPr marL="3200400" indent="0" algn="ctr" defTabSz="914400" rtl="0" eaLnBrk="1" latinLnBrk="0" hangingPunct="1">
-              <a:lnSpc>
-                <a:spcPct val="90000"/>
-              </a:lnSpc>
-              <a:spcBef>
-                <a:spcPts val="500"/>
-              </a:spcBef>
-              <a:buFont typeface="Arial" panose="020B0604020202020204" pitchFamily="34" charset="0"/>
-              <a:buNone/>
-              <a:defRPr sz="1600" kern="1200">
-                <a:solidFill>
-                  <a:schemeClr val="tx1"/>
-                </a:solidFill>
-                <a:latin typeface="+mn-lt"/>
-                <a:ea typeface="+mn-ea"/>
-                <a:cs typeface="+mn-cs"/>
-              </a:defRPr>
-            </a:lvl8pPr>
-            <a:lvl9pPr marL="3657600" indent="0" algn="ctr" defTabSz="914400" rtl="0" eaLnBrk="1" latinLnBrk="0" hangingPunct="1">
-              <a:lnSpc>
-                <a:spcPct val="90000"/>
-              </a:lnSpc>
-              <a:spcBef>
-                <a:spcPts val="500"/>
-              </a:spcBef>
-              <a:buFont typeface="Arial" panose="020B0604020202020204" pitchFamily="34" charset="0"/>
-              <a:buNone/>
-              <a:defRPr sz="1600" kern="1200">
-                <a:solidFill>
-                  <a:schemeClr val="tx1"/>
-                </a:solidFill>
-                <a:latin typeface="+mn-lt"/>
-                <a:ea typeface="+mn-ea"/>
-                <a:cs typeface="+mn-cs"/>
-              </a:defRPr>
-            </a:lvl9pPr>
-          </a:lstStyle>
-          <a:p>
-            <a:pPr marL="285750" indent="-285750" algn="l">
-              <a:buFontTx/>
-              <a:buChar char="-"/>
-            </a:pPr>
-            <a:endParaRPr lang="en-US" sz="1800" dirty="0"/>
-          </a:p>
-        </p:txBody>
-      </p:sp>
-      <p:sp>
-        <p:nvSpPr>
-          <p:cNvPr id="2" name="TextBox 1">
-            <a:extLst>
-              <a:ext uri="{FF2B5EF4-FFF2-40B4-BE49-F238E27FC236}">
-                <a16:creationId xmlns:a16="http://schemas.microsoft.com/office/drawing/2014/main" id="{5A6B4745-6A45-A018-AFFD-1DD02C7A4C87}"/>
-              </a:ext>
-            </a:extLst>
-          </p:cNvPr>
-          <p:cNvSpPr txBox="1"/>
-          <p:nvPr/>
-        </p:nvSpPr>
-        <p:spPr>
-          <a:xfrm>
-            <a:off x="522514" y="4114800"/>
-            <a:ext cx="184731" cy="369332"/>
-          </a:xfrm>
-          <a:prstGeom prst="rect">
-            <a:avLst/>
-          </a:prstGeom>
-          <a:noFill/>
-        </p:spPr>
-        <p:txBody>
-          <a:bodyPr wrap="none" rtlCol="0">
-            <a:spAutoFit/>
-          </a:bodyPr>
-          <a:lstStyle/>
-          <a:p>
-            <a:endParaRPr lang="en-VN" dirty="0"/>
-          </a:p>
-        </p:txBody>
-      </p:sp>
-      <p:pic>
-        <p:nvPicPr>
-          <p:cNvPr id="5" name="Picture 4">
-            <a:extLst>
-              <a:ext uri="{FF2B5EF4-FFF2-40B4-BE49-F238E27FC236}">
-                <a16:creationId xmlns:a16="http://schemas.microsoft.com/office/drawing/2014/main" id="{631D2B52-0FB6-429B-2A72-2688E6B479EE}"/>
-              </a:ext>
-            </a:extLst>
-          </p:cNvPr>
-          <p:cNvPicPr>
-            <a:picLocks noChangeAspect="1"/>
-          </p:cNvPicPr>
-          <p:nvPr/>
-        </p:nvPicPr>
-        <p:blipFill>
-          <a:blip r:embed="rId2"/>
-          <a:stretch>
-            <a:fillRect/>
-          </a:stretch>
-        </p:blipFill>
-        <p:spPr>
-          <a:xfrm>
-            <a:off x="-38264" y="2286000"/>
-            <a:ext cx="12262344" cy="1828800"/>
-          </a:xfrm>
-          <a:prstGeom prst="rect">
-            <a:avLst/>
-          </a:prstGeom>
-        </p:spPr>
-      </p:pic>
-    </p:spTree>
-    <p:extLst>
-      <p:ext uri="{BB962C8B-B14F-4D97-AF65-F5344CB8AC3E}">
-        <p14:creationId xmlns:p14="http://schemas.microsoft.com/office/powerpoint/2010/main" val="4246487015"/>
       </p:ext>
     </p:extLst>
   </p:cSld>
@@ -11017,6 +11401,1139 @@
 </file>
 
 <file path=ppt/slides/slide20.xml><?xml version="1.0" encoding="utf-8"?>
+<p:sld xmlns:a="http://schemas.openxmlformats.org/drawingml/2006/main" xmlns:r="http://schemas.openxmlformats.org/officeDocument/2006/relationships" xmlns:p="http://schemas.openxmlformats.org/presentationml/2006/main">
+  <p:cSld>
+    <p:spTree>
+      <p:nvGrpSpPr>
+        <p:cNvPr id="1" name=""/>
+        <p:cNvGrpSpPr/>
+        <p:nvPr/>
+      </p:nvGrpSpPr>
+      <p:grpSpPr>
+        <a:xfrm>
+          <a:off x="0" y="0"/>
+          <a:ext cx="0" cy="0"/>
+          <a:chOff x="0" y="0"/>
+          <a:chExt cx="0" cy="0"/>
+        </a:xfrm>
+      </p:grpSpPr>
+      <p:sp>
+        <p:nvSpPr>
+          <p:cNvPr id="3" name="Subtitle 2">
+            <a:extLst>
+              <a:ext uri="{FF2B5EF4-FFF2-40B4-BE49-F238E27FC236}">
+                <a16:creationId xmlns:a16="http://schemas.microsoft.com/office/drawing/2014/main" id="{96DD8BC4-D539-661E-8A88-53AF6C208F93}"/>
+              </a:ext>
+            </a:extLst>
+          </p:cNvPr>
+          <p:cNvSpPr>
+            <a:spLocks noGrp="1"/>
+          </p:cNvSpPr>
+          <p:nvPr>
+            <p:ph type="subTitle" idx="1"/>
+          </p:nvPr>
+        </p:nvSpPr>
+        <p:spPr>
+          <a:xfrm>
+            <a:off x="-250372" y="168389"/>
+            <a:ext cx="6901539" cy="303212"/>
+          </a:xfrm>
+        </p:spPr>
+        <p:txBody>
+          <a:bodyPr>
+            <a:normAutofit fontScale="92500" lnSpcReduction="20000"/>
+          </a:bodyPr>
+          <a:lstStyle/>
+          <a:p>
+            <a:r>
+              <a:rPr lang="en-US" sz="1800" b="1" dirty="0"/>
+              <a:t>4.6 The </a:t>
+            </a:r>
+            <a:r>
+              <a:rPr lang="en-US" sz="1800" b="1" dirty="0" err="1"/>
+              <a:t>Java.lang</a:t>
+            </a:r>
+            <a:r>
+              <a:rPr lang="en-US" sz="1800" b="1" dirty="0"/>
+              <a:t> and other standard Java package</a:t>
+            </a:r>
+          </a:p>
+        </p:txBody>
+      </p:sp>
+      <p:sp>
+        <p:nvSpPr>
+          <p:cNvPr id="4" name="Subtitle 2">
+            <a:extLst>
+              <a:ext uri="{FF2B5EF4-FFF2-40B4-BE49-F238E27FC236}">
+                <a16:creationId xmlns:a16="http://schemas.microsoft.com/office/drawing/2014/main" id="{BBA13038-CAB8-FCA0-CDE8-65E40C2F10A3}"/>
+              </a:ext>
+            </a:extLst>
+          </p:cNvPr>
+          <p:cNvSpPr txBox="1">
+            <a:spLocks/>
+          </p:cNvSpPr>
+          <p:nvPr/>
+        </p:nvSpPr>
+        <p:spPr>
+          <a:xfrm>
+            <a:off x="-38264" y="820738"/>
+            <a:ext cx="12192000" cy="6037262"/>
+          </a:xfrm>
+          <a:prstGeom prst="rect">
+            <a:avLst/>
+          </a:prstGeom>
+        </p:spPr>
+        <p:txBody>
+          <a:bodyPr vert="horz" lIns="91440" tIns="45720" rIns="91440" bIns="45720" rtlCol="0">
+            <a:normAutofit/>
+          </a:bodyPr>
+          <a:lstStyle>
+            <a:lvl1pPr marL="0" indent="0" algn="ctr" defTabSz="914400" rtl="0" eaLnBrk="1" latinLnBrk="0" hangingPunct="1">
+              <a:lnSpc>
+                <a:spcPct val="90000"/>
+              </a:lnSpc>
+              <a:spcBef>
+                <a:spcPts val="1000"/>
+              </a:spcBef>
+              <a:buFont typeface="Arial" panose="020B0604020202020204" pitchFamily="34" charset="0"/>
+              <a:buNone/>
+              <a:defRPr sz="2400" kern="1200">
+                <a:solidFill>
+                  <a:schemeClr val="tx1"/>
+                </a:solidFill>
+                <a:latin typeface="+mn-lt"/>
+                <a:ea typeface="+mn-ea"/>
+                <a:cs typeface="+mn-cs"/>
+              </a:defRPr>
+            </a:lvl1pPr>
+            <a:lvl2pPr marL="457200" indent="0" algn="ctr" defTabSz="914400" rtl="0" eaLnBrk="1" latinLnBrk="0" hangingPunct="1">
+              <a:lnSpc>
+                <a:spcPct val="90000"/>
+              </a:lnSpc>
+              <a:spcBef>
+                <a:spcPts val="500"/>
+              </a:spcBef>
+              <a:buFont typeface="Arial" panose="020B0604020202020204" pitchFamily="34" charset="0"/>
+              <a:buNone/>
+              <a:defRPr sz="2000" kern="1200">
+                <a:solidFill>
+                  <a:schemeClr val="tx1"/>
+                </a:solidFill>
+                <a:latin typeface="+mn-lt"/>
+                <a:ea typeface="+mn-ea"/>
+                <a:cs typeface="+mn-cs"/>
+              </a:defRPr>
+            </a:lvl2pPr>
+            <a:lvl3pPr marL="914400" indent="0" algn="ctr" defTabSz="914400" rtl="0" eaLnBrk="1" latinLnBrk="0" hangingPunct="1">
+              <a:lnSpc>
+                <a:spcPct val="90000"/>
+              </a:lnSpc>
+              <a:spcBef>
+                <a:spcPts val="500"/>
+              </a:spcBef>
+              <a:buFont typeface="Arial" panose="020B0604020202020204" pitchFamily="34" charset="0"/>
+              <a:buNone/>
+              <a:defRPr sz="1800" kern="1200">
+                <a:solidFill>
+                  <a:schemeClr val="tx1"/>
+                </a:solidFill>
+                <a:latin typeface="+mn-lt"/>
+                <a:ea typeface="+mn-ea"/>
+                <a:cs typeface="+mn-cs"/>
+              </a:defRPr>
+            </a:lvl3pPr>
+            <a:lvl4pPr marL="1371600" indent="0" algn="ctr" defTabSz="914400" rtl="0" eaLnBrk="1" latinLnBrk="0" hangingPunct="1">
+              <a:lnSpc>
+                <a:spcPct val="90000"/>
+              </a:lnSpc>
+              <a:spcBef>
+                <a:spcPts val="500"/>
+              </a:spcBef>
+              <a:buFont typeface="Arial" panose="020B0604020202020204" pitchFamily="34" charset="0"/>
+              <a:buNone/>
+              <a:defRPr sz="1600" kern="1200">
+                <a:solidFill>
+                  <a:schemeClr val="tx1"/>
+                </a:solidFill>
+                <a:latin typeface="+mn-lt"/>
+                <a:ea typeface="+mn-ea"/>
+                <a:cs typeface="+mn-cs"/>
+              </a:defRPr>
+            </a:lvl4pPr>
+            <a:lvl5pPr marL="1828800" indent="0" algn="ctr" defTabSz="914400" rtl="0" eaLnBrk="1" latinLnBrk="0" hangingPunct="1">
+              <a:lnSpc>
+                <a:spcPct val="90000"/>
+              </a:lnSpc>
+              <a:spcBef>
+                <a:spcPts val="500"/>
+              </a:spcBef>
+              <a:buFont typeface="Arial" panose="020B0604020202020204" pitchFamily="34" charset="0"/>
+              <a:buNone/>
+              <a:defRPr sz="1600" kern="1200">
+                <a:solidFill>
+                  <a:schemeClr val="tx1"/>
+                </a:solidFill>
+                <a:latin typeface="+mn-lt"/>
+                <a:ea typeface="+mn-ea"/>
+                <a:cs typeface="+mn-cs"/>
+              </a:defRPr>
+            </a:lvl5pPr>
+            <a:lvl6pPr marL="2286000" indent="0" algn="ctr" defTabSz="914400" rtl="0" eaLnBrk="1" latinLnBrk="0" hangingPunct="1">
+              <a:lnSpc>
+                <a:spcPct val="90000"/>
+              </a:lnSpc>
+              <a:spcBef>
+                <a:spcPts val="500"/>
+              </a:spcBef>
+              <a:buFont typeface="Arial" panose="020B0604020202020204" pitchFamily="34" charset="0"/>
+              <a:buNone/>
+              <a:defRPr sz="1600" kern="1200">
+                <a:solidFill>
+                  <a:schemeClr val="tx1"/>
+                </a:solidFill>
+                <a:latin typeface="+mn-lt"/>
+                <a:ea typeface="+mn-ea"/>
+                <a:cs typeface="+mn-cs"/>
+              </a:defRPr>
+            </a:lvl6pPr>
+            <a:lvl7pPr marL="2743200" indent="0" algn="ctr" defTabSz="914400" rtl="0" eaLnBrk="1" latinLnBrk="0" hangingPunct="1">
+              <a:lnSpc>
+                <a:spcPct val="90000"/>
+              </a:lnSpc>
+              <a:spcBef>
+                <a:spcPts val="500"/>
+              </a:spcBef>
+              <a:buFont typeface="Arial" panose="020B0604020202020204" pitchFamily="34" charset="0"/>
+              <a:buNone/>
+              <a:defRPr sz="1600" kern="1200">
+                <a:solidFill>
+                  <a:schemeClr val="tx1"/>
+                </a:solidFill>
+                <a:latin typeface="+mn-lt"/>
+                <a:ea typeface="+mn-ea"/>
+                <a:cs typeface="+mn-cs"/>
+              </a:defRPr>
+            </a:lvl7pPr>
+            <a:lvl8pPr marL="3200400" indent="0" algn="ctr" defTabSz="914400" rtl="0" eaLnBrk="1" latinLnBrk="0" hangingPunct="1">
+              <a:lnSpc>
+                <a:spcPct val="90000"/>
+              </a:lnSpc>
+              <a:spcBef>
+                <a:spcPts val="500"/>
+              </a:spcBef>
+              <a:buFont typeface="Arial" panose="020B0604020202020204" pitchFamily="34" charset="0"/>
+              <a:buNone/>
+              <a:defRPr sz="1600" kern="1200">
+                <a:solidFill>
+                  <a:schemeClr val="tx1"/>
+                </a:solidFill>
+                <a:latin typeface="+mn-lt"/>
+                <a:ea typeface="+mn-ea"/>
+                <a:cs typeface="+mn-cs"/>
+              </a:defRPr>
+            </a:lvl8pPr>
+            <a:lvl9pPr marL="3657600" indent="0" algn="ctr" defTabSz="914400" rtl="0" eaLnBrk="1" latinLnBrk="0" hangingPunct="1">
+              <a:lnSpc>
+                <a:spcPct val="90000"/>
+              </a:lnSpc>
+              <a:spcBef>
+                <a:spcPts val="500"/>
+              </a:spcBef>
+              <a:buFont typeface="Arial" panose="020B0604020202020204" pitchFamily="34" charset="0"/>
+              <a:buNone/>
+              <a:defRPr sz="1600" kern="1200">
+                <a:solidFill>
+                  <a:schemeClr val="tx1"/>
+                </a:solidFill>
+                <a:latin typeface="+mn-lt"/>
+                <a:ea typeface="+mn-ea"/>
+                <a:cs typeface="+mn-cs"/>
+              </a:defRPr>
+            </a:lvl9pPr>
+          </a:lstStyle>
+          <a:p>
+            <a:pPr marL="285750" indent="-285750" algn="l">
+              <a:buFontTx/>
+              <a:buChar char="-"/>
+            </a:pPr>
+            <a:r>
+              <a:rPr lang="en-US" sz="1800" dirty="0"/>
+              <a:t>One of the largest advantages of Java is the large ready-to-use Java APIs library</a:t>
+            </a:r>
+          </a:p>
+          <a:p>
+            <a:pPr marL="285750" indent="-285750" algn="l">
+              <a:buFontTx/>
+              <a:buChar char="-"/>
+            </a:pPr>
+            <a:r>
+              <a:rPr lang="en-US" sz="1800" dirty="0"/>
+              <a:t>However, in the scope of this test, we only need to know about “</a:t>
+            </a:r>
+            <a:r>
+              <a:rPr lang="en-US" sz="1800" dirty="0" err="1"/>
+              <a:t>java.lang</a:t>
+            </a:r>
+            <a:r>
+              <a:rPr lang="en-US" sz="1800" dirty="0"/>
+              <a:t>” package</a:t>
+            </a:r>
+          </a:p>
+          <a:p>
+            <a:pPr algn="l"/>
+            <a:endParaRPr lang="en-US" sz="1800" dirty="0"/>
+          </a:p>
+          <a:p>
+            <a:pPr algn="l"/>
+            <a:r>
+              <a:rPr lang="en-US" sz="1800" b="1" dirty="0"/>
+              <a:t>I) The “</a:t>
+            </a:r>
+            <a:r>
+              <a:rPr lang="en-US" sz="1800" b="1" dirty="0" err="1"/>
+              <a:t>java.lang.Object</a:t>
+            </a:r>
+            <a:r>
+              <a:rPr lang="en-US" sz="1800" b="1" dirty="0"/>
+              <a:t>” class</a:t>
+            </a:r>
+          </a:p>
+          <a:p>
+            <a:pPr algn="l"/>
+            <a:r>
+              <a:rPr lang="en-US" sz="1800" dirty="0"/>
+              <a:t>- If you create a class that doesn’t extend any other classes =&gt; This class is “implicitly” extending the “Object” class</a:t>
+            </a:r>
+          </a:p>
+          <a:p>
+            <a:pPr algn="l"/>
+            <a:r>
+              <a:rPr lang="en-US" sz="1800" dirty="0"/>
+              <a:t>- ”object” is a special class that doesn’t extend any more class =&gt; we can call it an “Ultimate parent” of all classes. It is the root of Java class hierarchy</a:t>
+            </a:r>
+          </a:p>
+          <a:p>
+            <a:pPr algn="l"/>
+            <a:r>
+              <a:rPr lang="en-US" sz="1800" dirty="0"/>
+              <a:t>=&gt; This is why we tell everything in Java is an object (except primitive datatype). This is because primitive and reference datatype are completely different out of each other. Primitive datatype only represent “pure data” while reference datatype represent both “pure data” and “behavior” (</a:t>
+            </a:r>
+            <a:r>
+              <a:rPr lang="en-US" sz="1800" dirty="0" err="1"/>
+              <a:t>e.g</a:t>
+            </a:r>
+            <a:r>
+              <a:rPr lang="en-US" sz="1800" dirty="0"/>
+              <a:t>: Motorbike instance can represent “pure data” such as the ID of the engine or the behavior such as accelerating) =&gt; Both of them are treated differently</a:t>
+            </a:r>
+          </a:p>
+          <a:p>
+            <a:pPr algn="l"/>
+            <a:r>
+              <a:rPr lang="en-US" sz="1800" dirty="0"/>
+              <a:t>– However, ”</a:t>
+            </a:r>
+            <a:r>
+              <a:rPr lang="en-US" sz="1800" dirty="0" err="1"/>
+              <a:t>java.lang</a:t>
+            </a:r>
+            <a:r>
+              <a:rPr lang="en-US" sz="1800" dirty="0"/>
+              <a:t>” package also contain the OOP version of these primitive datatypes too (Boolean, Byte, Integer, Long,…) =&gt; called </a:t>
+            </a:r>
+            <a:r>
+              <a:rPr lang="en-US" sz="1800" b="1" dirty="0"/>
+              <a:t>“</a:t>
+            </a:r>
+            <a:r>
+              <a:rPr lang="en-US" sz="1800" b="1" dirty="0" err="1"/>
+              <a:t>warpper</a:t>
+            </a:r>
+            <a:r>
+              <a:rPr lang="en-US" sz="1800" b="1" dirty="0"/>
+              <a:t> classes”</a:t>
+            </a:r>
+            <a:endParaRPr lang="en-US" sz="1800" dirty="0"/>
+          </a:p>
+          <a:p>
+            <a:pPr algn="l"/>
+            <a:r>
+              <a:rPr lang="en-US" sz="1800" dirty="0"/>
+              <a:t>– In Java 1.5, a feature called </a:t>
+            </a:r>
+            <a:r>
+              <a:rPr lang="en-US" sz="1800" b="1" dirty="0"/>
+              <a:t>“autoboxing” </a:t>
+            </a:r>
+            <a:r>
+              <a:rPr lang="en-US" sz="1800" dirty="0"/>
+              <a:t>that allows the interaction between ”</a:t>
+            </a:r>
+            <a:r>
+              <a:rPr lang="en-US" sz="1800" dirty="0" err="1"/>
+              <a:t>warpper</a:t>
+            </a:r>
+            <a:r>
+              <a:rPr lang="en-US" sz="1800" dirty="0"/>
+              <a:t> classes” and primitive datatypes</a:t>
+            </a:r>
+          </a:p>
+        </p:txBody>
+      </p:sp>
+      <p:sp>
+        <p:nvSpPr>
+          <p:cNvPr id="2" name="TextBox 1">
+            <a:extLst>
+              <a:ext uri="{FF2B5EF4-FFF2-40B4-BE49-F238E27FC236}">
+                <a16:creationId xmlns:a16="http://schemas.microsoft.com/office/drawing/2014/main" id="{5A6B4745-6A45-A018-AFFD-1DD02C7A4C87}"/>
+              </a:ext>
+            </a:extLst>
+          </p:cNvPr>
+          <p:cNvSpPr txBox="1"/>
+          <p:nvPr/>
+        </p:nvSpPr>
+        <p:spPr>
+          <a:xfrm>
+            <a:off x="522514" y="4114800"/>
+            <a:ext cx="184731" cy="369332"/>
+          </a:xfrm>
+          <a:prstGeom prst="rect">
+            <a:avLst/>
+          </a:prstGeom>
+          <a:noFill/>
+        </p:spPr>
+        <p:txBody>
+          <a:bodyPr wrap="none" rtlCol="0">
+            <a:spAutoFit/>
+          </a:bodyPr>
+          <a:lstStyle/>
+          <a:p>
+            <a:endParaRPr lang="en-VN" dirty="0"/>
+          </a:p>
+        </p:txBody>
+      </p:sp>
+    </p:spTree>
+    <p:extLst>
+      <p:ext uri="{BB962C8B-B14F-4D97-AF65-F5344CB8AC3E}">
+        <p14:creationId xmlns:p14="http://schemas.microsoft.com/office/powerpoint/2010/main" val="1771617504"/>
+      </p:ext>
+    </p:extLst>
+  </p:cSld>
+  <p:clrMapOvr>
+    <a:masterClrMapping/>
+  </p:clrMapOvr>
+  <p:timing>
+    <p:tnLst>
+      <p:par>
+        <p:cTn id="1" dur="indefinite" restart="never" nodeType="tmRoot">
+          <p:childTnLst>
+            <p:seq concurrent="1" nextAc="seek">
+              <p:cTn id="2" dur="indefinite" nodeType="mainSeq">
+                <p:childTnLst>
+                  <p:par>
+                    <p:cTn id="3" fill="hold">
+                      <p:stCondLst>
+                        <p:cond delay="indefinite"/>
+                      </p:stCondLst>
+                      <p:childTnLst>
+                        <p:par>
+                          <p:cTn id="4" fill="hold">
+                            <p:stCondLst>
+                              <p:cond delay="0"/>
+                            </p:stCondLst>
+                            <p:childTnLst>
+                              <p:par>
+                                <p:cTn id="5" presetID="1" presetClass="entr" presetSubtype="0" fill="hold" nodeType="clickEffect">
+                                  <p:stCondLst>
+                                    <p:cond delay="0"/>
+                                  </p:stCondLst>
+                                  <p:childTnLst>
+                                    <p:set>
+                                      <p:cBhvr>
+                                        <p:cTn id="6" dur="1" fill="hold">
+                                          <p:stCondLst>
+                                            <p:cond delay="0"/>
+                                          </p:stCondLst>
+                                        </p:cTn>
+                                        <p:tgtEl>
+                                          <p:spTgt spid="4">
+                                            <p:txEl>
+                                              <p:pRg st="1" end="1"/>
+                                            </p:txEl>
+                                          </p:spTgt>
+                                        </p:tgtEl>
+                                        <p:attrNameLst>
+                                          <p:attrName>style.visibility</p:attrName>
+                                        </p:attrNameLst>
+                                      </p:cBhvr>
+                                      <p:to>
+                                        <p:strVal val="visible"/>
+                                      </p:to>
+                                    </p:set>
+                                  </p:childTnLst>
+                                </p:cTn>
+                              </p:par>
+                            </p:childTnLst>
+                          </p:cTn>
+                        </p:par>
+                      </p:childTnLst>
+                    </p:cTn>
+                  </p:par>
+                  <p:par>
+                    <p:cTn id="7" fill="hold">
+                      <p:stCondLst>
+                        <p:cond delay="indefinite"/>
+                      </p:stCondLst>
+                      <p:childTnLst>
+                        <p:par>
+                          <p:cTn id="8" fill="hold">
+                            <p:stCondLst>
+                              <p:cond delay="0"/>
+                            </p:stCondLst>
+                            <p:childTnLst>
+                              <p:par>
+                                <p:cTn id="9" presetID="1" presetClass="entr" presetSubtype="0" fill="hold" nodeType="clickEffect">
+                                  <p:stCondLst>
+                                    <p:cond delay="0"/>
+                                  </p:stCondLst>
+                                  <p:childTnLst>
+                                    <p:set>
+                                      <p:cBhvr>
+                                        <p:cTn id="10" dur="1" fill="hold">
+                                          <p:stCondLst>
+                                            <p:cond delay="0"/>
+                                          </p:stCondLst>
+                                        </p:cTn>
+                                        <p:tgtEl>
+                                          <p:spTgt spid="4">
+                                            <p:txEl>
+                                              <p:pRg st="3" end="3"/>
+                                            </p:txEl>
+                                          </p:spTgt>
+                                        </p:tgtEl>
+                                        <p:attrNameLst>
+                                          <p:attrName>style.visibility</p:attrName>
+                                        </p:attrNameLst>
+                                      </p:cBhvr>
+                                      <p:to>
+                                        <p:strVal val="visible"/>
+                                      </p:to>
+                                    </p:set>
+                                  </p:childTnLst>
+                                </p:cTn>
+                              </p:par>
+                            </p:childTnLst>
+                          </p:cTn>
+                        </p:par>
+                      </p:childTnLst>
+                    </p:cTn>
+                  </p:par>
+                  <p:par>
+                    <p:cTn id="11" fill="hold">
+                      <p:stCondLst>
+                        <p:cond delay="indefinite"/>
+                      </p:stCondLst>
+                      <p:childTnLst>
+                        <p:par>
+                          <p:cTn id="12" fill="hold">
+                            <p:stCondLst>
+                              <p:cond delay="0"/>
+                            </p:stCondLst>
+                            <p:childTnLst>
+                              <p:par>
+                                <p:cTn id="13" presetID="1" presetClass="entr" presetSubtype="0" fill="hold" nodeType="clickEffect">
+                                  <p:stCondLst>
+                                    <p:cond delay="0"/>
+                                  </p:stCondLst>
+                                  <p:childTnLst>
+                                    <p:set>
+                                      <p:cBhvr>
+                                        <p:cTn id="14" dur="1" fill="hold">
+                                          <p:stCondLst>
+                                            <p:cond delay="0"/>
+                                          </p:stCondLst>
+                                        </p:cTn>
+                                        <p:tgtEl>
+                                          <p:spTgt spid="4">
+                                            <p:txEl>
+                                              <p:pRg st="4" end="4"/>
+                                            </p:txEl>
+                                          </p:spTgt>
+                                        </p:tgtEl>
+                                        <p:attrNameLst>
+                                          <p:attrName>style.visibility</p:attrName>
+                                        </p:attrNameLst>
+                                      </p:cBhvr>
+                                      <p:to>
+                                        <p:strVal val="visible"/>
+                                      </p:to>
+                                    </p:set>
+                                  </p:childTnLst>
+                                </p:cTn>
+                              </p:par>
+                            </p:childTnLst>
+                          </p:cTn>
+                        </p:par>
+                      </p:childTnLst>
+                    </p:cTn>
+                  </p:par>
+                  <p:par>
+                    <p:cTn id="15" fill="hold">
+                      <p:stCondLst>
+                        <p:cond delay="indefinite"/>
+                      </p:stCondLst>
+                      <p:childTnLst>
+                        <p:par>
+                          <p:cTn id="16" fill="hold">
+                            <p:stCondLst>
+                              <p:cond delay="0"/>
+                            </p:stCondLst>
+                            <p:childTnLst>
+                              <p:par>
+                                <p:cTn id="17" presetID="1" presetClass="entr" presetSubtype="0" fill="hold" nodeType="clickEffect">
+                                  <p:stCondLst>
+                                    <p:cond delay="0"/>
+                                  </p:stCondLst>
+                                  <p:childTnLst>
+                                    <p:set>
+                                      <p:cBhvr>
+                                        <p:cTn id="18" dur="1" fill="hold">
+                                          <p:stCondLst>
+                                            <p:cond delay="0"/>
+                                          </p:stCondLst>
+                                        </p:cTn>
+                                        <p:tgtEl>
+                                          <p:spTgt spid="4">
+                                            <p:txEl>
+                                              <p:pRg st="5" end="5"/>
+                                            </p:txEl>
+                                          </p:spTgt>
+                                        </p:tgtEl>
+                                        <p:attrNameLst>
+                                          <p:attrName>style.visibility</p:attrName>
+                                        </p:attrNameLst>
+                                      </p:cBhvr>
+                                      <p:to>
+                                        <p:strVal val="visible"/>
+                                      </p:to>
+                                    </p:set>
+                                  </p:childTnLst>
+                                </p:cTn>
+                              </p:par>
+                            </p:childTnLst>
+                          </p:cTn>
+                        </p:par>
+                      </p:childTnLst>
+                    </p:cTn>
+                  </p:par>
+                  <p:par>
+                    <p:cTn id="19" fill="hold">
+                      <p:stCondLst>
+                        <p:cond delay="indefinite"/>
+                      </p:stCondLst>
+                      <p:childTnLst>
+                        <p:par>
+                          <p:cTn id="20" fill="hold">
+                            <p:stCondLst>
+                              <p:cond delay="0"/>
+                            </p:stCondLst>
+                            <p:childTnLst>
+                              <p:par>
+                                <p:cTn id="21" presetID="1" presetClass="entr" presetSubtype="0" fill="hold" nodeType="clickEffect">
+                                  <p:stCondLst>
+                                    <p:cond delay="0"/>
+                                  </p:stCondLst>
+                                  <p:childTnLst>
+                                    <p:set>
+                                      <p:cBhvr>
+                                        <p:cTn id="22" dur="1" fill="hold">
+                                          <p:stCondLst>
+                                            <p:cond delay="0"/>
+                                          </p:stCondLst>
+                                        </p:cTn>
+                                        <p:tgtEl>
+                                          <p:spTgt spid="4">
+                                            <p:txEl>
+                                              <p:pRg st="6" end="6"/>
+                                            </p:txEl>
+                                          </p:spTgt>
+                                        </p:tgtEl>
+                                        <p:attrNameLst>
+                                          <p:attrName>style.visibility</p:attrName>
+                                        </p:attrNameLst>
+                                      </p:cBhvr>
+                                      <p:to>
+                                        <p:strVal val="visible"/>
+                                      </p:to>
+                                    </p:set>
+                                  </p:childTnLst>
+                                </p:cTn>
+                              </p:par>
+                            </p:childTnLst>
+                          </p:cTn>
+                        </p:par>
+                      </p:childTnLst>
+                    </p:cTn>
+                  </p:par>
+                  <p:par>
+                    <p:cTn id="23" fill="hold">
+                      <p:stCondLst>
+                        <p:cond delay="indefinite"/>
+                      </p:stCondLst>
+                      <p:childTnLst>
+                        <p:par>
+                          <p:cTn id="24" fill="hold">
+                            <p:stCondLst>
+                              <p:cond delay="0"/>
+                            </p:stCondLst>
+                            <p:childTnLst>
+                              <p:par>
+                                <p:cTn id="25" presetID="1" presetClass="entr" presetSubtype="0" fill="hold" nodeType="clickEffect">
+                                  <p:stCondLst>
+                                    <p:cond delay="0"/>
+                                  </p:stCondLst>
+                                  <p:childTnLst>
+                                    <p:set>
+                                      <p:cBhvr>
+                                        <p:cTn id="26" dur="1" fill="hold">
+                                          <p:stCondLst>
+                                            <p:cond delay="0"/>
+                                          </p:stCondLst>
+                                        </p:cTn>
+                                        <p:tgtEl>
+                                          <p:spTgt spid="4">
+                                            <p:txEl>
+                                              <p:pRg st="7" end="7"/>
+                                            </p:txEl>
+                                          </p:spTgt>
+                                        </p:tgtEl>
+                                        <p:attrNameLst>
+                                          <p:attrName>style.visibility</p:attrName>
+                                        </p:attrNameLst>
+                                      </p:cBhvr>
+                                      <p:to>
+                                        <p:strVal val="visible"/>
+                                      </p:to>
+                                    </p:set>
+                                  </p:childTnLst>
+                                </p:cTn>
+                              </p:par>
+                            </p:childTnLst>
+                          </p:cTn>
+                        </p:par>
+                      </p:childTnLst>
+                    </p:cTn>
+                  </p:par>
+                  <p:par>
+                    <p:cTn id="27" fill="hold">
+                      <p:stCondLst>
+                        <p:cond delay="indefinite"/>
+                      </p:stCondLst>
+                      <p:childTnLst>
+                        <p:par>
+                          <p:cTn id="28" fill="hold">
+                            <p:stCondLst>
+                              <p:cond delay="0"/>
+                            </p:stCondLst>
+                            <p:childTnLst>
+                              <p:par>
+                                <p:cTn id="29" presetID="1" presetClass="entr" presetSubtype="0" fill="hold" nodeType="clickEffect">
+                                  <p:stCondLst>
+                                    <p:cond delay="0"/>
+                                  </p:stCondLst>
+                                  <p:childTnLst>
+                                    <p:set>
+                                      <p:cBhvr>
+                                        <p:cTn id="30" dur="1" fill="hold">
+                                          <p:stCondLst>
+                                            <p:cond delay="0"/>
+                                          </p:stCondLst>
+                                        </p:cTn>
+                                        <p:tgtEl>
+                                          <p:spTgt spid="4">
+                                            <p:txEl>
+                                              <p:pRg st="8" end="8"/>
+                                            </p:txEl>
+                                          </p:spTgt>
+                                        </p:tgtEl>
+                                        <p:attrNameLst>
+                                          <p:attrName>style.visibility</p:attrName>
+                                        </p:attrNameLst>
+                                      </p:cBhvr>
+                                      <p:to>
+                                        <p:strVal val="visible"/>
+                                      </p:to>
+                                    </p:set>
+                                  </p:childTnLst>
+                                </p:cTn>
+                              </p:par>
+                            </p:childTnLst>
+                          </p:cTn>
+                        </p:par>
+                      </p:childTnLst>
+                    </p:cTn>
+                  </p:par>
+                </p:childTnLst>
+              </p:cTn>
+              <p:prevCondLst>
+                <p:cond evt="onPrev" delay="0">
+                  <p:tgtEl>
+                    <p:sldTgt/>
+                  </p:tgtEl>
+                </p:cond>
+              </p:prevCondLst>
+              <p:nextCondLst>
+                <p:cond evt="onNext" delay="0">
+                  <p:tgtEl>
+                    <p:sldTgt/>
+                  </p:tgtEl>
+                </p:cond>
+              </p:nextCondLst>
+            </p:seq>
+          </p:childTnLst>
+        </p:cTn>
+      </p:par>
+    </p:tnLst>
+  </p:timing>
+</p:sld>
+</file>
+
+<file path=ppt/slides/slide21.xml><?xml version="1.0" encoding="utf-8"?>
+<p:sld xmlns:a="http://schemas.openxmlformats.org/drawingml/2006/main" xmlns:r="http://schemas.openxmlformats.org/officeDocument/2006/relationships" xmlns:p="http://schemas.openxmlformats.org/presentationml/2006/main">
+  <p:cSld>
+    <p:spTree>
+      <p:nvGrpSpPr>
+        <p:cNvPr id="1" name=""/>
+        <p:cNvGrpSpPr/>
+        <p:nvPr/>
+      </p:nvGrpSpPr>
+      <p:grpSpPr>
+        <a:xfrm>
+          <a:off x="0" y="0"/>
+          <a:ext cx="0" cy="0"/>
+          <a:chOff x="0" y="0"/>
+          <a:chExt cx="0" cy="0"/>
+        </a:xfrm>
+      </p:grpSpPr>
+      <p:sp>
+        <p:nvSpPr>
+          <p:cNvPr id="3" name="Subtitle 2">
+            <a:extLst>
+              <a:ext uri="{FF2B5EF4-FFF2-40B4-BE49-F238E27FC236}">
+                <a16:creationId xmlns:a16="http://schemas.microsoft.com/office/drawing/2014/main" id="{96DD8BC4-D539-661E-8A88-53AF6C208F93}"/>
+              </a:ext>
+            </a:extLst>
+          </p:cNvPr>
+          <p:cNvSpPr>
+            <a:spLocks noGrp="1"/>
+          </p:cNvSpPr>
+          <p:nvPr>
+            <p:ph type="subTitle" idx="1"/>
+          </p:nvPr>
+        </p:nvSpPr>
+        <p:spPr>
+          <a:xfrm>
+            <a:off x="-250372" y="168389"/>
+            <a:ext cx="6901539" cy="303212"/>
+          </a:xfrm>
+        </p:spPr>
+        <p:txBody>
+          <a:bodyPr>
+            <a:normAutofit fontScale="92500" lnSpcReduction="20000"/>
+          </a:bodyPr>
+          <a:lstStyle/>
+          <a:p>
+            <a:r>
+              <a:rPr lang="en-US" sz="1800" b="1" dirty="0"/>
+              <a:t>4.6 The </a:t>
+            </a:r>
+            <a:r>
+              <a:rPr lang="en-US" sz="1800" b="1" dirty="0" err="1"/>
+              <a:t>Java.lang</a:t>
+            </a:r>
+            <a:r>
+              <a:rPr lang="en-US" sz="1800" b="1" dirty="0"/>
+              <a:t> and other standard Java package</a:t>
+            </a:r>
+          </a:p>
+        </p:txBody>
+      </p:sp>
+      <p:sp>
+        <p:nvSpPr>
+          <p:cNvPr id="4" name="Subtitle 2">
+            <a:extLst>
+              <a:ext uri="{FF2B5EF4-FFF2-40B4-BE49-F238E27FC236}">
+                <a16:creationId xmlns:a16="http://schemas.microsoft.com/office/drawing/2014/main" id="{BBA13038-CAB8-FCA0-CDE8-65E40C2F10A3}"/>
+              </a:ext>
+            </a:extLst>
+          </p:cNvPr>
+          <p:cNvSpPr txBox="1">
+            <a:spLocks/>
+          </p:cNvSpPr>
+          <p:nvPr/>
+        </p:nvSpPr>
+        <p:spPr>
+          <a:xfrm>
+            <a:off x="-38264" y="820738"/>
+            <a:ext cx="12192000" cy="6037262"/>
+          </a:xfrm>
+          <a:prstGeom prst="rect">
+            <a:avLst/>
+          </a:prstGeom>
+        </p:spPr>
+        <p:txBody>
+          <a:bodyPr vert="horz" lIns="91440" tIns="45720" rIns="91440" bIns="45720" rtlCol="0">
+            <a:normAutofit/>
+          </a:bodyPr>
+          <a:lstStyle>
+            <a:lvl1pPr marL="0" indent="0" algn="ctr" defTabSz="914400" rtl="0" eaLnBrk="1" latinLnBrk="0" hangingPunct="1">
+              <a:lnSpc>
+                <a:spcPct val="90000"/>
+              </a:lnSpc>
+              <a:spcBef>
+                <a:spcPts val="1000"/>
+              </a:spcBef>
+              <a:buFont typeface="Arial" panose="020B0604020202020204" pitchFamily="34" charset="0"/>
+              <a:buNone/>
+              <a:defRPr sz="2400" kern="1200">
+                <a:solidFill>
+                  <a:schemeClr val="tx1"/>
+                </a:solidFill>
+                <a:latin typeface="+mn-lt"/>
+                <a:ea typeface="+mn-ea"/>
+                <a:cs typeface="+mn-cs"/>
+              </a:defRPr>
+            </a:lvl1pPr>
+            <a:lvl2pPr marL="457200" indent="0" algn="ctr" defTabSz="914400" rtl="0" eaLnBrk="1" latinLnBrk="0" hangingPunct="1">
+              <a:lnSpc>
+                <a:spcPct val="90000"/>
+              </a:lnSpc>
+              <a:spcBef>
+                <a:spcPts val="500"/>
+              </a:spcBef>
+              <a:buFont typeface="Arial" panose="020B0604020202020204" pitchFamily="34" charset="0"/>
+              <a:buNone/>
+              <a:defRPr sz="2000" kern="1200">
+                <a:solidFill>
+                  <a:schemeClr val="tx1"/>
+                </a:solidFill>
+                <a:latin typeface="+mn-lt"/>
+                <a:ea typeface="+mn-ea"/>
+                <a:cs typeface="+mn-cs"/>
+              </a:defRPr>
+            </a:lvl2pPr>
+            <a:lvl3pPr marL="914400" indent="0" algn="ctr" defTabSz="914400" rtl="0" eaLnBrk="1" latinLnBrk="0" hangingPunct="1">
+              <a:lnSpc>
+                <a:spcPct val="90000"/>
+              </a:lnSpc>
+              <a:spcBef>
+                <a:spcPts val="500"/>
+              </a:spcBef>
+              <a:buFont typeface="Arial" panose="020B0604020202020204" pitchFamily="34" charset="0"/>
+              <a:buNone/>
+              <a:defRPr sz="1800" kern="1200">
+                <a:solidFill>
+                  <a:schemeClr val="tx1"/>
+                </a:solidFill>
+                <a:latin typeface="+mn-lt"/>
+                <a:ea typeface="+mn-ea"/>
+                <a:cs typeface="+mn-cs"/>
+              </a:defRPr>
+            </a:lvl3pPr>
+            <a:lvl4pPr marL="1371600" indent="0" algn="ctr" defTabSz="914400" rtl="0" eaLnBrk="1" latinLnBrk="0" hangingPunct="1">
+              <a:lnSpc>
+                <a:spcPct val="90000"/>
+              </a:lnSpc>
+              <a:spcBef>
+                <a:spcPts val="500"/>
+              </a:spcBef>
+              <a:buFont typeface="Arial" panose="020B0604020202020204" pitchFamily="34" charset="0"/>
+              <a:buNone/>
+              <a:defRPr sz="1600" kern="1200">
+                <a:solidFill>
+                  <a:schemeClr val="tx1"/>
+                </a:solidFill>
+                <a:latin typeface="+mn-lt"/>
+                <a:ea typeface="+mn-ea"/>
+                <a:cs typeface="+mn-cs"/>
+              </a:defRPr>
+            </a:lvl4pPr>
+            <a:lvl5pPr marL="1828800" indent="0" algn="ctr" defTabSz="914400" rtl="0" eaLnBrk="1" latinLnBrk="0" hangingPunct="1">
+              <a:lnSpc>
+                <a:spcPct val="90000"/>
+              </a:lnSpc>
+              <a:spcBef>
+                <a:spcPts val="500"/>
+              </a:spcBef>
+              <a:buFont typeface="Arial" panose="020B0604020202020204" pitchFamily="34" charset="0"/>
+              <a:buNone/>
+              <a:defRPr sz="1600" kern="1200">
+                <a:solidFill>
+                  <a:schemeClr val="tx1"/>
+                </a:solidFill>
+                <a:latin typeface="+mn-lt"/>
+                <a:ea typeface="+mn-ea"/>
+                <a:cs typeface="+mn-cs"/>
+              </a:defRPr>
+            </a:lvl5pPr>
+            <a:lvl6pPr marL="2286000" indent="0" algn="ctr" defTabSz="914400" rtl="0" eaLnBrk="1" latinLnBrk="0" hangingPunct="1">
+              <a:lnSpc>
+                <a:spcPct val="90000"/>
+              </a:lnSpc>
+              <a:spcBef>
+                <a:spcPts val="500"/>
+              </a:spcBef>
+              <a:buFont typeface="Arial" panose="020B0604020202020204" pitchFamily="34" charset="0"/>
+              <a:buNone/>
+              <a:defRPr sz="1600" kern="1200">
+                <a:solidFill>
+                  <a:schemeClr val="tx1"/>
+                </a:solidFill>
+                <a:latin typeface="+mn-lt"/>
+                <a:ea typeface="+mn-ea"/>
+                <a:cs typeface="+mn-cs"/>
+              </a:defRPr>
+            </a:lvl6pPr>
+            <a:lvl7pPr marL="2743200" indent="0" algn="ctr" defTabSz="914400" rtl="0" eaLnBrk="1" latinLnBrk="0" hangingPunct="1">
+              <a:lnSpc>
+                <a:spcPct val="90000"/>
+              </a:lnSpc>
+              <a:spcBef>
+                <a:spcPts val="500"/>
+              </a:spcBef>
+              <a:buFont typeface="Arial" panose="020B0604020202020204" pitchFamily="34" charset="0"/>
+              <a:buNone/>
+              <a:defRPr sz="1600" kern="1200">
+                <a:solidFill>
+                  <a:schemeClr val="tx1"/>
+                </a:solidFill>
+                <a:latin typeface="+mn-lt"/>
+                <a:ea typeface="+mn-ea"/>
+                <a:cs typeface="+mn-cs"/>
+              </a:defRPr>
+            </a:lvl7pPr>
+            <a:lvl8pPr marL="3200400" indent="0" algn="ctr" defTabSz="914400" rtl="0" eaLnBrk="1" latinLnBrk="0" hangingPunct="1">
+              <a:lnSpc>
+                <a:spcPct val="90000"/>
+              </a:lnSpc>
+              <a:spcBef>
+                <a:spcPts val="500"/>
+              </a:spcBef>
+              <a:buFont typeface="Arial" panose="020B0604020202020204" pitchFamily="34" charset="0"/>
+              <a:buNone/>
+              <a:defRPr sz="1600" kern="1200">
+                <a:solidFill>
+                  <a:schemeClr val="tx1"/>
+                </a:solidFill>
+                <a:latin typeface="+mn-lt"/>
+                <a:ea typeface="+mn-ea"/>
+                <a:cs typeface="+mn-cs"/>
+              </a:defRPr>
+            </a:lvl8pPr>
+            <a:lvl9pPr marL="3657600" indent="0" algn="ctr" defTabSz="914400" rtl="0" eaLnBrk="1" latinLnBrk="0" hangingPunct="1">
+              <a:lnSpc>
+                <a:spcPct val="90000"/>
+              </a:lnSpc>
+              <a:spcBef>
+                <a:spcPts val="500"/>
+              </a:spcBef>
+              <a:buFont typeface="Arial" panose="020B0604020202020204" pitchFamily="34" charset="0"/>
+              <a:buNone/>
+              <a:defRPr sz="1600" kern="1200">
+                <a:solidFill>
+                  <a:schemeClr val="tx1"/>
+                </a:solidFill>
+                <a:latin typeface="+mn-lt"/>
+                <a:ea typeface="+mn-ea"/>
+                <a:cs typeface="+mn-cs"/>
+              </a:defRPr>
+            </a:lvl9pPr>
+          </a:lstStyle>
+          <a:p>
+            <a:pPr marL="285750" indent="-285750" algn="l">
+              <a:buFontTx/>
+              <a:buChar char="-"/>
+            </a:pPr>
+            <a:endParaRPr lang="en-US" sz="1800" dirty="0"/>
+          </a:p>
+        </p:txBody>
+      </p:sp>
+      <p:sp>
+        <p:nvSpPr>
+          <p:cNvPr id="2" name="TextBox 1">
+            <a:extLst>
+              <a:ext uri="{FF2B5EF4-FFF2-40B4-BE49-F238E27FC236}">
+                <a16:creationId xmlns:a16="http://schemas.microsoft.com/office/drawing/2014/main" id="{5A6B4745-6A45-A018-AFFD-1DD02C7A4C87}"/>
+              </a:ext>
+            </a:extLst>
+          </p:cNvPr>
+          <p:cNvSpPr txBox="1"/>
+          <p:nvPr/>
+        </p:nvSpPr>
+        <p:spPr>
+          <a:xfrm>
+            <a:off x="522514" y="4114800"/>
+            <a:ext cx="184731" cy="369332"/>
+          </a:xfrm>
+          <a:prstGeom prst="rect">
+            <a:avLst/>
+          </a:prstGeom>
+          <a:noFill/>
+        </p:spPr>
+        <p:txBody>
+          <a:bodyPr wrap="none" rtlCol="0">
+            <a:spAutoFit/>
+          </a:bodyPr>
+          <a:lstStyle/>
+          <a:p>
+            <a:endParaRPr lang="en-VN" dirty="0"/>
+          </a:p>
+        </p:txBody>
+      </p:sp>
+      <p:pic>
+        <p:nvPicPr>
+          <p:cNvPr id="5" name="Picture 4">
+            <a:extLst>
+              <a:ext uri="{FF2B5EF4-FFF2-40B4-BE49-F238E27FC236}">
+                <a16:creationId xmlns:a16="http://schemas.microsoft.com/office/drawing/2014/main" id="{631D2B52-0FB6-429B-2A72-2688E6B479EE}"/>
+              </a:ext>
+            </a:extLst>
+          </p:cNvPr>
+          <p:cNvPicPr>
+            <a:picLocks noChangeAspect="1"/>
+          </p:cNvPicPr>
+          <p:nvPr/>
+        </p:nvPicPr>
+        <p:blipFill>
+          <a:blip r:embed="rId2"/>
+          <a:stretch>
+            <a:fillRect/>
+          </a:stretch>
+        </p:blipFill>
+        <p:spPr>
+          <a:xfrm>
+            <a:off x="-38264" y="2286000"/>
+            <a:ext cx="12262344" cy="1828800"/>
+          </a:xfrm>
+          <a:prstGeom prst="rect">
+            <a:avLst/>
+          </a:prstGeom>
+        </p:spPr>
+      </p:pic>
+    </p:spTree>
+    <p:extLst>
+      <p:ext uri="{BB962C8B-B14F-4D97-AF65-F5344CB8AC3E}">
+        <p14:creationId xmlns:p14="http://schemas.microsoft.com/office/powerpoint/2010/main" val="4246487015"/>
+      </p:ext>
+    </p:extLst>
+  </p:cSld>
+  <p:clrMapOvr>
+    <a:masterClrMapping/>
+  </p:clrMapOvr>
+</p:sld>
+</file>
+
+<file path=ppt/slides/slide22.xml><?xml version="1.0" encoding="utf-8"?>
 <p:sld xmlns:a="http://schemas.openxmlformats.org/drawingml/2006/main" xmlns:r="http://schemas.openxmlformats.org/officeDocument/2006/relationships" xmlns:p="http://schemas.openxmlformats.org/presentationml/2006/main">
   <p:cSld>
     <p:spTree>

</xml_diff>

<commit_message>
update changes to presentation
</commit_message>
<xml_diff>
--- a/Java SE 8 Teaching Material/Chapter 4 - Basic Java Elements.pptx
+++ b/Java SE 8 Teaching Material/Chapter 4 - Basic Java Elements.pptx
@@ -1694,7 +1694,7 @@
           <a:p>
             <a:fld id="{BAA8DE05-51EE-4692-B197-877FA1DAAAED}" type="datetimeFigureOut">
               <a:rPr lang="en-US" smtClean="0"/>
-              <a:t>8/14/24</a:t>
+              <a:t>8/15/24</a:t>
             </a:fld>
             <a:endParaRPr lang="en-US"/>
           </a:p>
@@ -1892,7 +1892,7 @@
           <a:p>
             <a:fld id="{BAA8DE05-51EE-4692-B197-877FA1DAAAED}" type="datetimeFigureOut">
               <a:rPr lang="en-US" smtClean="0"/>
-              <a:t>8/14/24</a:t>
+              <a:t>8/15/24</a:t>
             </a:fld>
             <a:endParaRPr lang="en-US"/>
           </a:p>
@@ -2100,7 +2100,7 @@
           <a:p>
             <a:fld id="{BAA8DE05-51EE-4692-B197-877FA1DAAAED}" type="datetimeFigureOut">
               <a:rPr lang="en-US" smtClean="0"/>
-              <a:t>8/14/24</a:t>
+              <a:t>8/15/24</a:t>
             </a:fld>
             <a:endParaRPr lang="en-US"/>
           </a:p>
@@ -2298,7 +2298,7 @@
           <a:p>
             <a:fld id="{BAA8DE05-51EE-4692-B197-877FA1DAAAED}" type="datetimeFigureOut">
               <a:rPr lang="en-US" smtClean="0"/>
-              <a:t>8/14/24</a:t>
+              <a:t>8/15/24</a:t>
             </a:fld>
             <a:endParaRPr lang="en-US"/>
           </a:p>
@@ -2573,7 +2573,7 @@
           <a:p>
             <a:fld id="{BAA8DE05-51EE-4692-B197-877FA1DAAAED}" type="datetimeFigureOut">
               <a:rPr lang="en-US" smtClean="0"/>
-              <a:t>8/14/24</a:t>
+              <a:t>8/15/24</a:t>
             </a:fld>
             <a:endParaRPr lang="en-US"/>
           </a:p>
@@ -2838,7 +2838,7 @@
           <a:p>
             <a:fld id="{BAA8DE05-51EE-4692-B197-877FA1DAAAED}" type="datetimeFigureOut">
               <a:rPr lang="en-US" smtClean="0"/>
-              <a:t>8/14/24</a:t>
+              <a:t>8/15/24</a:t>
             </a:fld>
             <a:endParaRPr lang="en-US"/>
           </a:p>
@@ -3250,7 +3250,7 @@
           <a:p>
             <a:fld id="{BAA8DE05-51EE-4692-B197-877FA1DAAAED}" type="datetimeFigureOut">
               <a:rPr lang="en-US" smtClean="0"/>
-              <a:t>8/14/24</a:t>
+              <a:t>8/15/24</a:t>
             </a:fld>
             <a:endParaRPr lang="en-US"/>
           </a:p>
@@ -3391,7 +3391,7 @@
           <a:p>
             <a:fld id="{BAA8DE05-51EE-4692-B197-877FA1DAAAED}" type="datetimeFigureOut">
               <a:rPr lang="en-US" smtClean="0"/>
-              <a:t>8/14/24</a:t>
+              <a:t>8/15/24</a:t>
             </a:fld>
             <a:endParaRPr lang="en-US"/>
           </a:p>
@@ -3504,7 +3504,7 @@
           <a:p>
             <a:fld id="{BAA8DE05-51EE-4692-B197-877FA1DAAAED}" type="datetimeFigureOut">
               <a:rPr lang="en-US" smtClean="0"/>
-              <a:t>8/14/24</a:t>
+              <a:t>8/15/24</a:t>
             </a:fld>
             <a:endParaRPr lang="en-US"/>
           </a:p>
@@ -3815,7 +3815,7 @@
           <a:p>
             <a:fld id="{BAA8DE05-51EE-4692-B197-877FA1DAAAED}" type="datetimeFigureOut">
               <a:rPr lang="en-US" smtClean="0"/>
-              <a:t>8/14/24</a:t>
+              <a:t>8/15/24</a:t>
             </a:fld>
             <a:endParaRPr lang="en-US"/>
           </a:p>
@@ -4103,7 +4103,7 @@
           <a:p>
             <a:fld id="{BAA8DE05-51EE-4692-B197-877FA1DAAAED}" type="datetimeFigureOut">
               <a:rPr lang="en-US" smtClean="0"/>
-              <a:t>8/14/24</a:t>
+              <a:t>8/15/24</a:t>
             </a:fld>
             <a:endParaRPr lang="en-US"/>
           </a:p>
@@ -4344,7 +4344,7 @@
           <a:p>
             <a:fld id="{BAA8DE05-51EE-4692-B197-877FA1DAAAED}" type="datetimeFigureOut">
               <a:rPr lang="en-US" smtClean="0"/>
-              <a:t>8/14/24</a:t>
+              <a:t>8/15/24</a:t>
             </a:fld>
             <a:endParaRPr lang="en-US"/>
           </a:p>
@@ -6378,7 +6378,7 @@
             </a:r>
             <a:r>
               <a:rPr lang="en-US" sz="1800" dirty="0"/>
-              <a:t>This initializer is initialized when a new instance of a class is created</a:t>
+              <a:t>This initializer is initialized before a new instance of a class is created</a:t>
             </a:r>
             <a:endParaRPr lang="en-US" sz="1800" b="1" dirty="0"/>
           </a:p>
@@ -13572,7 +13572,15 @@
           <a:p>
             <a:r>
               <a:rPr lang="en-US" sz="1800" b="1" dirty="0"/>
-              <a:t>4.2 Java Identifiers and reversed words - </a:t>
+              <a:t>4.2 Java Identifiers </a:t>
+            </a:r>
+            <a:r>
+              <a:rPr lang="en-US" sz="1800" b="1"/>
+              <a:t>and reserved </a:t>
+            </a:r>
+            <a:r>
+              <a:rPr lang="en-US" sz="1800" b="1" dirty="0"/>
+              <a:t>words - </a:t>
             </a:r>
             <a:r>
               <a:rPr lang="en-US" sz="1800" dirty="0"/>
@@ -16518,13 +16526,10 @@
             </a:r>
           </a:p>
           <a:p>
-            <a:pPr marL="285750" indent="-285750" algn="l">
-              <a:buFontTx/>
-              <a:buChar char="-"/>
-            </a:pPr>
+            <a:pPr algn="l"/>
             <a:r>
               <a:rPr lang="en-US" sz="1800" dirty="0"/>
-              <a:t>However, if there are 2 classes and one of which resides in another package =&gt; You can’t use their simple class name directly (JVM will complain since it will assume that the class that we are referring to belongs to the same package)</a:t>
+              <a:t>- If there are 2 classes and one of which resides in another package =&gt; You can’t use their simple class name directly (JVM will complain since it will assume that the class that we are referring to belongs to the same package)</a:t>
             </a:r>
           </a:p>
           <a:p>

</xml_diff>

<commit_message>
add section 4.5.2 and 4.5.3
</commit_message>
<xml_diff>
--- a/Java SE 8 Teaching Material/Chapter 4 - Basic Java Elements.pptx
+++ b/Java SE 8 Teaching Material/Chapter 4 - Basic Java Elements.pptx
@@ -22,11 +22,13 @@
     <p:sldId id="272" r:id="rId16"/>
     <p:sldId id="278" r:id="rId17"/>
     <p:sldId id="279" r:id="rId18"/>
-    <p:sldId id="273" r:id="rId19"/>
-    <p:sldId id="274" r:id="rId20"/>
-    <p:sldId id="275" r:id="rId21"/>
-    <p:sldId id="276" r:id="rId22"/>
-    <p:sldId id="277" r:id="rId23"/>
+    <p:sldId id="280" r:id="rId19"/>
+    <p:sldId id="281" r:id="rId20"/>
+    <p:sldId id="273" r:id="rId21"/>
+    <p:sldId id="274" r:id="rId22"/>
+    <p:sldId id="275" r:id="rId23"/>
+    <p:sldId id="276" r:id="rId24"/>
+    <p:sldId id="277" r:id="rId25"/>
   </p:sldIdLst>
   <p:sldSz cx="12192000" cy="6858000"/>
   <p:notesSz cx="6858000" cy="9144000"/>
@@ -147,6 +149,8 @@
             <p14:sldId id="272"/>
             <p14:sldId id="278"/>
             <p14:sldId id="279"/>
+            <p14:sldId id="280"/>
+            <p14:sldId id="281"/>
             <p14:sldId id="273"/>
             <p14:sldId id="274"/>
             <p14:sldId id="275"/>
@@ -1694,7 +1698,7 @@
           <a:p>
             <a:fld id="{BAA8DE05-51EE-4692-B197-877FA1DAAAED}" type="datetimeFigureOut">
               <a:rPr lang="en-US" smtClean="0"/>
-              <a:t>8/15/24</a:t>
+              <a:t>8/17/24</a:t>
             </a:fld>
             <a:endParaRPr lang="en-US"/>
           </a:p>
@@ -1892,7 +1896,7 @@
           <a:p>
             <a:fld id="{BAA8DE05-51EE-4692-B197-877FA1DAAAED}" type="datetimeFigureOut">
               <a:rPr lang="en-US" smtClean="0"/>
-              <a:t>8/15/24</a:t>
+              <a:t>8/17/24</a:t>
             </a:fld>
             <a:endParaRPr lang="en-US"/>
           </a:p>
@@ -2100,7 +2104,7 @@
           <a:p>
             <a:fld id="{BAA8DE05-51EE-4692-B197-877FA1DAAAED}" type="datetimeFigureOut">
               <a:rPr lang="en-US" smtClean="0"/>
-              <a:t>8/15/24</a:t>
+              <a:t>8/17/24</a:t>
             </a:fld>
             <a:endParaRPr lang="en-US"/>
           </a:p>
@@ -2298,7 +2302,7 @@
           <a:p>
             <a:fld id="{BAA8DE05-51EE-4692-B197-877FA1DAAAED}" type="datetimeFigureOut">
               <a:rPr lang="en-US" smtClean="0"/>
-              <a:t>8/15/24</a:t>
+              <a:t>8/17/24</a:t>
             </a:fld>
             <a:endParaRPr lang="en-US"/>
           </a:p>
@@ -2573,7 +2577,7 @@
           <a:p>
             <a:fld id="{BAA8DE05-51EE-4692-B197-877FA1DAAAED}" type="datetimeFigureOut">
               <a:rPr lang="en-US" smtClean="0"/>
-              <a:t>8/15/24</a:t>
+              <a:t>8/17/24</a:t>
             </a:fld>
             <a:endParaRPr lang="en-US"/>
           </a:p>
@@ -2838,7 +2842,7 @@
           <a:p>
             <a:fld id="{BAA8DE05-51EE-4692-B197-877FA1DAAAED}" type="datetimeFigureOut">
               <a:rPr lang="en-US" smtClean="0"/>
-              <a:t>8/15/24</a:t>
+              <a:t>8/17/24</a:t>
             </a:fld>
             <a:endParaRPr lang="en-US"/>
           </a:p>
@@ -3250,7 +3254,7 @@
           <a:p>
             <a:fld id="{BAA8DE05-51EE-4692-B197-877FA1DAAAED}" type="datetimeFigureOut">
               <a:rPr lang="en-US" smtClean="0"/>
-              <a:t>8/15/24</a:t>
+              <a:t>8/17/24</a:t>
             </a:fld>
             <a:endParaRPr lang="en-US"/>
           </a:p>
@@ -3391,7 +3395,7 @@
           <a:p>
             <a:fld id="{BAA8DE05-51EE-4692-B197-877FA1DAAAED}" type="datetimeFigureOut">
               <a:rPr lang="en-US" smtClean="0"/>
-              <a:t>8/15/24</a:t>
+              <a:t>8/17/24</a:t>
             </a:fld>
             <a:endParaRPr lang="en-US"/>
           </a:p>
@@ -3504,7 +3508,7 @@
           <a:p>
             <a:fld id="{BAA8DE05-51EE-4692-B197-877FA1DAAAED}" type="datetimeFigureOut">
               <a:rPr lang="en-US" smtClean="0"/>
-              <a:t>8/15/24</a:t>
+              <a:t>8/17/24</a:t>
             </a:fld>
             <a:endParaRPr lang="en-US"/>
           </a:p>
@@ -3815,7 +3819,7 @@
           <a:p>
             <a:fld id="{BAA8DE05-51EE-4692-B197-877FA1DAAAED}" type="datetimeFigureOut">
               <a:rPr lang="en-US" smtClean="0"/>
-              <a:t>8/15/24</a:t>
+              <a:t>8/17/24</a:t>
             </a:fld>
             <a:endParaRPr lang="en-US"/>
           </a:p>
@@ -4103,7 +4107,7 @@
           <a:p>
             <a:fld id="{BAA8DE05-51EE-4692-B197-877FA1DAAAED}" type="datetimeFigureOut">
               <a:rPr lang="en-US" smtClean="0"/>
-              <a:t>8/15/24</a:t>
+              <a:t>8/17/24</a:t>
             </a:fld>
             <a:endParaRPr lang="en-US"/>
           </a:p>
@@ -4344,7 +4348,7 @@
           <a:p>
             <a:fld id="{BAA8DE05-51EE-4692-B197-877FA1DAAAED}" type="datetimeFigureOut">
               <a:rPr lang="en-US" smtClean="0"/>
-              <a:t>8/15/24</a:t>
+              <a:t>8/17/24</a:t>
             </a:fld>
             <a:endParaRPr lang="en-US"/>
           </a:p>
@@ -9649,8 +9653,8 @@
         </p:nvSpPr>
         <p:spPr>
           <a:xfrm>
-            <a:off x="-250372" y="168389"/>
-            <a:ext cx="6901539" cy="303212"/>
+            <a:off x="-2144486" y="304574"/>
+            <a:ext cx="14565083" cy="303212"/>
           </a:xfrm>
         </p:spPr>
         <p:txBody>
@@ -9661,16 +9665,13 @@
           <a:p>
             <a:r>
               <a:rPr lang="en-US" sz="1800" b="1" dirty="0"/>
-              <a:t>4.6 The </a:t>
-            </a:r>
-            <a:r>
-              <a:rPr lang="en-US" sz="1800" b="1" dirty="0" err="1"/>
-              <a:t>Java.lang</a:t>
-            </a:r>
-            <a:r>
-              <a:rPr lang="en-US" sz="1800" b="1" dirty="0"/>
-              <a:t> and other standard Java package</a:t>
-            </a:r>
+              <a:t>4.5 – Advanced Java Compilation and Execution </a:t>
+            </a:r>
+            <a:r>
+              <a:rPr lang="en-US" sz="1800" dirty="0"/>
+              <a:t>– 4.5.2 Packaging classes into Jar</a:t>
+            </a:r>
+            <a:endParaRPr lang="en-US" sz="1800" b="1" dirty="0"/>
           </a:p>
         </p:txBody>
       </p:sp>
@@ -9690,7 +9691,7 @@
         </p:nvSpPr>
         <p:spPr>
           <a:xfrm>
-            <a:off x="-38264" y="820738"/>
+            <a:off x="0" y="820738"/>
             <a:ext cx="12192000" cy="6037262"/>
           </a:xfrm>
           <a:prstGeom prst="rect">
@@ -9869,8 +9870,54 @@
             <a:pPr algn="l"/>
             <a:r>
               <a:rPr lang="en-US" sz="1800" dirty="0"/>
-              <a:t>- One of the largest advantages of Java is the large ready-to-use Java APIs library  </a:t>
-            </a:r>
+              <a:t>- An application may be composed of hundreds or thousands of classes. If the client wants to use the application, they will have to download each “.class” file individually. We can zip the file into “.zip” archive, but then the client still has to unzip all of the class files and then execute it. To prevent this from happening, Java has developed its archive type known as “Java Archive” which is a version “.zip” archive but with an extension of “.jar”</a:t>
+            </a:r>
+          </a:p>
+          <a:p>
+            <a:pPr algn="l"/>
+            <a:r>
+              <a:rPr lang="en-US" sz="1000" b="1" i="1" dirty="0"/>
+              <a:t>(Code Illustration) </a:t>
+            </a:r>
+          </a:p>
+          <a:p>
+            <a:pPr algn="l"/>
+            <a:r>
+              <a:rPr lang="en-US" sz="1800" dirty="0"/>
+              <a:t>- When we are looking inside a ”Jar” file, we will see that the directory structure of a class is maintained. We can see the content of a jar file by open it using </a:t>
+            </a:r>
+            <a:r>
+              <a:rPr lang="en-US" sz="1800" dirty="0" err="1"/>
+              <a:t>WinRar</a:t>
+            </a:r>
+            <a:r>
+              <a:rPr lang="en-US" sz="1800" dirty="0"/>
+              <a:t> or 7zip</a:t>
+            </a:r>
+          </a:p>
+          <a:p>
+            <a:pPr marL="285750" indent="-285750" algn="l">
+              <a:buFontTx/>
+              <a:buChar char="-"/>
+            </a:pPr>
+            <a:r>
+              <a:rPr lang="en-US" sz="1800" dirty="0"/>
+              <a:t>Java allows us to store the information of the Jar file within the Jar file itself, this file is called ”MANIFEST.MF” and it is stored within a folder named “META-INF” of the Jar file. This manifest file has many usages, for example, we can point out the starting position of an application which will allow us to run the Jar file directly either from command line or just click on it. Therefore, we won’t have to specify the FQCN that contains the main method anymore. </a:t>
+            </a:r>
+          </a:p>
+          <a:p>
+            <a:pPr marL="285750" indent="-285750" algn="l">
+              <a:buFontTx/>
+              <a:buChar char="-"/>
+            </a:pPr>
+            <a:r>
+              <a:rPr lang="en-US" sz="1800" dirty="0"/>
+              <a:t>This picture below shows the typical content of a normal manifest file contained in the Jar file</a:t>
+            </a:r>
+          </a:p>
+          <a:p>
+            <a:pPr algn="l"/>
+            <a:endParaRPr lang="en-US" sz="1800" dirty="0"/>
           </a:p>
         </p:txBody>
       </p:sp>
@@ -9906,10 +9953,40 @@
           </a:p>
         </p:txBody>
       </p:sp>
+      <p:pic>
+        <p:nvPicPr>
+          <p:cNvPr id="6" name="Picture 5">
+            <a:extLst>
+              <a:ext uri="{FF2B5EF4-FFF2-40B4-BE49-F238E27FC236}">
+                <a16:creationId xmlns:a16="http://schemas.microsoft.com/office/drawing/2014/main" id="{CFC06A4B-8D89-7634-F492-3CF6B37B150A}"/>
+              </a:ext>
+            </a:extLst>
+          </p:cNvPr>
+          <p:cNvPicPr>
+            <a:picLocks noChangeAspect="1"/>
+          </p:cNvPicPr>
+          <p:nvPr/>
+        </p:nvPicPr>
+        <p:blipFill>
+          <a:blip r:embed="rId2"/>
+          <a:stretch>
+            <a:fillRect/>
+          </a:stretch>
+        </p:blipFill>
+        <p:spPr>
+          <a:xfrm>
+            <a:off x="2969987" y="4614760"/>
+            <a:ext cx="5664200" cy="1206500"/>
+          </a:xfrm>
+          <a:prstGeom prst="rect">
+            <a:avLst/>
+          </a:prstGeom>
+        </p:spPr>
+      </p:pic>
     </p:spTree>
     <p:extLst>
       <p:ext uri="{BB962C8B-B14F-4D97-AF65-F5344CB8AC3E}">
-        <p14:creationId xmlns:p14="http://schemas.microsoft.com/office/powerpoint/2010/main" val="872767749"/>
+        <p14:creationId xmlns:p14="http://schemas.microsoft.com/office/powerpoint/2010/main" val="4077561703"/>
       </p:ext>
     </p:extLst>
   </p:cSld>
@@ -9953,6 +10030,202 @@
                                           <p:spTgt spid="4">
                                             <p:txEl>
                                               <p:pRg st="0" end="0"/>
+                                            </p:txEl>
+                                          </p:spTgt>
+                                        </p:tgtEl>
+                                        <p:attrNameLst>
+                                          <p:attrName>style.visibility</p:attrName>
+                                        </p:attrNameLst>
+                                      </p:cBhvr>
+                                      <p:to>
+                                        <p:strVal val="visible"/>
+                                      </p:to>
+                                    </p:set>
+                                  </p:childTnLst>
+                                </p:cTn>
+                              </p:par>
+                            </p:childTnLst>
+                          </p:cTn>
+                        </p:par>
+                      </p:childTnLst>
+                    </p:cTn>
+                  </p:par>
+                  <p:par>
+                    <p:cTn id="7" fill="hold">
+                      <p:stCondLst>
+                        <p:cond delay="indefinite"/>
+                      </p:stCondLst>
+                      <p:childTnLst>
+                        <p:par>
+                          <p:cTn id="8" fill="hold">
+                            <p:stCondLst>
+                              <p:cond delay="0"/>
+                            </p:stCondLst>
+                            <p:childTnLst>
+                              <p:par>
+                                <p:cTn id="9" presetID="1" presetClass="entr" presetSubtype="0" fill="hold" nodeType="clickEffect">
+                                  <p:stCondLst>
+                                    <p:cond delay="0"/>
+                                  </p:stCondLst>
+                                  <p:childTnLst>
+                                    <p:set>
+                                      <p:cBhvr>
+                                        <p:cTn id="10" dur="1" fill="hold">
+                                          <p:stCondLst>
+                                            <p:cond delay="0"/>
+                                          </p:stCondLst>
+                                        </p:cTn>
+                                        <p:tgtEl>
+                                          <p:spTgt spid="4">
+                                            <p:txEl>
+                                              <p:pRg st="1" end="1"/>
+                                            </p:txEl>
+                                          </p:spTgt>
+                                        </p:tgtEl>
+                                        <p:attrNameLst>
+                                          <p:attrName>style.visibility</p:attrName>
+                                        </p:attrNameLst>
+                                      </p:cBhvr>
+                                      <p:to>
+                                        <p:strVal val="visible"/>
+                                      </p:to>
+                                    </p:set>
+                                  </p:childTnLst>
+                                </p:cTn>
+                              </p:par>
+                            </p:childTnLst>
+                          </p:cTn>
+                        </p:par>
+                      </p:childTnLst>
+                    </p:cTn>
+                  </p:par>
+                  <p:par>
+                    <p:cTn id="11" fill="hold">
+                      <p:stCondLst>
+                        <p:cond delay="indefinite"/>
+                      </p:stCondLst>
+                      <p:childTnLst>
+                        <p:par>
+                          <p:cTn id="12" fill="hold">
+                            <p:stCondLst>
+                              <p:cond delay="0"/>
+                            </p:stCondLst>
+                            <p:childTnLst>
+                              <p:par>
+                                <p:cTn id="13" presetID="1" presetClass="entr" presetSubtype="0" fill="hold" nodeType="clickEffect">
+                                  <p:stCondLst>
+                                    <p:cond delay="0"/>
+                                  </p:stCondLst>
+                                  <p:childTnLst>
+                                    <p:set>
+                                      <p:cBhvr>
+                                        <p:cTn id="14" dur="1" fill="hold">
+                                          <p:stCondLst>
+                                            <p:cond delay="0"/>
+                                          </p:stCondLst>
+                                        </p:cTn>
+                                        <p:tgtEl>
+                                          <p:spTgt spid="4">
+                                            <p:txEl>
+                                              <p:pRg st="2" end="2"/>
+                                            </p:txEl>
+                                          </p:spTgt>
+                                        </p:tgtEl>
+                                        <p:attrNameLst>
+                                          <p:attrName>style.visibility</p:attrName>
+                                        </p:attrNameLst>
+                                      </p:cBhvr>
+                                      <p:to>
+                                        <p:strVal val="visible"/>
+                                      </p:to>
+                                    </p:set>
+                                  </p:childTnLst>
+                                </p:cTn>
+                              </p:par>
+                            </p:childTnLst>
+                          </p:cTn>
+                        </p:par>
+                      </p:childTnLst>
+                    </p:cTn>
+                  </p:par>
+                  <p:par>
+                    <p:cTn id="15" fill="hold">
+                      <p:stCondLst>
+                        <p:cond delay="indefinite"/>
+                      </p:stCondLst>
+                      <p:childTnLst>
+                        <p:par>
+                          <p:cTn id="16" fill="hold">
+                            <p:stCondLst>
+                              <p:cond delay="0"/>
+                            </p:stCondLst>
+                            <p:childTnLst>
+                              <p:par>
+                                <p:cTn id="17" presetID="1" presetClass="entr" presetSubtype="0" fill="hold" nodeType="clickEffect">
+                                  <p:stCondLst>
+                                    <p:cond delay="0"/>
+                                  </p:stCondLst>
+                                  <p:childTnLst>
+                                    <p:set>
+                                      <p:cBhvr>
+                                        <p:cTn id="18" dur="1" fill="hold">
+                                          <p:stCondLst>
+                                            <p:cond delay="0"/>
+                                          </p:stCondLst>
+                                        </p:cTn>
+                                        <p:tgtEl>
+                                          <p:spTgt spid="4">
+                                            <p:txEl>
+                                              <p:pRg st="3" end="3"/>
+                                            </p:txEl>
+                                          </p:spTgt>
+                                        </p:tgtEl>
+                                        <p:attrNameLst>
+                                          <p:attrName>style.visibility</p:attrName>
+                                        </p:attrNameLst>
+                                      </p:cBhvr>
+                                      <p:to>
+                                        <p:strVal val="visible"/>
+                                      </p:to>
+                                    </p:set>
+                                  </p:childTnLst>
+                                </p:cTn>
+                              </p:par>
+                            </p:childTnLst>
+                          </p:cTn>
+                        </p:par>
+                      </p:childTnLst>
+                    </p:cTn>
+                  </p:par>
+                  <p:par>
+                    <p:cTn id="19" fill="hold">
+                      <p:stCondLst>
+                        <p:cond delay="indefinite"/>
+                      </p:stCondLst>
+                      <p:childTnLst>
+                        <p:par>
+                          <p:cTn id="20" fill="hold">
+                            <p:stCondLst>
+                              <p:cond delay="0"/>
+                            </p:stCondLst>
+                            <p:childTnLst>
+                              <p:par>
+                                <p:cTn id="21" presetID="1" presetClass="entr" presetSubtype="0" fill="hold" nodeType="clickEffect">
+                                  <p:stCondLst>
+                                    <p:cond delay="0"/>
+                                  </p:stCondLst>
+                                  <p:childTnLst>
+                                    <p:set>
+                                      <p:cBhvr>
+                                        <p:cTn id="22" dur="1" fill="hold">
+                                          <p:stCondLst>
+                                            <p:cond delay="0"/>
+                                          </p:stCondLst>
+                                        </p:cTn>
+                                        <p:tgtEl>
+                                          <p:spTgt spid="4">
+                                            <p:txEl>
+                                              <p:pRg st="4" end="4"/>
                                             </p:txEl>
                                           </p:spTgt>
                                         </p:tgtEl>
@@ -10033,8 +10306,8 @@
         </p:nvSpPr>
         <p:spPr>
           <a:xfrm>
-            <a:off x="-250372" y="168389"/>
-            <a:ext cx="6901539" cy="303212"/>
+            <a:off x="-2057400" y="315460"/>
+            <a:ext cx="14565083" cy="303212"/>
           </a:xfrm>
         </p:spPr>
         <p:txBody>
@@ -10045,16 +10318,265 @@
           <a:p>
             <a:r>
               <a:rPr lang="en-US" sz="1800" b="1" dirty="0"/>
-              <a:t>4.6 The </a:t>
-            </a:r>
-            <a:r>
-              <a:rPr lang="en-US" sz="1800" b="1" dirty="0" err="1"/>
-              <a:t>Java.lang</a:t>
-            </a:r>
-            <a:r>
-              <a:rPr lang="en-US" sz="1800" b="1" dirty="0"/>
-              <a:t> and other standard Java package</a:t>
-            </a:r>
+              <a:t>4.5 – Advanced Java Compilation and Execution </a:t>
+            </a:r>
+            <a:r>
+              <a:rPr lang="en-US" sz="1800" dirty="0"/>
+              <a:t>– 4.5.3 Compilation error VS exception at run time</a:t>
+            </a:r>
+            <a:endParaRPr lang="en-US" sz="1800" b="1" dirty="0"/>
+          </a:p>
+        </p:txBody>
+      </p:sp>
+      <p:sp>
+        <p:nvSpPr>
+          <p:cNvPr id="4" name="Subtitle 2">
+            <a:extLst>
+              <a:ext uri="{FF2B5EF4-FFF2-40B4-BE49-F238E27FC236}">
+                <a16:creationId xmlns:a16="http://schemas.microsoft.com/office/drawing/2014/main" id="{BBA13038-CAB8-FCA0-CDE8-65E40C2F10A3}"/>
+              </a:ext>
+            </a:extLst>
+          </p:cNvPr>
+          <p:cNvSpPr txBox="1">
+            <a:spLocks/>
+          </p:cNvSpPr>
+          <p:nvPr/>
+        </p:nvSpPr>
+        <p:spPr>
+          <a:xfrm>
+            <a:off x="0" y="820738"/>
+            <a:ext cx="12192000" cy="6037262"/>
+          </a:xfrm>
+          <a:prstGeom prst="rect">
+            <a:avLst/>
+          </a:prstGeom>
+        </p:spPr>
+        <p:txBody>
+          <a:bodyPr vert="horz" lIns="91440" tIns="45720" rIns="91440" bIns="45720" rtlCol="0">
+            <a:normAutofit/>
+          </a:bodyPr>
+          <a:lstStyle>
+            <a:lvl1pPr marL="0" indent="0" algn="ctr" defTabSz="914400" rtl="0" eaLnBrk="1" latinLnBrk="0" hangingPunct="1">
+              <a:lnSpc>
+                <a:spcPct val="90000"/>
+              </a:lnSpc>
+              <a:spcBef>
+                <a:spcPts val="1000"/>
+              </a:spcBef>
+              <a:buFont typeface="Arial" panose="020B0604020202020204" pitchFamily="34" charset="0"/>
+              <a:buNone/>
+              <a:defRPr sz="2400" kern="1200">
+                <a:solidFill>
+                  <a:schemeClr val="tx1"/>
+                </a:solidFill>
+                <a:latin typeface="+mn-lt"/>
+                <a:ea typeface="+mn-ea"/>
+                <a:cs typeface="+mn-cs"/>
+              </a:defRPr>
+            </a:lvl1pPr>
+            <a:lvl2pPr marL="457200" indent="0" algn="ctr" defTabSz="914400" rtl="0" eaLnBrk="1" latinLnBrk="0" hangingPunct="1">
+              <a:lnSpc>
+                <a:spcPct val="90000"/>
+              </a:lnSpc>
+              <a:spcBef>
+                <a:spcPts val="500"/>
+              </a:spcBef>
+              <a:buFont typeface="Arial" panose="020B0604020202020204" pitchFamily="34" charset="0"/>
+              <a:buNone/>
+              <a:defRPr sz="2000" kern="1200">
+                <a:solidFill>
+                  <a:schemeClr val="tx1"/>
+                </a:solidFill>
+                <a:latin typeface="+mn-lt"/>
+                <a:ea typeface="+mn-ea"/>
+                <a:cs typeface="+mn-cs"/>
+              </a:defRPr>
+            </a:lvl2pPr>
+            <a:lvl3pPr marL="914400" indent="0" algn="ctr" defTabSz="914400" rtl="0" eaLnBrk="1" latinLnBrk="0" hangingPunct="1">
+              <a:lnSpc>
+                <a:spcPct val="90000"/>
+              </a:lnSpc>
+              <a:spcBef>
+                <a:spcPts val="500"/>
+              </a:spcBef>
+              <a:buFont typeface="Arial" panose="020B0604020202020204" pitchFamily="34" charset="0"/>
+              <a:buNone/>
+              <a:defRPr sz="1800" kern="1200">
+                <a:solidFill>
+                  <a:schemeClr val="tx1"/>
+                </a:solidFill>
+                <a:latin typeface="+mn-lt"/>
+                <a:ea typeface="+mn-ea"/>
+                <a:cs typeface="+mn-cs"/>
+              </a:defRPr>
+            </a:lvl3pPr>
+            <a:lvl4pPr marL="1371600" indent="0" algn="ctr" defTabSz="914400" rtl="0" eaLnBrk="1" latinLnBrk="0" hangingPunct="1">
+              <a:lnSpc>
+                <a:spcPct val="90000"/>
+              </a:lnSpc>
+              <a:spcBef>
+                <a:spcPts val="500"/>
+              </a:spcBef>
+              <a:buFont typeface="Arial" panose="020B0604020202020204" pitchFamily="34" charset="0"/>
+              <a:buNone/>
+              <a:defRPr sz="1600" kern="1200">
+                <a:solidFill>
+                  <a:schemeClr val="tx1"/>
+                </a:solidFill>
+                <a:latin typeface="+mn-lt"/>
+                <a:ea typeface="+mn-ea"/>
+                <a:cs typeface="+mn-cs"/>
+              </a:defRPr>
+            </a:lvl4pPr>
+            <a:lvl5pPr marL="1828800" indent="0" algn="ctr" defTabSz="914400" rtl="0" eaLnBrk="1" latinLnBrk="0" hangingPunct="1">
+              <a:lnSpc>
+                <a:spcPct val="90000"/>
+              </a:lnSpc>
+              <a:spcBef>
+                <a:spcPts val="500"/>
+              </a:spcBef>
+              <a:buFont typeface="Arial" panose="020B0604020202020204" pitchFamily="34" charset="0"/>
+              <a:buNone/>
+              <a:defRPr sz="1600" kern="1200">
+                <a:solidFill>
+                  <a:schemeClr val="tx1"/>
+                </a:solidFill>
+                <a:latin typeface="+mn-lt"/>
+                <a:ea typeface="+mn-ea"/>
+                <a:cs typeface="+mn-cs"/>
+              </a:defRPr>
+            </a:lvl5pPr>
+            <a:lvl6pPr marL="2286000" indent="0" algn="ctr" defTabSz="914400" rtl="0" eaLnBrk="1" latinLnBrk="0" hangingPunct="1">
+              <a:lnSpc>
+                <a:spcPct val="90000"/>
+              </a:lnSpc>
+              <a:spcBef>
+                <a:spcPts val="500"/>
+              </a:spcBef>
+              <a:buFont typeface="Arial" panose="020B0604020202020204" pitchFamily="34" charset="0"/>
+              <a:buNone/>
+              <a:defRPr sz="1600" kern="1200">
+                <a:solidFill>
+                  <a:schemeClr val="tx1"/>
+                </a:solidFill>
+                <a:latin typeface="+mn-lt"/>
+                <a:ea typeface="+mn-ea"/>
+                <a:cs typeface="+mn-cs"/>
+              </a:defRPr>
+            </a:lvl6pPr>
+            <a:lvl7pPr marL="2743200" indent="0" algn="ctr" defTabSz="914400" rtl="0" eaLnBrk="1" latinLnBrk="0" hangingPunct="1">
+              <a:lnSpc>
+                <a:spcPct val="90000"/>
+              </a:lnSpc>
+              <a:spcBef>
+                <a:spcPts val="500"/>
+              </a:spcBef>
+              <a:buFont typeface="Arial" panose="020B0604020202020204" pitchFamily="34" charset="0"/>
+              <a:buNone/>
+              <a:defRPr sz="1600" kern="1200">
+                <a:solidFill>
+                  <a:schemeClr val="tx1"/>
+                </a:solidFill>
+                <a:latin typeface="+mn-lt"/>
+                <a:ea typeface="+mn-ea"/>
+                <a:cs typeface="+mn-cs"/>
+              </a:defRPr>
+            </a:lvl7pPr>
+            <a:lvl8pPr marL="3200400" indent="0" algn="ctr" defTabSz="914400" rtl="0" eaLnBrk="1" latinLnBrk="0" hangingPunct="1">
+              <a:lnSpc>
+                <a:spcPct val="90000"/>
+              </a:lnSpc>
+              <a:spcBef>
+                <a:spcPts val="500"/>
+              </a:spcBef>
+              <a:buFont typeface="Arial" panose="020B0604020202020204" pitchFamily="34" charset="0"/>
+              <a:buNone/>
+              <a:defRPr sz="1600" kern="1200">
+                <a:solidFill>
+                  <a:schemeClr val="tx1"/>
+                </a:solidFill>
+                <a:latin typeface="+mn-lt"/>
+                <a:ea typeface="+mn-ea"/>
+                <a:cs typeface="+mn-cs"/>
+              </a:defRPr>
+            </a:lvl8pPr>
+            <a:lvl9pPr marL="3657600" indent="0" algn="ctr" defTabSz="914400" rtl="0" eaLnBrk="1" latinLnBrk="0" hangingPunct="1">
+              <a:lnSpc>
+                <a:spcPct val="90000"/>
+              </a:lnSpc>
+              <a:spcBef>
+                <a:spcPts val="500"/>
+              </a:spcBef>
+              <a:buFont typeface="Arial" panose="020B0604020202020204" pitchFamily="34" charset="0"/>
+              <a:buNone/>
+              <a:defRPr sz="1600" kern="1200">
+                <a:solidFill>
+                  <a:schemeClr val="tx1"/>
+                </a:solidFill>
+                <a:latin typeface="+mn-lt"/>
+                <a:ea typeface="+mn-ea"/>
+                <a:cs typeface="+mn-cs"/>
+              </a:defRPr>
+            </a:lvl9pPr>
+          </a:lstStyle>
+          <a:p>
+            <a:pPr marL="285750" indent="-285750" algn="l">
+              <a:buFontTx/>
+              <a:buChar char="-"/>
+            </a:pPr>
+            <a:r>
+              <a:rPr lang="en-US" sz="1800" dirty="0"/>
+              <a:t>A compilation error will happen if the developer tries to violate the syntax rules of the programming language (</a:t>
+            </a:r>
+            <a:r>
+              <a:rPr lang="en-US" sz="1800" dirty="0" err="1"/>
+              <a:t>e.g</a:t>
+            </a:r>
+            <a:r>
+              <a:rPr lang="en-US" sz="1800" dirty="0"/>
+              <a:t>: if a dev tries to put package statement at the end of the program =&gt; a compilation error will arise since this code is syntactically incorrect) </a:t>
+            </a:r>
+          </a:p>
+          <a:p>
+            <a:pPr marL="285750" indent="-285750" algn="l">
+              <a:buFontTx/>
+              <a:buChar char="-"/>
+            </a:pPr>
+            <a:r>
+              <a:rPr lang="en-US" sz="1800" dirty="0"/>
+              <a:t>Moreover, a compilation error will happen if the logic of the code is also incorrect (</a:t>
+            </a:r>
+            <a:r>
+              <a:rPr lang="en-US" sz="1800" dirty="0" err="1"/>
+              <a:t>e.g</a:t>
+            </a:r>
+            <a:r>
+              <a:rPr lang="en-US" sz="1800" dirty="0"/>
+              <a:t>: “byte b = 200;” will result in a compilation error since the compiler still understands that a that value is too large for a byte, while “int I = 10/0” won’t result in any errors since the compiler can’t execute any codes) </a:t>
+            </a:r>
+          </a:p>
+          <a:p>
+            <a:pPr marL="285750" indent="-285750" algn="l">
+              <a:buFontTx/>
+              <a:buChar char="-"/>
+            </a:pPr>
+            <a:r>
+              <a:rPr lang="en-US" sz="1800" dirty="0"/>
+              <a:t>On the other hand, JVM always protects its integrity and type safety. Unlike the compiler, JVM is capable of executing and understanding code flawlessly. Therefore, if JVM sees any codes that might damage its integrity or its type safety, it will automatically return an “exception” =&gt; any potential illegal activity that hasn’t been detected by compiler yet will be caught by JVM (</a:t>
+            </a:r>
+            <a:r>
+              <a:rPr lang="en-US" sz="1800" dirty="0" err="1"/>
+              <a:t>e.g</a:t>
+            </a:r>
+            <a:r>
+              <a:rPr lang="en-US" sz="1800" dirty="0"/>
+              <a:t>: divide </a:t>
+            </a:r>
+            <a:r>
+              <a:rPr lang="en-US" sz="1800"/>
+              <a:t>a number by 0) </a:t>
+            </a:r>
+            <a:endParaRPr lang="en-US" sz="1800" dirty="0"/>
           </a:p>
         </p:txBody>
       </p:sp>
@@ -10090,81 +10612,193 @@
           </a:p>
         </p:txBody>
       </p:sp>
-      <p:pic>
-        <p:nvPicPr>
-          <p:cNvPr id="5" name="Picture 4">
-            <a:extLst>
-              <a:ext uri="{FF2B5EF4-FFF2-40B4-BE49-F238E27FC236}">
-                <a16:creationId xmlns:a16="http://schemas.microsoft.com/office/drawing/2014/main" id="{59BAEE82-E255-137D-E972-546D5462DA7C}"/>
-              </a:ext>
-            </a:extLst>
-          </p:cNvPr>
-          <p:cNvPicPr>
-            <a:picLocks noChangeAspect="1"/>
-          </p:cNvPicPr>
-          <p:nvPr/>
-        </p:nvPicPr>
-        <p:blipFill>
-          <a:blip r:embed="rId2"/>
-          <a:stretch>
-            <a:fillRect/>
-          </a:stretch>
-        </p:blipFill>
-        <p:spPr>
-          <a:xfrm>
-            <a:off x="1328057" y="471601"/>
-            <a:ext cx="9154886" cy="5420057"/>
-          </a:xfrm>
-          <a:prstGeom prst="rect">
-            <a:avLst/>
-          </a:prstGeom>
-        </p:spPr>
-      </p:pic>
-      <p:sp>
-        <p:nvSpPr>
-          <p:cNvPr id="6" name="TextBox 5">
-            <a:extLst>
-              <a:ext uri="{FF2B5EF4-FFF2-40B4-BE49-F238E27FC236}">
-                <a16:creationId xmlns:a16="http://schemas.microsoft.com/office/drawing/2014/main" id="{65184111-F993-0452-0732-654807B1458B}"/>
-              </a:ext>
-            </a:extLst>
-          </p:cNvPr>
-          <p:cNvSpPr txBox="1"/>
-          <p:nvPr/>
-        </p:nvSpPr>
-        <p:spPr>
-          <a:xfrm>
-            <a:off x="811092" y="5838128"/>
-            <a:ext cx="10188815" cy="369332"/>
-          </a:xfrm>
-          <a:prstGeom prst="rect">
-            <a:avLst/>
-          </a:prstGeom>
-          <a:noFill/>
-        </p:spPr>
-        <p:txBody>
-          <a:bodyPr wrap="none" rtlCol="0">
-            <a:spAutoFit/>
-          </a:bodyPr>
-          <a:lstStyle/>
-          <a:p>
-            <a:r>
-              <a:rPr lang="en-VN" i="1" dirty="0"/>
-              <a:t>This picture shows some of the most important package that are commonly used in Java Development</a:t>
-            </a:r>
-          </a:p>
-        </p:txBody>
-      </p:sp>
     </p:spTree>
     <p:extLst>
       <p:ext uri="{BB962C8B-B14F-4D97-AF65-F5344CB8AC3E}">
-        <p14:creationId xmlns:p14="http://schemas.microsoft.com/office/powerpoint/2010/main" val="1293699709"/>
+        <p14:creationId xmlns:p14="http://schemas.microsoft.com/office/powerpoint/2010/main" val="1770007952"/>
       </p:ext>
     </p:extLst>
   </p:cSld>
   <p:clrMapOvr>
     <a:masterClrMapping/>
   </p:clrMapOvr>
+  <p:timing>
+    <p:tnLst>
+      <p:par>
+        <p:cTn id="1" dur="indefinite" restart="never" nodeType="tmRoot">
+          <p:childTnLst>
+            <p:seq concurrent="1" nextAc="seek">
+              <p:cTn id="2" dur="indefinite" nodeType="mainSeq">
+                <p:childTnLst>
+                  <p:par>
+                    <p:cTn id="3" fill="hold">
+                      <p:stCondLst>
+                        <p:cond delay="indefinite"/>
+                      </p:stCondLst>
+                      <p:childTnLst>
+                        <p:par>
+                          <p:cTn id="4" fill="hold">
+                            <p:stCondLst>
+                              <p:cond delay="0"/>
+                            </p:stCondLst>
+                            <p:childTnLst>
+                              <p:par>
+                                <p:cTn id="5" presetID="1" presetClass="entr" presetSubtype="0" fill="hold" nodeType="clickEffect">
+                                  <p:stCondLst>
+                                    <p:cond delay="0"/>
+                                  </p:stCondLst>
+                                  <p:childTnLst>
+                                    <p:set>
+                                      <p:cBhvr>
+                                        <p:cTn id="6" dur="1" fill="hold">
+                                          <p:stCondLst>
+                                            <p:cond delay="0"/>
+                                          </p:stCondLst>
+                                        </p:cTn>
+                                        <p:tgtEl>
+                                          <p:spTgt spid="4">
+                                            <p:txEl>
+                                              <p:pRg st="0" end="0"/>
+                                            </p:txEl>
+                                          </p:spTgt>
+                                        </p:tgtEl>
+                                        <p:attrNameLst>
+                                          <p:attrName>style.visibility</p:attrName>
+                                        </p:attrNameLst>
+                                      </p:cBhvr>
+                                      <p:to>
+                                        <p:strVal val="visible"/>
+                                      </p:to>
+                                    </p:set>
+                                  </p:childTnLst>
+                                </p:cTn>
+                              </p:par>
+                            </p:childTnLst>
+                          </p:cTn>
+                        </p:par>
+                      </p:childTnLst>
+                    </p:cTn>
+                  </p:par>
+                  <p:par>
+                    <p:cTn id="7" fill="hold">
+                      <p:stCondLst>
+                        <p:cond delay="indefinite"/>
+                      </p:stCondLst>
+                      <p:childTnLst>
+                        <p:par>
+                          <p:cTn id="8" fill="hold">
+                            <p:stCondLst>
+                              <p:cond delay="0"/>
+                            </p:stCondLst>
+                            <p:childTnLst>
+                              <p:par>
+                                <p:cTn id="9" presetID="1" presetClass="entr" presetSubtype="0" fill="hold" nodeType="clickEffect">
+                                  <p:stCondLst>
+                                    <p:cond delay="0"/>
+                                  </p:stCondLst>
+                                  <p:childTnLst>
+                                    <p:set>
+                                      <p:cBhvr>
+                                        <p:cTn id="10" dur="1" fill="hold">
+                                          <p:stCondLst>
+                                            <p:cond delay="0"/>
+                                          </p:stCondLst>
+                                        </p:cTn>
+                                        <p:tgtEl>
+                                          <p:spTgt spid="4">
+                                            <p:txEl>
+                                              <p:pRg st="1" end="1"/>
+                                            </p:txEl>
+                                          </p:spTgt>
+                                        </p:tgtEl>
+                                        <p:attrNameLst>
+                                          <p:attrName>style.visibility</p:attrName>
+                                        </p:attrNameLst>
+                                      </p:cBhvr>
+                                      <p:to>
+                                        <p:strVal val="visible"/>
+                                      </p:to>
+                                    </p:set>
+                                  </p:childTnLst>
+                                </p:cTn>
+                              </p:par>
+                            </p:childTnLst>
+                          </p:cTn>
+                        </p:par>
+                      </p:childTnLst>
+                    </p:cTn>
+                  </p:par>
+                  <p:par>
+                    <p:cTn id="11" fill="hold">
+                      <p:stCondLst>
+                        <p:cond delay="indefinite"/>
+                      </p:stCondLst>
+                      <p:childTnLst>
+                        <p:par>
+                          <p:cTn id="12" fill="hold">
+                            <p:stCondLst>
+                              <p:cond delay="0"/>
+                            </p:stCondLst>
+                            <p:childTnLst>
+                              <p:par>
+                                <p:cTn id="13" presetID="1" presetClass="entr" presetSubtype="0" fill="hold" nodeType="clickEffect">
+                                  <p:stCondLst>
+                                    <p:cond delay="0"/>
+                                  </p:stCondLst>
+                                  <p:childTnLst>
+                                    <p:set>
+                                      <p:cBhvr>
+                                        <p:cTn id="14" dur="1" fill="hold">
+                                          <p:stCondLst>
+                                            <p:cond delay="0"/>
+                                          </p:stCondLst>
+                                        </p:cTn>
+                                        <p:tgtEl>
+                                          <p:spTgt spid="4">
+                                            <p:txEl>
+                                              <p:pRg st="2" end="2"/>
+                                            </p:txEl>
+                                          </p:spTgt>
+                                        </p:tgtEl>
+                                        <p:attrNameLst>
+                                          <p:attrName>style.visibility</p:attrName>
+                                        </p:attrNameLst>
+                                      </p:cBhvr>
+                                      <p:to>
+                                        <p:strVal val="visible"/>
+                                      </p:to>
+                                    </p:set>
+                                  </p:childTnLst>
+                                </p:cTn>
+                              </p:par>
+                            </p:childTnLst>
+                          </p:cTn>
+                        </p:par>
+                      </p:childTnLst>
+                    </p:cTn>
+                  </p:par>
+                </p:childTnLst>
+              </p:cTn>
+              <p:prevCondLst>
+                <p:cond evt="onPrev" delay="0">
+                  <p:tgtEl>
+                    <p:sldTgt/>
+                  </p:tgtEl>
+                </p:cond>
+              </p:prevCondLst>
+              <p:nextCondLst>
+                <p:cond evt="onNext" delay="0">
+                  <p:tgtEl>
+                    <p:sldTgt/>
+                  </p:tgtEl>
+                </p:cond>
+              </p:nextCondLst>
+            </p:seq>
+          </p:childTnLst>
+        </p:cTn>
+      </p:par>
+    </p:tnLst>
+  </p:timing>
 </p:sld>
 </file>
 
@@ -11652,6 +12286,560 @@
             </a:lvl9pPr>
           </a:lstStyle>
           <a:p>
+            <a:pPr algn="l"/>
+            <a:r>
+              <a:rPr lang="en-US" sz="1800" dirty="0"/>
+              <a:t>- One of the largest advantages of Java is the large ready-to-use Java APIs library  </a:t>
+            </a:r>
+          </a:p>
+        </p:txBody>
+      </p:sp>
+      <p:sp>
+        <p:nvSpPr>
+          <p:cNvPr id="2" name="TextBox 1">
+            <a:extLst>
+              <a:ext uri="{FF2B5EF4-FFF2-40B4-BE49-F238E27FC236}">
+                <a16:creationId xmlns:a16="http://schemas.microsoft.com/office/drawing/2014/main" id="{5A6B4745-6A45-A018-AFFD-1DD02C7A4C87}"/>
+              </a:ext>
+            </a:extLst>
+          </p:cNvPr>
+          <p:cNvSpPr txBox="1"/>
+          <p:nvPr/>
+        </p:nvSpPr>
+        <p:spPr>
+          <a:xfrm>
+            <a:off x="522514" y="4114800"/>
+            <a:ext cx="184731" cy="369332"/>
+          </a:xfrm>
+          <a:prstGeom prst="rect">
+            <a:avLst/>
+          </a:prstGeom>
+          <a:noFill/>
+        </p:spPr>
+        <p:txBody>
+          <a:bodyPr wrap="none" rtlCol="0">
+            <a:spAutoFit/>
+          </a:bodyPr>
+          <a:lstStyle/>
+          <a:p>
+            <a:endParaRPr lang="en-VN" dirty="0"/>
+          </a:p>
+        </p:txBody>
+      </p:sp>
+    </p:spTree>
+    <p:extLst>
+      <p:ext uri="{BB962C8B-B14F-4D97-AF65-F5344CB8AC3E}">
+        <p14:creationId xmlns:p14="http://schemas.microsoft.com/office/powerpoint/2010/main" val="872767749"/>
+      </p:ext>
+    </p:extLst>
+  </p:cSld>
+  <p:clrMapOvr>
+    <a:masterClrMapping/>
+  </p:clrMapOvr>
+  <p:timing>
+    <p:tnLst>
+      <p:par>
+        <p:cTn id="1" dur="indefinite" restart="never" nodeType="tmRoot">
+          <p:childTnLst>
+            <p:seq concurrent="1" nextAc="seek">
+              <p:cTn id="2" dur="indefinite" nodeType="mainSeq">
+                <p:childTnLst>
+                  <p:par>
+                    <p:cTn id="3" fill="hold">
+                      <p:stCondLst>
+                        <p:cond delay="indefinite"/>
+                      </p:stCondLst>
+                      <p:childTnLst>
+                        <p:par>
+                          <p:cTn id="4" fill="hold">
+                            <p:stCondLst>
+                              <p:cond delay="0"/>
+                            </p:stCondLst>
+                            <p:childTnLst>
+                              <p:par>
+                                <p:cTn id="5" presetID="1" presetClass="entr" presetSubtype="0" fill="hold" nodeType="clickEffect">
+                                  <p:stCondLst>
+                                    <p:cond delay="0"/>
+                                  </p:stCondLst>
+                                  <p:childTnLst>
+                                    <p:set>
+                                      <p:cBhvr>
+                                        <p:cTn id="6" dur="1" fill="hold">
+                                          <p:stCondLst>
+                                            <p:cond delay="0"/>
+                                          </p:stCondLst>
+                                        </p:cTn>
+                                        <p:tgtEl>
+                                          <p:spTgt spid="4">
+                                            <p:txEl>
+                                              <p:pRg st="0" end="0"/>
+                                            </p:txEl>
+                                          </p:spTgt>
+                                        </p:tgtEl>
+                                        <p:attrNameLst>
+                                          <p:attrName>style.visibility</p:attrName>
+                                        </p:attrNameLst>
+                                      </p:cBhvr>
+                                      <p:to>
+                                        <p:strVal val="visible"/>
+                                      </p:to>
+                                    </p:set>
+                                  </p:childTnLst>
+                                </p:cTn>
+                              </p:par>
+                            </p:childTnLst>
+                          </p:cTn>
+                        </p:par>
+                      </p:childTnLst>
+                    </p:cTn>
+                  </p:par>
+                </p:childTnLst>
+              </p:cTn>
+              <p:prevCondLst>
+                <p:cond evt="onPrev" delay="0">
+                  <p:tgtEl>
+                    <p:sldTgt/>
+                  </p:tgtEl>
+                </p:cond>
+              </p:prevCondLst>
+              <p:nextCondLst>
+                <p:cond evt="onNext" delay="0">
+                  <p:tgtEl>
+                    <p:sldTgt/>
+                  </p:tgtEl>
+                </p:cond>
+              </p:nextCondLst>
+            </p:seq>
+          </p:childTnLst>
+        </p:cTn>
+      </p:par>
+    </p:tnLst>
+  </p:timing>
+</p:sld>
+</file>
+
+<file path=ppt/slides/slide21.xml><?xml version="1.0" encoding="utf-8"?>
+<p:sld xmlns:a="http://schemas.openxmlformats.org/drawingml/2006/main" xmlns:r="http://schemas.openxmlformats.org/officeDocument/2006/relationships" xmlns:p="http://schemas.openxmlformats.org/presentationml/2006/main">
+  <p:cSld>
+    <p:spTree>
+      <p:nvGrpSpPr>
+        <p:cNvPr id="1" name=""/>
+        <p:cNvGrpSpPr/>
+        <p:nvPr/>
+      </p:nvGrpSpPr>
+      <p:grpSpPr>
+        <a:xfrm>
+          <a:off x="0" y="0"/>
+          <a:ext cx="0" cy="0"/>
+          <a:chOff x="0" y="0"/>
+          <a:chExt cx="0" cy="0"/>
+        </a:xfrm>
+      </p:grpSpPr>
+      <p:sp>
+        <p:nvSpPr>
+          <p:cNvPr id="3" name="Subtitle 2">
+            <a:extLst>
+              <a:ext uri="{FF2B5EF4-FFF2-40B4-BE49-F238E27FC236}">
+                <a16:creationId xmlns:a16="http://schemas.microsoft.com/office/drawing/2014/main" id="{96DD8BC4-D539-661E-8A88-53AF6C208F93}"/>
+              </a:ext>
+            </a:extLst>
+          </p:cNvPr>
+          <p:cNvSpPr>
+            <a:spLocks noGrp="1"/>
+          </p:cNvSpPr>
+          <p:nvPr>
+            <p:ph type="subTitle" idx="1"/>
+          </p:nvPr>
+        </p:nvSpPr>
+        <p:spPr>
+          <a:xfrm>
+            <a:off x="-250372" y="168389"/>
+            <a:ext cx="6901539" cy="303212"/>
+          </a:xfrm>
+        </p:spPr>
+        <p:txBody>
+          <a:bodyPr>
+            <a:normAutofit fontScale="92500" lnSpcReduction="20000"/>
+          </a:bodyPr>
+          <a:lstStyle/>
+          <a:p>
+            <a:r>
+              <a:rPr lang="en-US" sz="1800" b="1" dirty="0"/>
+              <a:t>4.6 The </a:t>
+            </a:r>
+            <a:r>
+              <a:rPr lang="en-US" sz="1800" b="1" dirty="0" err="1"/>
+              <a:t>Java.lang</a:t>
+            </a:r>
+            <a:r>
+              <a:rPr lang="en-US" sz="1800" b="1" dirty="0"/>
+              <a:t> and other standard Java package</a:t>
+            </a:r>
+          </a:p>
+        </p:txBody>
+      </p:sp>
+      <p:sp>
+        <p:nvSpPr>
+          <p:cNvPr id="2" name="TextBox 1">
+            <a:extLst>
+              <a:ext uri="{FF2B5EF4-FFF2-40B4-BE49-F238E27FC236}">
+                <a16:creationId xmlns:a16="http://schemas.microsoft.com/office/drawing/2014/main" id="{5A6B4745-6A45-A018-AFFD-1DD02C7A4C87}"/>
+              </a:ext>
+            </a:extLst>
+          </p:cNvPr>
+          <p:cNvSpPr txBox="1"/>
+          <p:nvPr/>
+        </p:nvSpPr>
+        <p:spPr>
+          <a:xfrm>
+            <a:off x="522514" y="4114800"/>
+            <a:ext cx="184731" cy="369332"/>
+          </a:xfrm>
+          <a:prstGeom prst="rect">
+            <a:avLst/>
+          </a:prstGeom>
+          <a:noFill/>
+        </p:spPr>
+        <p:txBody>
+          <a:bodyPr wrap="none" rtlCol="0">
+            <a:spAutoFit/>
+          </a:bodyPr>
+          <a:lstStyle/>
+          <a:p>
+            <a:endParaRPr lang="en-VN" dirty="0"/>
+          </a:p>
+        </p:txBody>
+      </p:sp>
+      <p:pic>
+        <p:nvPicPr>
+          <p:cNvPr id="5" name="Picture 4">
+            <a:extLst>
+              <a:ext uri="{FF2B5EF4-FFF2-40B4-BE49-F238E27FC236}">
+                <a16:creationId xmlns:a16="http://schemas.microsoft.com/office/drawing/2014/main" id="{59BAEE82-E255-137D-E972-546D5462DA7C}"/>
+              </a:ext>
+            </a:extLst>
+          </p:cNvPr>
+          <p:cNvPicPr>
+            <a:picLocks noChangeAspect="1"/>
+          </p:cNvPicPr>
+          <p:nvPr/>
+        </p:nvPicPr>
+        <p:blipFill>
+          <a:blip r:embed="rId2"/>
+          <a:stretch>
+            <a:fillRect/>
+          </a:stretch>
+        </p:blipFill>
+        <p:spPr>
+          <a:xfrm>
+            <a:off x="1328057" y="471601"/>
+            <a:ext cx="9154886" cy="5420057"/>
+          </a:xfrm>
+          <a:prstGeom prst="rect">
+            <a:avLst/>
+          </a:prstGeom>
+        </p:spPr>
+      </p:pic>
+      <p:sp>
+        <p:nvSpPr>
+          <p:cNvPr id="6" name="TextBox 5">
+            <a:extLst>
+              <a:ext uri="{FF2B5EF4-FFF2-40B4-BE49-F238E27FC236}">
+                <a16:creationId xmlns:a16="http://schemas.microsoft.com/office/drawing/2014/main" id="{65184111-F993-0452-0732-654807B1458B}"/>
+              </a:ext>
+            </a:extLst>
+          </p:cNvPr>
+          <p:cNvSpPr txBox="1"/>
+          <p:nvPr/>
+        </p:nvSpPr>
+        <p:spPr>
+          <a:xfrm>
+            <a:off x="811092" y="5838128"/>
+            <a:ext cx="10188815" cy="369332"/>
+          </a:xfrm>
+          <a:prstGeom prst="rect">
+            <a:avLst/>
+          </a:prstGeom>
+          <a:noFill/>
+        </p:spPr>
+        <p:txBody>
+          <a:bodyPr wrap="none" rtlCol="0">
+            <a:spAutoFit/>
+          </a:bodyPr>
+          <a:lstStyle/>
+          <a:p>
+            <a:r>
+              <a:rPr lang="en-VN" i="1" dirty="0"/>
+              <a:t>This picture shows some of the most important package that are commonly used in Java Development</a:t>
+            </a:r>
+          </a:p>
+        </p:txBody>
+      </p:sp>
+    </p:spTree>
+    <p:extLst>
+      <p:ext uri="{BB962C8B-B14F-4D97-AF65-F5344CB8AC3E}">
+        <p14:creationId xmlns:p14="http://schemas.microsoft.com/office/powerpoint/2010/main" val="1293699709"/>
+      </p:ext>
+    </p:extLst>
+  </p:cSld>
+  <p:clrMapOvr>
+    <a:masterClrMapping/>
+  </p:clrMapOvr>
+</p:sld>
+</file>
+
+<file path=ppt/slides/slide22.xml><?xml version="1.0" encoding="utf-8"?>
+<p:sld xmlns:a="http://schemas.openxmlformats.org/drawingml/2006/main" xmlns:r="http://schemas.openxmlformats.org/officeDocument/2006/relationships" xmlns:p="http://schemas.openxmlformats.org/presentationml/2006/main">
+  <p:cSld>
+    <p:spTree>
+      <p:nvGrpSpPr>
+        <p:cNvPr id="1" name=""/>
+        <p:cNvGrpSpPr/>
+        <p:nvPr/>
+      </p:nvGrpSpPr>
+      <p:grpSpPr>
+        <a:xfrm>
+          <a:off x="0" y="0"/>
+          <a:ext cx="0" cy="0"/>
+          <a:chOff x="0" y="0"/>
+          <a:chExt cx="0" cy="0"/>
+        </a:xfrm>
+      </p:grpSpPr>
+      <p:sp>
+        <p:nvSpPr>
+          <p:cNvPr id="3" name="Subtitle 2">
+            <a:extLst>
+              <a:ext uri="{FF2B5EF4-FFF2-40B4-BE49-F238E27FC236}">
+                <a16:creationId xmlns:a16="http://schemas.microsoft.com/office/drawing/2014/main" id="{96DD8BC4-D539-661E-8A88-53AF6C208F93}"/>
+              </a:ext>
+            </a:extLst>
+          </p:cNvPr>
+          <p:cNvSpPr>
+            <a:spLocks noGrp="1"/>
+          </p:cNvSpPr>
+          <p:nvPr>
+            <p:ph type="subTitle" idx="1"/>
+          </p:nvPr>
+        </p:nvSpPr>
+        <p:spPr>
+          <a:xfrm>
+            <a:off x="-250372" y="168389"/>
+            <a:ext cx="6901539" cy="303212"/>
+          </a:xfrm>
+        </p:spPr>
+        <p:txBody>
+          <a:bodyPr>
+            <a:normAutofit fontScale="92500" lnSpcReduction="20000"/>
+          </a:bodyPr>
+          <a:lstStyle/>
+          <a:p>
+            <a:r>
+              <a:rPr lang="en-US" sz="1800" b="1" dirty="0"/>
+              <a:t>4.6 The </a:t>
+            </a:r>
+            <a:r>
+              <a:rPr lang="en-US" sz="1800" b="1" dirty="0" err="1"/>
+              <a:t>Java.lang</a:t>
+            </a:r>
+            <a:r>
+              <a:rPr lang="en-US" sz="1800" b="1" dirty="0"/>
+              <a:t> and other standard Java package</a:t>
+            </a:r>
+          </a:p>
+        </p:txBody>
+      </p:sp>
+      <p:sp>
+        <p:nvSpPr>
+          <p:cNvPr id="4" name="Subtitle 2">
+            <a:extLst>
+              <a:ext uri="{FF2B5EF4-FFF2-40B4-BE49-F238E27FC236}">
+                <a16:creationId xmlns:a16="http://schemas.microsoft.com/office/drawing/2014/main" id="{BBA13038-CAB8-FCA0-CDE8-65E40C2F10A3}"/>
+              </a:ext>
+            </a:extLst>
+          </p:cNvPr>
+          <p:cNvSpPr txBox="1">
+            <a:spLocks/>
+          </p:cNvSpPr>
+          <p:nvPr/>
+        </p:nvSpPr>
+        <p:spPr>
+          <a:xfrm>
+            <a:off x="-38264" y="820738"/>
+            <a:ext cx="12192000" cy="6037262"/>
+          </a:xfrm>
+          <a:prstGeom prst="rect">
+            <a:avLst/>
+          </a:prstGeom>
+        </p:spPr>
+        <p:txBody>
+          <a:bodyPr vert="horz" lIns="91440" tIns="45720" rIns="91440" bIns="45720" rtlCol="0">
+            <a:normAutofit/>
+          </a:bodyPr>
+          <a:lstStyle>
+            <a:lvl1pPr marL="0" indent="0" algn="ctr" defTabSz="914400" rtl="0" eaLnBrk="1" latinLnBrk="0" hangingPunct="1">
+              <a:lnSpc>
+                <a:spcPct val="90000"/>
+              </a:lnSpc>
+              <a:spcBef>
+                <a:spcPts val="1000"/>
+              </a:spcBef>
+              <a:buFont typeface="Arial" panose="020B0604020202020204" pitchFamily="34" charset="0"/>
+              <a:buNone/>
+              <a:defRPr sz="2400" kern="1200">
+                <a:solidFill>
+                  <a:schemeClr val="tx1"/>
+                </a:solidFill>
+                <a:latin typeface="+mn-lt"/>
+                <a:ea typeface="+mn-ea"/>
+                <a:cs typeface="+mn-cs"/>
+              </a:defRPr>
+            </a:lvl1pPr>
+            <a:lvl2pPr marL="457200" indent="0" algn="ctr" defTabSz="914400" rtl="0" eaLnBrk="1" latinLnBrk="0" hangingPunct="1">
+              <a:lnSpc>
+                <a:spcPct val="90000"/>
+              </a:lnSpc>
+              <a:spcBef>
+                <a:spcPts val="500"/>
+              </a:spcBef>
+              <a:buFont typeface="Arial" panose="020B0604020202020204" pitchFamily="34" charset="0"/>
+              <a:buNone/>
+              <a:defRPr sz="2000" kern="1200">
+                <a:solidFill>
+                  <a:schemeClr val="tx1"/>
+                </a:solidFill>
+                <a:latin typeface="+mn-lt"/>
+                <a:ea typeface="+mn-ea"/>
+                <a:cs typeface="+mn-cs"/>
+              </a:defRPr>
+            </a:lvl2pPr>
+            <a:lvl3pPr marL="914400" indent="0" algn="ctr" defTabSz="914400" rtl="0" eaLnBrk="1" latinLnBrk="0" hangingPunct="1">
+              <a:lnSpc>
+                <a:spcPct val="90000"/>
+              </a:lnSpc>
+              <a:spcBef>
+                <a:spcPts val="500"/>
+              </a:spcBef>
+              <a:buFont typeface="Arial" panose="020B0604020202020204" pitchFamily="34" charset="0"/>
+              <a:buNone/>
+              <a:defRPr sz="1800" kern="1200">
+                <a:solidFill>
+                  <a:schemeClr val="tx1"/>
+                </a:solidFill>
+                <a:latin typeface="+mn-lt"/>
+                <a:ea typeface="+mn-ea"/>
+                <a:cs typeface="+mn-cs"/>
+              </a:defRPr>
+            </a:lvl3pPr>
+            <a:lvl4pPr marL="1371600" indent="0" algn="ctr" defTabSz="914400" rtl="0" eaLnBrk="1" latinLnBrk="0" hangingPunct="1">
+              <a:lnSpc>
+                <a:spcPct val="90000"/>
+              </a:lnSpc>
+              <a:spcBef>
+                <a:spcPts val="500"/>
+              </a:spcBef>
+              <a:buFont typeface="Arial" panose="020B0604020202020204" pitchFamily="34" charset="0"/>
+              <a:buNone/>
+              <a:defRPr sz="1600" kern="1200">
+                <a:solidFill>
+                  <a:schemeClr val="tx1"/>
+                </a:solidFill>
+                <a:latin typeface="+mn-lt"/>
+                <a:ea typeface="+mn-ea"/>
+                <a:cs typeface="+mn-cs"/>
+              </a:defRPr>
+            </a:lvl4pPr>
+            <a:lvl5pPr marL="1828800" indent="0" algn="ctr" defTabSz="914400" rtl="0" eaLnBrk="1" latinLnBrk="0" hangingPunct="1">
+              <a:lnSpc>
+                <a:spcPct val="90000"/>
+              </a:lnSpc>
+              <a:spcBef>
+                <a:spcPts val="500"/>
+              </a:spcBef>
+              <a:buFont typeface="Arial" panose="020B0604020202020204" pitchFamily="34" charset="0"/>
+              <a:buNone/>
+              <a:defRPr sz="1600" kern="1200">
+                <a:solidFill>
+                  <a:schemeClr val="tx1"/>
+                </a:solidFill>
+                <a:latin typeface="+mn-lt"/>
+                <a:ea typeface="+mn-ea"/>
+                <a:cs typeface="+mn-cs"/>
+              </a:defRPr>
+            </a:lvl5pPr>
+            <a:lvl6pPr marL="2286000" indent="0" algn="ctr" defTabSz="914400" rtl="0" eaLnBrk="1" latinLnBrk="0" hangingPunct="1">
+              <a:lnSpc>
+                <a:spcPct val="90000"/>
+              </a:lnSpc>
+              <a:spcBef>
+                <a:spcPts val="500"/>
+              </a:spcBef>
+              <a:buFont typeface="Arial" panose="020B0604020202020204" pitchFamily="34" charset="0"/>
+              <a:buNone/>
+              <a:defRPr sz="1600" kern="1200">
+                <a:solidFill>
+                  <a:schemeClr val="tx1"/>
+                </a:solidFill>
+                <a:latin typeface="+mn-lt"/>
+                <a:ea typeface="+mn-ea"/>
+                <a:cs typeface="+mn-cs"/>
+              </a:defRPr>
+            </a:lvl6pPr>
+            <a:lvl7pPr marL="2743200" indent="0" algn="ctr" defTabSz="914400" rtl="0" eaLnBrk="1" latinLnBrk="0" hangingPunct="1">
+              <a:lnSpc>
+                <a:spcPct val="90000"/>
+              </a:lnSpc>
+              <a:spcBef>
+                <a:spcPts val="500"/>
+              </a:spcBef>
+              <a:buFont typeface="Arial" panose="020B0604020202020204" pitchFamily="34" charset="0"/>
+              <a:buNone/>
+              <a:defRPr sz="1600" kern="1200">
+                <a:solidFill>
+                  <a:schemeClr val="tx1"/>
+                </a:solidFill>
+                <a:latin typeface="+mn-lt"/>
+                <a:ea typeface="+mn-ea"/>
+                <a:cs typeface="+mn-cs"/>
+              </a:defRPr>
+            </a:lvl7pPr>
+            <a:lvl8pPr marL="3200400" indent="0" algn="ctr" defTabSz="914400" rtl="0" eaLnBrk="1" latinLnBrk="0" hangingPunct="1">
+              <a:lnSpc>
+                <a:spcPct val="90000"/>
+              </a:lnSpc>
+              <a:spcBef>
+                <a:spcPts val="500"/>
+              </a:spcBef>
+              <a:buFont typeface="Arial" panose="020B0604020202020204" pitchFamily="34" charset="0"/>
+              <a:buNone/>
+              <a:defRPr sz="1600" kern="1200">
+                <a:solidFill>
+                  <a:schemeClr val="tx1"/>
+                </a:solidFill>
+                <a:latin typeface="+mn-lt"/>
+                <a:ea typeface="+mn-ea"/>
+                <a:cs typeface="+mn-cs"/>
+              </a:defRPr>
+            </a:lvl8pPr>
+            <a:lvl9pPr marL="3657600" indent="0" algn="ctr" defTabSz="914400" rtl="0" eaLnBrk="1" latinLnBrk="0" hangingPunct="1">
+              <a:lnSpc>
+                <a:spcPct val="90000"/>
+              </a:lnSpc>
+              <a:spcBef>
+                <a:spcPts val="500"/>
+              </a:spcBef>
+              <a:buFont typeface="Arial" panose="020B0604020202020204" pitchFamily="34" charset="0"/>
+              <a:buNone/>
+              <a:defRPr sz="1600" kern="1200">
+                <a:solidFill>
+                  <a:schemeClr val="tx1"/>
+                </a:solidFill>
+                <a:latin typeface="+mn-lt"/>
+                <a:ea typeface="+mn-ea"/>
+                <a:cs typeface="+mn-cs"/>
+              </a:defRPr>
+            </a:lvl9pPr>
+          </a:lstStyle>
+          <a:p>
             <a:pPr marL="285750" indent="-285750" algn="l">
               <a:buFontTx/>
               <a:buChar char="-"/>
@@ -12198,7 +13386,7 @@
 </p:sld>
 </file>
 
-<file path=ppt/slides/slide21.xml><?xml version="1.0" encoding="utf-8"?>
+<file path=ppt/slides/slide23.xml><?xml version="1.0" encoding="utf-8"?>
 <p:sld xmlns:a="http://schemas.openxmlformats.org/drawingml/2006/main" xmlns:r="http://schemas.openxmlformats.org/officeDocument/2006/relationships" xmlns:p="http://schemas.openxmlformats.org/presentationml/2006/main">
   <p:cSld>
     <p:spTree>
@@ -12533,7 +13721,7 @@
 </p:sld>
 </file>
 
-<file path=ppt/slides/slide22.xml><?xml version="1.0" encoding="utf-8"?>
+<file path=ppt/slides/slide24.xml><?xml version="1.0" encoding="utf-8"?>
 <p:sld xmlns:a="http://schemas.openxmlformats.org/drawingml/2006/main" xmlns:r="http://schemas.openxmlformats.org/officeDocument/2006/relationships" xmlns:p="http://schemas.openxmlformats.org/presentationml/2006/main">
   <p:cSld>
     <p:spTree>

</xml_diff>